<commit_message>
Add a tuto on how to install & use MicroPython on ESP8266
</commit_message>
<xml_diff>
--- a/microPython.pptx
+++ b/microPython.pptx
@@ -13,6 +13,8 @@
     <p:sldId id="263" r:id="rId7"/>
     <p:sldId id="261" r:id="rId8"/>
     <p:sldId id="262" r:id="rId9"/>
+    <p:sldId id="264" r:id="rId10"/>
+    <p:sldId id="265" r:id="rId11"/>
   </p:sldIdLst>
   <p:sldSz cx="12192000" cy="6858000"/>
   <p:notesSz cx="6858000" cy="9144000"/>
@@ -111,6 +113,11 @@
       </a:defRPr>
     </a:lvl9pPr>
   </p:defaultTextStyle>
+  <p:extLst>
+    <p:ext uri="{EFAFB233-063F-42B5-8137-9DF3F51BA10A}">
+      <p15:sldGuideLst xmlns:p15="http://schemas.microsoft.com/office/powerpoint/2012/main"/>
+    </p:ext>
+  </p:extLst>
 </p:presentation>
 </file>
 
@@ -245,7 +252,7 @@
           <a:p>
             <a:fld id="{1A052EFB-C785-4F1B-9B06-36B9FEE190F6}" type="datetimeFigureOut">
               <a:rPr lang="fr-FR" smtClean="0"/>
-              <a:t>29/09/2022</a:t>
+              <a:t>30/09/2022</a:t>
             </a:fld>
             <a:endParaRPr lang="fr-FR"/>
           </a:p>
@@ -415,7 +422,7 @@
           <a:p>
             <a:fld id="{1A052EFB-C785-4F1B-9B06-36B9FEE190F6}" type="datetimeFigureOut">
               <a:rPr lang="fr-FR" smtClean="0"/>
-              <a:t>29/09/2022</a:t>
+              <a:t>30/09/2022</a:t>
             </a:fld>
             <a:endParaRPr lang="fr-FR"/>
           </a:p>
@@ -595,7 +602,7 @@
           <a:p>
             <a:fld id="{1A052EFB-C785-4F1B-9B06-36B9FEE190F6}" type="datetimeFigureOut">
               <a:rPr lang="fr-FR" smtClean="0"/>
-              <a:t>29/09/2022</a:t>
+              <a:t>30/09/2022</a:t>
             </a:fld>
             <a:endParaRPr lang="fr-FR"/>
           </a:p>
@@ -765,7 +772,7 @@
           <a:p>
             <a:fld id="{1A052EFB-C785-4F1B-9B06-36B9FEE190F6}" type="datetimeFigureOut">
               <a:rPr lang="fr-FR" smtClean="0"/>
-              <a:t>29/09/2022</a:t>
+              <a:t>30/09/2022</a:t>
             </a:fld>
             <a:endParaRPr lang="fr-FR"/>
           </a:p>
@@ -1011,7 +1018,7 @@
           <a:p>
             <a:fld id="{1A052EFB-C785-4F1B-9B06-36B9FEE190F6}" type="datetimeFigureOut">
               <a:rPr lang="fr-FR" smtClean="0"/>
-              <a:t>29/09/2022</a:t>
+              <a:t>30/09/2022</a:t>
             </a:fld>
             <a:endParaRPr lang="fr-FR"/>
           </a:p>
@@ -1243,7 +1250,7 @@
           <a:p>
             <a:fld id="{1A052EFB-C785-4F1B-9B06-36B9FEE190F6}" type="datetimeFigureOut">
               <a:rPr lang="fr-FR" smtClean="0"/>
-              <a:t>29/09/2022</a:t>
+              <a:t>30/09/2022</a:t>
             </a:fld>
             <a:endParaRPr lang="fr-FR"/>
           </a:p>
@@ -1610,7 +1617,7 @@
           <a:p>
             <a:fld id="{1A052EFB-C785-4F1B-9B06-36B9FEE190F6}" type="datetimeFigureOut">
               <a:rPr lang="fr-FR" smtClean="0"/>
-              <a:t>29/09/2022</a:t>
+              <a:t>30/09/2022</a:t>
             </a:fld>
             <a:endParaRPr lang="fr-FR"/>
           </a:p>
@@ -1728,7 +1735,7 @@
           <a:p>
             <a:fld id="{1A052EFB-C785-4F1B-9B06-36B9FEE190F6}" type="datetimeFigureOut">
               <a:rPr lang="fr-FR" smtClean="0"/>
-              <a:t>29/09/2022</a:t>
+              <a:t>30/09/2022</a:t>
             </a:fld>
             <a:endParaRPr lang="fr-FR"/>
           </a:p>
@@ -1823,7 +1830,7 @@
           <a:p>
             <a:fld id="{1A052EFB-C785-4F1B-9B06-36B9FEE190F6}" type="datetimeFigureOut">
               <a:rPr lang="fr-FR" smtClean="0"/>
-              <a:t>29/09/2022</a:t>
+              <a:t>30/09/2022</a:t>
             </a:fld>
             <a:endParaRPr lang="fr-FR"/>
           </a:p>
@@ -2100,7 +2107,7 @@
           <a:p>
             <a:fld id="{1A052EFB-C785-4F1B-9B06-36B9FEE190F6}" type="datetimeFigureOut">
               <a:rPr lang="fr-FR" smtClean="0"/>
-              <a:t>29/09/2022</a:t>
+              <a:t>30/09/2022</a:t>
             </a:fld>
             <a:endParaRPr lang="fr-FR"/>
           </a:p>
@@ -2353,7 +2360,7 @@
           <a:p>
             <a:fld id="{1A052EFB-C785-4F1B-9B06-36B9FEE190F6}" type="datetimeFigureOut">
               <a:rPr lang="fr-FR" smtClean="0"/>
-              <a:t>29/09/2022</a:t>
+              <a:t>30/09/2022</a:t>
             </a:fld>
             <a:endParaRPr lang="fr-FR"/>
           </a:p>
@@ -2566,7 +2573,7 @@
           <a:p>
             <a:fld id="{1A052EFB-C785-4F1B-9B06-36B9FEE190F6}" type="datetimeFigureOut">
               <a:rPr lang="fr-FR" smtClean="0"/>
-              <a:t>29/09/2022</a:t>
+              <a:t>30/09/2022</a:t>
             </a:fld>
             <a:endParaRPr lang="fr-FR"/>
           </a:p>
@@ -3041,6 +3048,1317 @@
 </p:sld>
 </file>
 
+<file path=ppt/slides/slide10.xml><?xml version="1.0" encoding="utf-8"?>
+<p:sld xmlns:a="http://schemas.openxmlformats.org/drawingml/2006/main" xmlns:r="http://schemas.openxmlformats.org/officeDocument/2006/relationships" xmlns:p="http://schemas.openxmlformats.org/presentationml/2006/main">
+  <p:cSld>
+    <p:spTree>
+      <p:nvGrpSpPr>
+        <p:cNvPr id="1" name=""/>
+        <p:cNvGrpSpPr/>
+        <p:nvPr/>
+      </p:nvGrpSpPr>
+      <p:grpSpPr>
+        <a:xfrm>
+          <a:off x="0" y="0"/>
+          <a:ext cx="0" cy="0"/>
+          <a:chOff x="0" y="0"/>
+          <a:chExt cx="0" cy="0"/>
+        </a:xfrm>
+      </p:grpSpPr>
+      <p:sp>
+        <p:nvSpPr>
+          <p:cNvPr id="4" name="Rectangle 3"/>
+          <p:cNvSpPr/>
+          <p:nvPr/>
+        </p:nvSpPr>
+        <p:spPr>
+          <a:xfrm>
+            <a:off x="214130" y="234914"/>
+            <a:ext cx="4627651" cy="6001643"/>
+          </a:xfrm>
+          <a:prstGeom prst="rect">
+            <a:avLst/>
+          </a:prstGeom>
+          <a:solidFill>
+            <a:schemeClr val="bg1">
+              <a:lumMod val="95000"/>
+            </a:schemeClr>
+          </a:solidFill>
+          <a:ln w="19050">
+            <a:solidFill>
+              <a:srgbClr val="FF0000"/>
+            </a:solidFill>
+          </a:ln>
+        </p:spPr>
+        <p:txBody>
+          <a:bodyPr wrap="square">
+            <a:spAutoFit/>
+          </a:bodyPr>
+          <a:lstStyle/>
+          <a:p>
+            <a:r>
+              <a:rPr lang="fr-FR" sz="1200" dirty="0" err="1" smtClean="0"/>
+              <a:t>ssid</a:t>
+            </a:r>
+            <a:r>
+              <a:rPr lang="fr-FR" sz="1200" dirty="0" smtClean="0"/>
+              <a:t> </a:t>
+            </a:r>
+            <a:r>
+              <a:rPr lang="fr-FR" sz="1200" dirty="0"/>
+              <a:t>= 'RCO_123'                  #Set </a:t>
+            </a:r>
+            <a:r>
+              <a:rPr lang="fr-FR" sz="1200" dirty="0" err="1"/>
+              <a:t>your</a:t>
+            </a:r>
+            <a:r>
+              <a:rPr lang="fr-FR" sz="1200" dirty="0"/>
+              <a:t> </a:t>
+            </a:r>
+            <a:r>
+              <a:rPr lang="fr-FR" sz="1200" dirty="0" err="1"/>
+              <a:t>own</a:t>
+            </a:r>
+            <a:r>
+              <a:rPr lang="fr-FR" sz="1200" dirty="0"/>
+              <a:t> </a:t>
+            </a:r>
+          </a:p>
+          <a:p>
+            <a:r>
+              <a:rPr lang="fr-FR" sz="1200" dirty="0" err="1"/>
+              <a:t>password</a:t>
+            </a:r>
+            <a:r>
+              <a:rPr lang="fr-FR" sz="1200" dirty="0"/>
+              <a:t> = '12345678'      #Set </a:t>
+            </a:r>
+            <a:r>
+              <a:rPr lang="fr-FR" sz="1200" dirty="0" err="1"/>
+              <a:t>your</a:t>
+            </a:r>
+            <a:r>
+              <a:rPr lang="fr-FR" sz="1200" dirty="0"/>
+              <a:t> </a:t>
+            </a:r>
+            <a:r>
+              <a:rPr lang="fr-FR" sz="1200" dirty="0" err="1"/>
+              <a:t>own</a:t>
+            </a:r>
+            <a:r>
+              <a:rPr lang="fr-FR" sz="1200" dirty="0"/>
+              <a:t> </a:t>
+            </a:r>
+            <a:r>
+              <a:rPr lang="fr-FR" sz="1200" dirty="0" err="1"/>
+              <a:t>password</a:t>
+            </a:r>
+            <a:endParaRPr lang="fr-FR" sz="1200" dirty="0"/>
+          </a:p>
+          <a:p>
+            <a:endParaRPr lang="fr-FR" sz="1200" dirty="0"/>
+          </a:p>
+          <a:p>
+            <a:r>
+              <a:rPr lang="fr-FR" sz="1200" dirty="0" err="1" smtClean="0"/>
+              <a:t>ap</a:t>
+            </a:r>
+            <a:r>
+              <a:rPr lang="fr-FR" sz="1200" dirty="0" smtClean="0"/>
+              <a:t> </a:t>
+            </a:r>
+            <a:r>
+              <a:rPr lang="fr-FR" sz="1200" dirty="0"/>
+              <a:t>= </a:t>
+            </a:r>
+            <a:r>
+              <a:rPr lang="fr-FR" sz="1200" dirty="0" err="1"/>
+              <a:t>network.WLAN</a:t>
+            </a:r>
+            <a:r>
+              <a:rPr lang="fr-FR" sz="1200" dirty="0"/>
+              <a:t>(</a:t>
+            </a:r>
+            <a:r>
+              <a:rPr lang="fr-FR" sz="1200" dirty="0" err="1"/>
+              <a:t>network.AP_IF</a:t>
+            </a:r>
+            <a:r>
+              <a:rPr lang="fr-FR" sz="1200" dirty="0"/>
+              <a:t>)</a:t>
+            </a:r>
+          </a:p>
+          <a:p>
+            <a:r>
+              <a:rPr lang="fr-FR" sz="1200" dirty="0" err="1"/>
+              <a:t>ap.active</a:t>
+            </a:r>
+            <a:r>
+              <a:rPr lang="fr-FR" sz="1200" dirty="0"/>
+              <a:t>(False</a:t>
+            </a:r>
+            <a:r>
+              <a:rPr lang="fr-FR" sz="1200" dirty="0" smtClean="0"/>
+              <a:t>)</a:t>
+            </a:r>
+            <a:endParaRPr lang="fr-FR" sz="1200" dirty="0"/>
+          </a:p>
+          <a:p>
+            <a:r>
+              <a:rPr lang="fr-FR" sz="1200" dirty="0" err="1"/>
+              <a:t>ap.active</a:t>
+            </a:r>
+            <a:r>
+              <a:rPr lang="fr-FR" sz="1200" dirty="0"/>
+              <a:t>(</a:t>
+            </a:r>
+            <a:r>
+              <a:rPr lang="fr-FR" sz="1200" dirty="0" err="1"/>
+              <a:t>True</a:t>
+            </a:r>
+            <a:r>
+              <a:rPr lang="fr-FR" sz="1200" dirty="0" smtClean="0"/>
+              <a:t>)</a:t>
+            </a:r>
+            <a:endParaRPr lang="fr-FR" sz="1200" dirty="0"/>
+          </a:p>
+          <a:p>
+            <a:r>
+              <a:rPr lang="fr-FR" sz="1200" dirty="0" err="1" smtClean="0"/>
+              <a:t>ap.config</a:t>
+            </a:r>
+            <a:r>
+              <a:rPr lang="fr-FR" sz="1200" dirty="0" smtClean="0"/>
+              <a:t>(</a:t>
+            </a:r>
+            <a:r>
+              <a:rPr lang="fr-FR" sz="1200" dirty="0" err="1" smtClean="0"/>
+              <a:t>essid</a:t>
+            </a:r>
+            <a:r>
+              <a:rPr lang="fr-FR" sz="1200" dirty="0" smtClean="0"/>
+              <a:t>=</a:t>
+            </a:r>
+            <a:r>
+              <a:rPr lang="fr-FR" sz="1200" dirty="0" err="1" smtClean="0"/>
+              <a:t>ssid</a:t>
+            </a:r>
+            <a:r>
+              <a:rPr lang="fr-FR" sz="1200" dirty="0"/>
+              <a:t>, </a:t>
+            </a:r>
+            <a:r>
+              <a:rPr lang="fr-FR" sz="1200" dirty="0" err="1"/>
+              <a:t>password</a:t>
+            </a:r>
+            <a:r>
+              <a:rPr lang="fr-FR" sz="1200" dirty="0"/>
+              <a:t>=</a:t>
+            </a:r>
+            <a:r>
+              <a:rPr lang="fr-FR" sz="1200" dirty="0" err="1"/>
+              <a:t>password</a:t>
+            </a:r>
+            <a:r>
+              <a:rPr lang="fr-FR" sz="1200" dirty="0"/>
+              <a:t>)</a:t>
+            </a:r>
+          </a:p>
+          <a:p>
+            <a:endParaRPr lang="fr-FR" sz="1200" dirty="0"/>
+          </a:p>
+          <a:p>
+            <a:r>
+              <a:rPr lang="fr-FR" sz="1200" dirty="0" err="1"/>
+              <a:t>while</a:t>
+            </a:r>
+            <a:r>
+              <a:rPr lang="fr-FR" sz="1200" dirty="0"/>
+              <a:t> </a:t>
+            </a:r>
+            <a:r>
+              <a:rPr lang="fr-FR" sz="1200" dirty="0" err="1"/>
+              <a:t>ap.active</a:t>
+            </a:r>
+            <a:r>
+              <a:rPr lang="fr-FR" sz="1200" dirty="0"/>
+              <a:t>() == False:</a:t>
+            </a:r>
+          </a:p>
+          <a:p>
+            <a:r>
+              <a:rPr lang="fr-FR" sz="1200" dirty="0"/>
+              <a:t>  </a:t>
+            </a:r>
+            <a:r>
+              <a:rPr lang="fr-FR" sz="1200" dirty="0" err="1"/>
+              <a:t>pass</a:t>
+            </a:r>
+            <a:endParaRPr lang="fr-FR" sz="1200" dirty="0"/>
+          </a:p>
+          <a:p>
+            <a:endParaRPr lang="fr-FR" sz="1200" dirty="0"/>
+          </a:p>
+          <a:p>
+            <a:r>
+              <a:rPr lang="fr-FR" sz="1200" dirty="0" err="1"/>
+              <a:t>print</a:t>
+            </a:r>
+            <a:r>
+              <a:rPr lang="fr-FR" sz="1200" dirty="0"/>
+              <a:t>('Connection </a:t>
+            </a:r>
+            <a:r>
+              <a:rPr lang="fr-FR" sz="1200" dirty="0" err="1"/>
+              <a:t>is</a:t>
+            </a:r>
+            <a:r>
+              <a:rPr lang="fr-FR" sz="1200" dirty="0"/>
+              <a:t> </a:t>
+            </a:r>
+            <a:r>
+              <a:rPr lang="fr-FR" sz="1200" dirty="0" err="1"/>
+              <a:t>successful</a:t>
+            </a:r>
+            <a:r>
+              <a:rPr lang="fr-FR" sz="1200" dirty="0"/>
+              <a:t>')</a:t>
+            </a:r>
+          </a:p>
+          <a:p>
+            <a:r>
+              <a:rPr lang="fr-FR" sz="1200" dirty="0" err="1"/>
+              <a:t>print</a:t>
+            </a:r>
+            <a:r>
+              <a:rPr lang="fr-FR" sz="1200" dirty="0"/>
+              <a:t>(</a:t>
+            </a:r>
+            <a:r>
+              <a:rPr lang="fr-FR" sz="1200" dirty="0" err="1"/>
+              <a:t>ap.ifconfig</a:t>
+            </a:r>
+            <a:r>
+              <a:rPr lang="fr-FR" sz="1200" dirty="0"/>
+              <a:t>())</a:t>
+            </a:r>
+          </a:p>
+          <a:p>
+            <a:endParaRPr lang="fr-FR" sz="1200" dirty="0"/>
+          </a:p>
+          <a:p>
+            <a:r>
+              <a:rPr lang="fr-FR" sz="1200" dirty="0"/>
+              <a:t>i = 0</a:t>
+            </a:r>
+          </a:p>
+          <a:p>
+            <a:r>
+              <a:rPr lang="fr-FR" sz="1200" dirty="0" err="1"/>
+              <a:t>while</a:t>
+            </a:r>
+            <a:r>
+              <a:rPr lang="fr-FR" sz="1200" dirty="0"/>
+              <a:t> </a:t>
+            </a:r>
+            <a:r>
+              <a:rPr lang="fr-FR" sz="1200" dirty="0" err="1"/>
+              <a:t>True</a:t>
+            </a:r>
+            <a:r>
+              <a:rPr lang="fr-FR" sz="1200" dirty="0"/>
+              <a:t>:</a:t>
+            </a:r>
+          </a:p>
+          <a:p>
+            <a:r>
+              <a:rPr lang="fr-FR" sz="1200" dirty="0"/>
+              <a:t>    </a:t>
+            </a:r>
+            <a:r>
+              <a:rPr lang="fr-FR" sz="1200" dirty="0" err="1"/>
+              <a:t>print</a:t>
+            </a:r>
+            <a:r>
+              <a:rPr lang="fr-FR" sz="1200" dirty="0"/>
+              <a:t>('</a:t>
+            </a:r>
+            <a:r>
+              <a:rPr lang="fr-FR" sz="1200" dirty="0" err="1"/>
+              <a:t>Creating</a:t>
+            </a:r>
+            <a:r>
+              <a:rPr lang="fr-FR" sz="1200" dirty="0"/>
+              <a:t> socket')</a:t>
+            </a:r>
+          </a:p>
+          <a:p>
+            <a:r>
+              <a:rPr lang="fr-FR" sz="1200" dirty="0"/>
+              <a:t>    s = </a:t>
+            </a:r>
+            <a:r>
+              <a:rPr lang="fr-FR" sz="1200" dirty="0" err="1"/>
+              <a:t>socket.socket</a:t>
+            </a:r>
+            <a:r>
+              <a:rPr lang="fr-FR" sz="1200" dirty="0"/>
+              <a:t>(</a:t>
+            </a:r>
+            <a:r>
+              <a:rPr lang="fr-FR" sz="1200" dirty="0" err="1"/>
+              <a:t>socket.AF_INET</a:t>
+            </a:r>
+            <a:r>
+              <a:rPr lang="fr-FR" sz="1200" dirty="0"/>
+              <a:t>, </a:t>
+            </a:r>
+            <a:r>
+              <a:rPr lang="fr-FR" sz="1200" dirty="0" err="1"/>
+              <a:t>socket.SOCK_STREAM</a:t>
+            </a:r>
+            <a:r>
+              <a:rPr lang="fr-FR" sz="1200" dirty="0"/>
+              <a:t>) </a:t>
+            </a:r>
+            <a:endParaRPr lang="fr-FR" sz="1200" dirty="0" smtClean="0"/>
+          </a:p>
+          <a:p>
+            <a:r>
+              <a:rPr lang="fr-FR" sz="1200" dirty="0"/>
+              <a:t> </a:t>
+            </a:r>
+            <a:r>
+              <a:rPr lang="fr-FR" sz="1200" dirty="0" smtClean="0"/>
+              <a:t>   </a:t>
+            </a:r>
+            <a:r>
+              <a:rPr lang="fr-FR" sz="1200" dirty="0" err="1" smtClean="0"/>
+              <a:t>try</a:t>
+            </a:r>
+            <a:r>
+              <a:rPr lang="fr-FR" sz="1200" dirty="0"/>
+              <a:t>:</a:t>
+            </a:r>
+          </a:p>
+          <a:p>
+            <a:r>
+              <a:rPr lang="fr-FR" sz="1200" dirty="0"/>
+              <a:t>        </a:t>
+            </a:r>
+            <a:r>
+              <a:rPr lang="fr-FR" sz="1200" dirty="0" err="1"/>
+              <a:t>print</a:t>
+            </a:r>
+            <a:r>
+              <a:rPr lang="fr-FR" sz="1200" dirty="0"/>
+              <a:t>('Binding socket on port ', 80)</a:t>
+            </a:r>
+          </a:p>
+          <a:p>
+            <a:r>
+              <a:rPr lang="fr-FR" sz="1200" dirty="0"/>
+              <a:t>        </a:t>
+            </a:r>
+            <a:r>
+              <a:rPr lang="fr-FR" sz="1200" dirty="0" err="1"/>
+              <a:t>s.bind</a:t>
+            </a:r>
+            <a:r>
+              <a:rPr lang="fr-FR" sz="1200" dirty="0"/>
+              <a:t>(('', 80))</a:t>
+            </a:r>
+          </a:p>
+          <a:p>
+            <a:r>
+              <a:rPr lang="fr-FR" sz="1200" dirty="0"/>
+              <a:t>        break</a:t>
+            </a:r>
+          </a:p>
+          <a:p>
+            <a:r>
+              <a:rPr lang="fr-FR" sz="1200" dirty="0"/>
+              <a:t>    </a:t>
+            </a:r>
+            <a:r>
+              <a:rPr lang="fr-FR" sz="1200" dirty="0" err="1"/>
+              <a:t>except</a:t>
+            </a:r>
+            <a:r>
+              <a:rPr lang="fr-FR" sz="1200" dirty="0"/>
+              <a:t>:</a:t>
+            </a:r>
+          </a:p>
+          <a:p>
+            <a:r>
+              <a:rPr lang="fr-FR" sz="1200" dirty="0"/>
+              <a:t>        </a:t>
+            </a:r>
+            <a:r>
+              <a:rPr lang="fr-FR" sz="1200" dirty="0" err="1"/>
+              <a:t>s.close</a:t>
+            </a:r>
+            <a:r>
+              <a:rPr lang="fr-FR" sz="1200" dirty="0"/>
+              <a:t>()</a:t>
+            </a:r>
+          </a:p>
+          <a:p>
+            <a:endParaRPr lang="fr-FR" sz="1200" dirty="0"/>
+          </a:p>
+          <a:p>
+            <a:r>
+              <a:rPr lang="fr-FR" sz="1200" dirty="0"/>
+              <a:t>    if i &gt; 10:</a:t>
+            </a:r>
+          </a:p>
+          <a:p>
+            <a:r>
+              <a:rPr lang="fr-FR" sz="1200" dirty="0"/>
+              <a:t>        </a:t>
+            </a:r>
+            <a:r>
+              <a:rPr lang="fr-FR" sz="1200" dirty="0" err="1"/>
+              <a:t>print</a:t>
+            </a:r>
+            <a:r>
+              <a:rPr lang="fr-FR" sz="1200" dirty="0"/>
+              <a:t>("timeout")</a:t>
+            </a:r>
+          </a:p>
+          <a:p>
+            <a:r>
+              <a:rPr lang="fr-FR" sz="1200" dirty="0"/>
+              <a:t>        break</a:t>
+            </a:r>
+          </a:p>
+          <a:p>
+            <a:r>
+              <a:rPr lang="fr-FR" sz="1200" dirty="0"/>
+              <a:t>    i += 1</a:t>
+            </a:r>
+          </a:p>
+          <a:p>
+            <a:endParaRPr lang="fr-FR" sz="1200" dirty="0"/>
+          </a:p>
+          <a:p>
+            <a:r>
+              <a:rPr lang="fr-FR" sz="1200" dirty="0" err="1" smtClean="0"/>
+              <a:t>s.listen</a:t>
+            </a:r>
+            <a:r>
+              <a:rPr lang="fr-FR" sz="1200" dirty="0" smtClean="0"/>
+              <a:t>(5</a:t>
+            </a:r>
+            <a:r>
+              <a:rPr lang="fr-FR" sz="1200" dirty="0"/>
+              <a:t>)</a:t>
+            </a:r>
+          </a:p>
+          <a:p>
+            <a:r>
+              <a:rPr lang="fr-FR" sz="1200" dirty="0" err="1"/>
+              <a:t>print</a:t>
+            </a:r>
+            <a:r>
+              <a:rPr lang="fr-FR" sz="1200" dirty="0"/>
+              <a:t>('</a:t>
+            </a:r>
+            <a:r>
+              <a:rPr lang="fr-FR" sz="1200" dirty="0" err="1"/>
+              <a:t>Listening</a:t>
+            </a:r>
+            <a:r>
+              <a:rPr lang="fr-FR" sz="1200" dirty="0"/>
+              <a:t> socket</a:t>
+            </a:r>
+            <a:r>
+              <a:rPr lang="fr-FR" sz="1200" dirty="0" smtClean="0"/>
+              <a:t>')</a:t>
+            </a:r>
+            <a:endParaRPr lang="fr-FR" sz="1200" dirty="0"/>
+          </a:p>
+        </p:txBody>
+      </p:sp>
+      <p:sp>
+        <p:nvSpPr>
+          <p:cNvPr id="5" name="Rectangle 4"/>
+          <p:cNvSpPr/>
+          <p:nvPr/>
+        </p:nvSpPr>
+        <p:spPr>
+          <a:xfrm>
+            <a:off x="7685033" y="425165"/>
+            <a:ext cx="3611448" cy="5447645"/>
+          </a:xfrm>
+          <a:prstGeom prst="rect">
+            <a:avLst/>
+          </a:prstGeom>
+          <a:solidFill>
+            <a:schemeClr val="bg1">
+              <a:lumMod val="95000"/>
+            </a:schemeClr>
+          </a:solidFill>
+          <a:ln w="19050">
+            <a:solidFill>
+              <a:srgbClr val="FF0000"/>
+            </a:solidFill>
+          </a:ln>
+        </p:spPr>
+        <p:txBody>
+          <a:bodyPr wrap="square">
+            <a:spAutoFit/>
+          </a:bodyPr>
+          <a:lstStyle/>
+          <a:p>
+            <a:r>
+              <a:rPr lang="fr-FR" sz="1200" dirty="0" err="1" smtClean="0"/>
+              <a:t>def</a:t>
+            </a:r>
+            <a:r>
+              <a:rPr lang="fr-FR" sz="1200" dirty="0" smtClean="0"/>
+              <a:t> </a:t>
+            </a:r>
+            <a:r>
+              <a:rPr lang="fr-FR" sz="1200" dirty="0" err="1"/>
+              <a:t>client_handler</a:t>
+            </a:r>
+            <a:r>
+              <a:rPr lang="fr-FR" sz="1200" dirty="0"/>
+              <a:t>(commande):</a:t>
+            </a:r>
+          </a:p>
+          <a:p>
+            <a:r>
+              <a:rPr lang="fr-FR" sz="1200" dirty="0"/>
+              <a:t>    </a:t>
+            </a:r>
+            <a:r>
+              <a:rPr lang="fr-FR" sz="1200" dirty="0" err="1"/>
+              <a:t>print</a:t>
+            </a:r>
+            <a:r>
+              <a:rPr lang="fr-FR" sz="1200" dirty="0"/>
+              <a:t>("</a:t>
+            </a:r>
+            <a:r>
+              <a:rPr lang="fr-FR" sz="1200" dirty="0" err="1"/>
+              <a:t>client_handler</a:t>
+            </a:r>
+            <a:r>
+              <a:rPr lang="fr-FR" sz="1200" dirty="0"/>
+              <a:t>", commande)</a:t>
+            </a:r>
+          </a:p>
+          <a:p>
+            <a:endParaRPr lang="fr-FR" sz="1200" dirty="0" smtClean="0"/>
+          </a:p>
+          <a:p>
+            <a:r>
+              <a:rPr lang="fr-FR" sz="1200" dirty="0" err="1" smtClean="0"/>
+              <a:t>def</a:t>
+            </a:r>
+            <a:r>
+              <a:rPr lang="fr-FR" sz="1200" dirty="0" smtClean="0"/>
+              <a:t> </a:t>
+            </a:r>
+            <a:r>
+              <a:rPr lang="fr-FR" sz="1200" dirty="0" err="1"/>
+              <a:t>read</a:t>
+            </a:r>
+            <a:r>
+              <a:rPr lang="fr-FR" sz="1200" dirty="0"/>
+              <a:t>(s):</a:t>
+            </a:r>
+          </a:p>
+          <a:p>
+            <a:r>
+              <a:rPr lang="fr-FR" sz="1200" dirty="0"/>
+              <a:t>    r, w, </a:t>
+            </a:r>
+            <a:r>
+              <a:rPr lang="fr-FR" sz="1200" dirty="0" err="1"/>
+              <a:t>err</a:t>
+            </a:r>
+            <a:r>
+              <a:rPr lang="fr-FR" sz="1200" dirty="0"/>
+              <a:t> = </a:t>
+            </a:r>
+            <a:r>
+              <a:rPr lang="fr-FR" sz="1200" dirty="0" err="1"/>
+              <a:t>select.select</a:t>
+            </a:r>
+            <a:r>
+              <a:rPr lang="fr-FR" sz="1200" dirty="0"/>
+              <a:t>((s,), (), (), 1)</a:t>
+            </a:r>
+          </a:p>
+          <a:p>
+            <a:r>
+              <a:rPr lang="fr-FR" sz="1200" dirty="0"/>
+              <a:t>    if not r: return</a:t>
+            </a:r>
+          </a:p>
+          <a:p>
+            <a:r>
+              <a:rPr lang="fr-FR" sz="1200" dirty="0"/>
+              <a:t>    for </a:t>
+            </a:r>
+            <a:r>
+              <a:rPr lang="fr-FR" sz="1200" dirty="0" err="1"/>
+              <a:t>readable</a:t>
+            </a:r>
+            <a:r>
+              <a:rPr lang="fr-FR" sz="1200" dirty="0"/>
+              <a:t> in r:</a:t>
+            </a:r>
+          </a:p>
+          <a:p>
+            <a:r>
+              <a:rPr lang="fr-FR" sz="1200" dirty="0"/>
+              <a:t>        client, </a:t>
+            </a:r>
+            <a:r>
+              <a:rPr lang="fr-FR" sz="1200" dirty="0" err="1"/>
+              <a:t>addr</a:t>
+            </a:r>
+            <a:r>
+              <a:rPr lang="fr-FR" sz="1200" dirty="0"/>
+              <a:t> = </a:t>
+            </a:r>
+            <a:r>
+              <a:rPr lang="fr-FR" sz="1200" dirty="0" err="1"/>
+              <a:t>s.accept</a:t>
+            </a:r>
+            <a:r>
+              <a:rPr lang="fr-FR" sz="1200" dirty="0"/>
+              <a:t>()</a:t>
+            </a:r>
+          </a:p>
+          <a:p>
+            <a:r>
+              <a:rPr lang="fr-FR" sz="1200" dirty="0"/>
+              <a:t>        </a:t>
+            </a:r>
+            <a:r>
+              <a:rPr lang="fr-FR" sz="1200" dirty="0" err="1"/>
+              <a:t>print</a:t>
+            </a:r>
+            <a:r>
+              <a:rPr lang="fr-FR" sz="1200" dirty="0"/>
+              <a:t>('</a:t>
+            </a:r>
+            <a:r>
+              <a:rPr lang="fr-FR" sz="1200" dirty="0" err="1"/>
+              <a:t>Got</a:t>
+            </a:r>
+            <a:r>
+              <a:rPr lang="fr-FR" sz="1200" dirty="0"/>
+              <a:t> data </a:t>
+            </a:r>
+            <a:r>
+              <a:rPr lang="fr-FR" sz="1200" dirty="0" err="1"/>
+              <a:t>from</a:t>
+            </a:r>
+            <a:r>
+              <a:rPr lang="fr-FR" sz="1200" dirty="0"/>
+              <a:t> %s' % </a:t>
+            </a:r>
+            <a:r>
+              <a:rPr lang="fr-FR" sz="1200" dirty="0" err="1"/>
+              <a:t>str</a:t>
+            </a:r>
+            <a:r>
+              <a:rPr lang="fr-FR" sz="1200" dirty="0"/>
+              <a:t>(</a:t>
+            </a:r>
+            <a:r>
+              <a:rPr lang="fr-FR" sz="1200" dirty="0" err="1"/>
+              <a:t>addr</a:t>
+            </a:r>
+            <a:r>
+              <a:rPr lang="fr-FR" sz="1200" dirty="0"/>
+              <a:t>))</a:t>
+            </a:r>
+          </a:p>
+          <a:p>
+            <a:r>
+              <a:rPr lang="fr-FR" sz="1200" dirty="0"/>
+              <a:t>        </a:t>
+            </a:r>
+            <a:r>
+              <a:rPr lang="fr-FR" sz="1200" dirty="0" err="1"/>
+              <a:t>request</a:t>
+            </a:r>
+            <a:r>
+              <a:rPr lang="fr-FR" sz="1200" dirty="0"/>
+              <a:t> = </a:t>
+            </a:r>
+            <a:r>
+              <a:rPr lang="fr-FR" sz="1200" dirty="0" err="1"/>
+              <a:t>client.recv</a:t>
+            </a:r>
+            <a:r>
+              <a:rPr lang="fr-FR" sz="1200" dirty="0"/>
+              <a:t>(2048).</a:t>
+            </a:r>
+            <a:r>
+              <a:rPr lang="fr-FR" sz="1200" dirty="0" err="1"/>
+              <a:t>decode</a:t>
+            </a:r>
+            <a:r>
+              <a:rPr lang="fr-FR" sz="1200" dirty="0"/>
+              <a:t>()</a:t>
+            </a:r>
+          </a:p>
+          <a:p>
+            <a:r>
+              <a:rPr lang="fr-FR" sz="1200" dirty="0"/>
+              <a:t>        </a:t>
+            </a:r>
+            <a:r>
+              <a:rPr lang="fr-FR" sz="1200" dirty="0" err="1"/>
+              <a:t>request</a:t>
+            </a:r>
+            <a:r>
+              <a:rPr lang="fr-FR" sz="1200" dirty="0"/>
+              <a:t> = </a:t>
+            </a:r>
+            <a:r>
+              <a:rPr lang="fr-FR" sz="1200" dirty="0" err="1"/>
+              <a:t>str</a:t>
+            </a:r>
+            <a:r>
+              <a:rPr lang="fr-FR" sz="1200" dirty="0"/>
+              <a:t>(</a:t>
+            </a:r>
+            <a:r>
+              <a:rPr lang="fr-FR" sz="1200" dirty="0" err="1"/>
+              <a:t>request</a:t>
+            </a:r>
+            <a:r>
+              <a:rPr lang="fr-FR" sz="1200" dirty="0"/>
+              <a:t>)</a:t>
+            </a:r>
+          </a:p>
+          <a:p>
+            <a:r>
+              <a:rPr lang="fr-FR" sz="1200" dirty="0"/>
+              <a:t>        l = </a:t>
+            </a:r>
+            <a:r>
+              <a:rPr lang="fr-FR" sz="1200" dirty="0" err="1"/>
+              <a:t>len</a:t>
+            </a:r>
+            <a:r>
+              <a:rPr lang="fr-FR" sz="1200" dirty="0"/>
+              <a:t>(</a:t>
+            </a:r>
+            <a:r>
+              <a:rPr lang="fr-FR" sz="1200" dirty="0" err="1"/>
+              <a:t>request</a:t>
+            </a:r>
+            <a:r>
+              <a:rPr lang="fr-FR" sz="1200" dirty="0"/>
+              <a:t>)</a:t>
+            </a:r>
+          </a:p>
+          <a:p>
+            <a:r>
+              <a:rPr lang="fr-FR" sz="1200" dirty="0"/>
+              <a:t>        pos = </a:t>
+            </a:r>
+            <a:r>
+              <a:rPr lang="fr-FR" sz="1200" dirty="0" err="1"/>
+              <a:t>request.find</a:t>
+            </a:r>
+            <a:r>
+              <a:rPr lang="fr-FR" sz="1200" dirty="0"/>
+              <a:t>("/?LED")</a:t>
+            </a:r>
+          </a:p>
+          <a:p>
+            <a:r>
+              <a:rPr lang="fr-FR" sz="1200" dirty="0"/>
+              <a:t>        if pos &gt; 0:</a:t>
+            </a:r>
+          </a:p>
+          <a:p>
+            <a:r>
+              <a:rPr lang="fr-FR" sz="1200" dirty="0"/>
+              <a:t>            </a:t>
+            </a:r>
+            <a:r>
+              <a:rPr lang="fr-FR" sz="1200" dirty="0" err="1"/>
+              <a:t>request</a:t>
+            </a:r>
+            <a:r>
+              <a:rPr lang="fr-FR" sz="1200" dirty="0"/>
+              <a:t> = </a:t>
+            </a:r>
+            <a:r>
+              <a:rPr lang="fr-FR" sz="1200" dirty="0" err="1"/>
+              <a:t>request</a:t>
+            </a:r>
+            <a:r>
+              <a:rPr lang="fr-FR" sz="1200" dirty="0"/>
+              <a:t>[pos+7:]</a:t>
+            </a:r>
+          </a:p>
+          <a:p>
+            <a:r>
+              <a:rPr lang="fr-FR" sz="1200" dirty="0"/>
+              <a:t>            pos = </a:t>
+            </a:r>
+            <a:r>
+              <a:rPr lang="fr-FR" sz="1200" dirty="0" err="1"/>
+              <a:t>request.find</a:t>
+            </a:r>
+            <a:r>
+              <a:rPr lang="fr-FR" sz="1200" dirty="0"/>
+              <a:t>("&amp;")</a:t>
+            </a:r>
+          </a:p>
+          <a:p>
+            <a:r>
+              <a:rPr lang="fr-FR" sz="1200" dirty="0"/>
+              <a:t>            commande = </a:t>
+            </a:r>
+            <a:r>
+              <a:rPr lang="fr-FR" sz="1200" dirty="0" err="1"/>
+              <a:t>request</a:t>
+            </a:r>
+            <a:r>
+              <a:rPr lang="fr-FR" sz="1200" dirty="0"/>
+              <a:t>[0:pos]</a:t>
+            </a:r>
+          </a:p>
+          <a:p>
+            <a:r>
+              <a:rPr lang="fr-FR" sz="1200" dirty="0"/>
+              <a:t>            </a:t>
+            </a:r>
+            <a:r>
+              <a:rPr lang="fr-FR" sz="1200" dirty="0" err="1"/>
+              <a:t>print</a:t>
+            </a:r>
+            <a:r>
+              <a:rPr lang="fr-FR" sz="1200" dirty="0"/>
+              <a:t>('</a:t>
+            </a:r>
+            <a:r>
+              <a:rPr lang="fr-FR" sz="1200" dirty="0" err="1"/>
+              <a:t>len</a:t>
+            </a:r>
+            <a:r>
+              <a:rPr lang="fr-FR" sz="1200" dirty="0"/>
+              <a:t>={} Content = [{}] '.format(l, </a:t>
+            </a:r>
+            <a:r>
+              <a:rPr lang="fr-FR" sz="1200" dirty="0" err="1"/>
+              <a:t>request</a:t>
+            </a:r>
+            <a:r>
+              <a:rPr lang="fr-FR" sz="1200" dirty="0"/>
+              <a:t>))</a:t>
+            </a:r>
+          </a:p>
+          <a:p>
+            <a:endParaRPr lang="fr-FR" sz="1200" dirty="0"/>
+          </a:p>
+          <a:p>
+            <a:r>
+              <a:rPr lang="fr-FR" sz="1200" dirty="0"/>
+              <a:t>            </a:t>
+            </a:r>
+            <a:r>
+              <a:rPr lang="fr-FR" sz="1200" dirty="0" err="1"/>
+              <a:t>web_page</a:t>
+            </a:r>
+            <a:r>
+              <a:rPr lang="fr-FR" sz="1200" dirty="0"/>
+              <a:t>(client, </a:t>
+            </a:r>
+            <a:r>
+              <a:rPr lang="fr-FR" sz="1200" dirty="0" err="1"/>
+              <a:t>int</a:t>
+            </a:r>
+            <a:r>
+              <a:rPr lang="fr-FR" sz="1200" dirty="0"/>
+              <a:t>(commande))</a:t>
+            </a:r>
+          </a:p>
+          <a:p>
+            <a:r>
+              <a:rPr lang="fr-FR" sz="1200" dirty="0"/>
+              <a:t>            </a:t>
+            </a:r>
+          </a:p>
+          <a:p>
+            <a:r>
+              <a:rPr lang="fr-FR" sz="1200" dirty="0"/>
+              <a:t>            </a:t>
+            </a:r>
+            <a:r>
+              <a:rPr lang="fr-FR" sz="1200" dirty="0" err="1"/>
+              <a:t>client_handler</a:t>
+            </a:r>
+            <a:r>
+              <a:rPr lang="fr-FR" sz="1200" dirty="0"/>
+              <a:t>(commande)</a:t>
+            </a:r>
+          </a:p>
+          <a:p>
+            <a:r>
+              <a:rPr lang="fr-FR" sz="1200" dirty="0"/>
+              <a:t>        </a:t>
+            </a:r>
+            <a:r>
+              <a:rPr lang="fr-FR" sz="1200" dirty="0" err="1"/>
+              <a:t>else</a:t>
+            </a:r>
+            <a:r>
+              <a:rPr lang="fr-FR" sz="1200" dirty="0"/>
+              <a:t>:</a:t>
+            </a:r>
+          </a:p>
+          <a:p>
+            <a:r>
+              <a:rPr lang="fr-FR" sz="1200" dirty="0"/>
+              <a:t>            </a:t>
+            </a:r>
+            <a:r>
+              <a:rPr lang="fr-FR" sz="1200" dirty="0" err="1"/>
+              <a:t>web_page</a:t>
+            </a:r>
+            <a:r>
+              <a:rPr lang="fr-FR" sz="1200" dirty="0"/>
+              <a:t>(client, 0</a:t>
+            </a:r>
+            <a:r>
+              <a:rPr lang="fr-FR" sz="1200" dirty="0" smtClean="0"/>
+              <a:t>)            </a:t>
+            </a:r>
+            <a:endParaRPr lang="fr-FR" sz="1200" dirty="0"/>
+          </a:p>
+          <a:p>
+            <a:r>
+              <a:rPr lang="fr-FR" sz="1200" dirty="0"/>
+              <a:t>            </a:t>
+            </a:r>
+            <a:r>
+              <a:rPr lang="fr-FR" sz="1200" dirty="0" err="1"/>
+              <a:t>print</a:t>
+            </a:r>
+            <a:r>
+              <a:rPr lang="fr-FR" sz="1200" dirty="0"/>
+              <a:t>("no commande")</a:t>
+            </a:r>
+          </a:p>
+          <a:p>
+            <a:endParaRPr lang="fr-FR" sz="1200" dirty="0"/>
+          </a:p>
+          <a:p>
+            <a:r>
+              <a:rPr lang="fr-FR" sz="1200" dirty="0" err="1"/>
+              <a:t>while</a:t>
+            </a:r>
+            <a:r>
+              <a:rPr lang="fr-FR" sz="1200" dirty="0"/>
+              <a:t> </a:t>
+            </a:r>
+            <a:r>
+              <a:rPr lang="fr-FR" sz="1200" dirty="0" err="1"/>
+              <a:t>True</a:t>
+            </a:r>
+            <a:r>
+              <a:rPr lang="fr-FR" sz="1200" dirty="0"/>
+              <a:t>:</a:t>
+            </a:r>
+          </a:p>
+          <a:p>
+            <a:r>
+              <a:rPr lang="fr-FR" sz="1200" dirty="0"/>
+              <a:t>    </a:t>
+            </a:r>
+            <a:r>
+              <a:rPr lang="fr-FR" sz="1200" dirty="0" err="1"/>
+              <a:t>read</a:t>
+            </a:r>
+            <a:r>
+              <a:rPr lang="fr-FR" sz="1200" dirty="0"/>
+              <a:t>(s)</a:t>
+            </a:r>
+          </a:p>
+          <a:p>
+            <a:r>
+              <a:rPr lang="fr-FR" sz="1200" dirty="0"/>
+              <a:t>    </a:t>
+            </a:r>
+            <a:r>
+              <a:rPr lang="fr-FR" sz="1200" dirty="0" err="1"/>
+              <a:t>do_something_else</a:t>
+            </a:r>
+            <a:r>
+              <a:rPr lang="fr-FR" sz="1200" dirty="0" smtClean="0"/>
+              <a:t>()</a:t>
+            </a:r>
+            <a:endParaRPr lang="fr-FR" sz="1200" dirty="0"/>
+          </a:p>
+        </p:txBody>
+      </p:sp>
+      <p:sp>
+        <p:nvSpPr>
+          <p:cNvPr id="7" name="Rectangle 6"/>
+          <p:cNvSpPr/>
+          <p:nvPr/>
+        </p:nvSpPr>
+        <p:spPr>
+          <a:xfrm>
+            <a:off x="1990739" y="5721759"/>
+            <a:ext cx="1753172" cy="890913"/>
+          </a:xfrm>
+          <a:prstGeom prst="wedgeRectCallout">
+            <a:avLst>
+              <a:gd name="adj1" fmla="val -50833"/>
+              <a:gd name="adj2" fmla="val -116965"/>
+            </a:avLst>
+          </a:prstGeom>
+          <a:ln w="12700"/>
+        </p:spPr>
+        <p:style>
+          <a:lnRef idx="1">
+            <a:schemeClr val="accent4"/>
+          </a:lnRef>
+          <a:fillRef idx="2">
+            <a:schemeClr val="accent4"/>
+          </a:fillRef>
+          <a:effectRef idx="1">
+            <a:schemeClr val="accent4"/>
+          </a:effectRef>
+          <a:fontRef idx="minor">
+            <a:schemeClr val="dk1"/>
+          </a:fontRef>
+        </p:style>
+        <p:txBody>
+          <a:bodyPr rtlCol="0" anchor="ctr"/>
+          <a:lstStyle/>
+          <a:p>
+            <a:pPr algn="ctr"/>
+            <a:r>
+              <a:rPr lang="fr-FR" dirty="0" smtClean="0"/>
+              <a:t>Établissement de la connexion</a:t>
+            </a:r>
+            <a:endParaRPr lang="fr-FR" dirty="0"/>
+          </a:p>
+        </p:txBody>
+      </p:sp>
+      <p:sp>
+        <p:nvSpPr>
+          <p:cNvPr id="8" name="Rectangle 7"/>
+          <p:cNvSpPr/>
+          <p:nvPr/>
+        </p:nvSpPr>
+        <p:spPr>
+          <a:xfrm>
+            <a:off x="5041338" y="880566"/>
+            <a:ext cx="2269812" cy="1158635"/>
+          </a:xfrm>
+          <a:prstGeom prst="wedgeRectCallout">
+            <a:avLst>
+              <a:gd name="adj1" fmla="val 65072"/>
+              <a:gd name="adj2" fmla="val -27073"/>
+            </a:avLst>
+          </a:prstGeom>
+          <a:ln w="12700"/>
+        </p:spPr>
+        <p:style>
+          <a:lnRef idx="1">
+            <a:schemeClr val="accent4"/>
+          </a:lnRef>
+          <a:fillRef idx="2">
+            <a:schemeClr val="accent4"/>
+          </a:fillRef>
+          <a:effectRef idx="1">
+            <a:schemeClr val="accent4"/>
+          </a:effectRef>
+          <a:fontRef idx="minor">
+            <a:schemeClr val="dk1"/>
+          </a:fontRef>
+        </p:style>
+        <p:txBody>
+          <a:bodyPr rtlCol="0" anchor="ctr"/>
+          <a:lstStyle/>
+          <a:p>
+            <a:pPr algn="ctr"/>
+            <a:r>
+              <a:rPr lang="fr-FR" dirty="0" smtClean="0"/>
+              <a:t>Lecture non-bloquante des données en provenance du client</a:t>
+            </a:r>
+            <a:endParaRPr lang="fr-FR" dirty="0"/>
+          </a:p>
+        </p:txBody>
+      </p:sp>
+      <p:sp>
+        <p:nvSpPr>
+          <p:cNvPr id="9" name="Rectangle 8"/>
+          <p:cNvSpPr/>
+          <p:nvPr/>
+        </p:nvSpPr>
+        <p:spPr>
+          <a:xfrm>
+            <a:off x="5128501" y="5332260"/>
+            <a:ext cx="2269812" cy="1158635"/>
+          </a:xfrm>
+          <a:prstGeom prst="wedgeRectCallout">
+            <a:avLst>
+              <a:gd name="adj1" fmla="val 67568"/>
+              <a:gd name="adj2" fmla="val -34756"/>
+            </a:avLst>
+          </a:prstGeom>
+          <a:ln w="12700"/>
+        </p:spPr>
+        <p:style>
+          <a:lnRef idx="1">
+            <a:schemeClr val="accent4"/>
+          </a:lnRef>
+          <a:fillRef idx="2">
+            <a:schemeClr val="accent4"/>
+          </a:fillRef>
+          <a:effectRef idx="1">
+            <a:schemeClr val="accent4"/>
+          </a:effectRef>
+          <a:fontRef idx="minor">
+            <a:schemeClr val="dk1"/>
+          </a:fontRef>
+        </p:style>
+        <p:txBody>
+          <a:bodyPr rtlCol="0" anchor="ctr"/>
+          <a:lstStyle/>
+          <a:p>
+            <a:pPr algn="ctr"/>
+            <a:r>
+              <a:rPr lang="fr-FR" dirty="0" smtClean="0"/>
+              <a:t>Lecture non-bloquante du Web ET</a:t>
+            </a:r>
+            <a:r>
+              <a:rPr lang="fr-FR" dirty="0" smtClean="0"/>
+              <a:t> des différents modules</a:t>
+            </a:r>
+            <a:endParaRPr lang="fr-FR" dirty="0"/>
+          </a:p>
+        </p:txBody>
+      </p:sp>
+      <p:sp>
+        <p:nvSpPr>
+          <p:cNvPr id="10" name="Rectangle 9"/>
+          <p:cNvSpPr/>
+          <p:nvPr/>
+        </p:nvSpPr>
+        <p:spPr>
+          <a:xfrm>
+            <a:off x="5041338" y="2292426"/>
+            <a:ext cx="2269812" cy="636891"/>
+          </a:xfrm>
+          <a:prstGeom prst="wedgeRectCallout">
+            <a:avLst>
+              <a:gd name="adj1" fmla="val 78976"/>
+              <a:gd name="adj2" fmla="val 23689"/>
+            </a:avLst>
+          </a:prstGeom>
+          <a:ln w="12700"/>
+        </p:spPr>
+        <p:style>
+          <a:lnRef idx="1">
+            <a:schemeClr val="accent4"/>
+          </a:lnRef>
+          <a:fillRef idx="2">
+            <a:schemeClr val="accent4"/>
+          </a:fillRef>
+          <a:effectRef idx="1">
+            <a:schemeClr val="accent4"/>
+          </a:effectRef>
+          <a:fontRef idx="minor">
+            <a:schemeClr val="dk1"/>
+          </a:fontRef>
+        </p:style>
+        <p:txBody>
+          <a:bodyPr rtlCol="0" anchor="ctr"/>
+          <a:lstStyle/>
+          <a:p>
+            <a:pPr algn="ctr"/>
+            <a:r>
+              <a:rPr lang="fr-FR" dirty="0" smtClean="0"/>
+              <a:t>Décodage des commandes du client</a:t>
+            </a:r>
+            <a:endParaRPr lang="fr-FR" dirty="0"/>
+          </a:p>
+        </p:txBody>
+      </p:sp>
+      <p:sp>
+        <p:nvSpPr>
+          <p:cNvPr id="11" name="Rectangle 10"/>
+          <p:cNvSpPr/>
+          <p:nvPr/>
+        </p:nvSpPr>
+        <p:spPr>
+          <a:xfrm>
+            <a:off x="5128501" y="3359228"/>
+            <a:ext cx="2269812" cy="1196590"/>
+          </a:xfrm>
+          <a:prstGeom prst="wedgeRectCallout">
+            <a:avLst>
+              <a:gd name="adj1" fmla="val 78976"/>
+              <a:gd name="adj2" fmla="val 23689"/>
+            </a:avLst>
+          </a:prstGeom>
+          <a:ln w="12700"/>
+        </p:spPr>
+        <p:style>
+          <a:lnRef idx="1">
+            <a:schemeClr val="accent4"/>
+          </a:lnRef>
+          <a:fillRef idx="2">
+            <a:schemeClr val="accent4"/>
+          </a:fillRef>
+          <a:effectRef idx="1">
+            <a:schemeClr val="accent4"/>
+          </a:effectRef>
+          <a:fontRef idx="minor">
+            <a:schemeClr val="dk1"/>
+          </a:fontRef>
+        </p:style>
+        <p:txBody>
+          <a:bodyPr rtlCol="0" anchor="ctr"/>
+          <a:lstStyle/>
+          <a:p>
+            <a:pPr algn="ctr"/>
+            <a:r>
+              <a:rPr lang="fr-FR" dirty="0" smtClean="0"/>
+              <a:t>Rafraichissement de la page Web du client e</a:t>
+            </a:r>
+            <a:r>
+              <a:rPr lang="fr-FR" dirty="0" smtClean="0"/>
+              <a:t>n fonction des commandes reçues</a:t>
+            </a:r>
+            <a:endParaRPr lang="fr-FR" dirty="0"/>
+          </a:p>
+        </p:txBody>
+      </p:sp>
+    </p:spTree>
+    <p:extLst>
+      <p:ext uri="{BB962C8B-B14F-4D97-AF65-F5344CB8AC3E}">
+        <p14:creationId xmlns:p14="http://schemas.microsoft.com/office/powerpoint/2010/main" val="1801463603"/>
+      </p:ext>
+    </p:extLst>
+  </p:cSld>
+  <p:clrMapOvr>
+    <a:masterClrMapping/>
+  </p:clrMapOvr>
+</p:sld>
+</file>
+
 <file path=ppt/slides/slide2.xml><?xml version="1.0" encoding="utf-8"?>
 <p:sld xmlns:a="http://schemas.openxmlformats.org/drawingml/2006/main" xmlns:r="http://schemas.openxmlformats.org/officeDocument/2006/relationships" xmlns:p="http://schemas.openxmlformats.org/presentationml/2006/main">
   <p:cSld>
@@ -5057,7 +6375,7 @@
         <p:spPr>
           <a:xfrm>
             <a:off x="606176" y="1464656"/>
-            <a:ext cx="6287784" cy="4801314"/>
+            <a:ext cx="6287784" cy="5324535"/>
           </a:xfrm>
           <a:prstGeom prst="rect">
             <a:avLst/>
@@ -5080,14 +6398,14 @@
           <a:lstStyle/>
           <a:p>
             <a:r>
-              <a:rPr lang="fr-FR" sz="900" dirty="0" err="1" smtClean="0">
+              <a:rPr lang="fr-FR" sz="1000" dirty="0" err="1" smtClean="0">
                 <a:latin typeface="Courier New" panose="02070309020205020404" pitchFamily="49" charset="0"/>
                 <a:cs typeface="Courier New" panose="02070309020205020404" pitchFamily="49" charset="0"/>
               </a:rPr>
               <a:t>from</a:t>
             </a:r>
             <a:r>
-              <a:rPr lang="fr-FR" sz="900" dirty="0" smtClean="0">
+              <a:rPr lang="fr-FR" sz="1000" dirty="0" smtClean="0">
                 <a:latin typeface="Courier New" panose="02070309020205020404" pitchFamily="49" charset="0"/>
                 <a:cs typeface="Courier New" panose="02070309020205020404" pitchFamily="49" charset="0"/>
               </a:rPr>
@@ -5096,7 +6414,7 @@
           </a:p>
           <a:p>
             <a:r>
-              <a:rPr lang="fr-FR" sz="900" dirty="0" smtClean="0">
+              <a:rPr lang="fr-FR" sz="1000" dirty="0" smtClean="0">
                 <a:latin typeface="Courier New" panose="02070309020205020404" pitchFamily="49" charset="0"/>
                 <a:cs typeface="Courier New" panose="02070309020205020404" pitchFamily="49" charset="0"/>
               </a:rPr>
@@ -5104,14 +6422,14 @@
             </a:r>
           </a:p>
           <a:p>
-            <a:endParaRPr lang="fr-FR" sz="900" dirty="0" smtClean="0">
+            <a:endParaRPr lang="fr-FR" sz="1000" dirty="0" smtClean="0">
               <a:latin typeface="Courier New" panose="02070309020205020404" pitchFamily="49" charset="0"/>
               <a:cs typeface="Courier New" panose="02070309020205020404" pitchFamily="49" charset="0"/>
             </a:endParaRPr>
           </a:p>
           <a:p>
             <a:r>
-              <a:rPr lang="fr-FR" sz="900" dirty="0" smtClean="0">
+              <a:rPr lang="fr-FR" sz="1000" dirty="0" smtClean="0">
                 <a:latin typeface="Courier New" panose="02070309020205020404" pitchFamily="49" charset="0"/>
                 <a:cs typeface="Courier New" panose="02070309020205020404" pitchFamily="49" charset="0"/>
               </a:rPr>
@@ -5120,63 +6438,63 @@
           </a:p>
           <a:p>
             <a:r>
-              <a:rPr lang="fr-FR" sz="900" dirty="0" smtClean="0">
+              <a:rPr lang="fr-FR" sz="1000" dirty="0" smtClean="0">
                 <a:latin typeface="Courier New" panose="02070309020205020404" pitchFamily="49" charset="0"/>
                 <a:cs typeface="Courier New" panose="02070309020205020404" pitchFamily="49" charset="0"/>
               </a:rPr>
               <a:t>    </a:t>
             </a:r>
             <a:r>
-              <a:rPr lang="fr-FR" sz="900" dirty="0" err="1" smtClean="0">
+              <a:rPr lang="fr-FR" sz="1000" dirty="0" err="1" smtClean="0">
                 <a:latin typeface="Courier New" panose="02070309020205020404" pitchFamily="49" charset="0"/>
                 <a:cs typeface="Courier New" panose="02070309020205020404" pitchFamily="49" charset="0"/>
               </a:rPr>
               <a:t>def</a:t>
             </a:r>
             <a:r>
-              <a:rPr lang="fr-FR" sz="900" dirty="0" smtClean="0">
+              <a:rPr lang="fr-FR" sz="1000" dirty="0" smtClean="0">
                 <a:latin typeface="Courier New" panose="02070309020205020404" pitchFamily="49" charset="0"/>
                 <a:cs typeface="Courier New" panose="02070309020205020404" pitchFamily="49" charset="0"/>
               </a:rPr>
               <a:t> __</a:t>
             </a:r>
             <a:r>
-              <a:rPr lang="fr-FR" sz="900" dirty="0" err="1" smtClean="0">
+              <a:rPr lang="fr-FR" sz="1000" dirty="0" err="1" smtClean="0">
                 <a:latin typeface="Courier New" panose="02070309020205020404" pitchFamily="49" charset="0"/>
                 <a:cs typeface="Courier New" panose="02070309020205020404" pitchFamily="49" charset="0"/>
               </a:rPr>
               <a:t>init</a:t>
             </a:r>
             <a:r>
-              <a:rPr lang="fr-FR" sz="900" dirty="0" smtClean="0">
+              <a:rPr lang="fr-FR" sz="1000" dirty="0" smtClean="0">
                 <a:latin typeface="Courier New" panose="02070309020205020404" pitchFamily="49" charset="0"/>
                 <a:cs typeface="Courier New" panose="02070309020205020404" pitchFamily="49" charset="0"/>
               </a:rPr>
               <a:t>__(self, </a:t>
             </a:r>
             <a:r>
-              <a:rPr lang="fr-FR" sz="900" dirty="0" err="1" smtClean="0">
+              <a:rPr lang="fr-FR" sz="1000" dirty="0" err="1" smtClean="0">
                 <a:latin typeface="Courier New" panose="02070309020205020404" pitchFamily="49" charset="0"/>
                 <a:cs typeface="Courier New" panose="02070309020205020404" pitchFamily="49" charset="0"/>
               </a:rPr>
               <a:t>pin_echo</a:t>
             </a:r>
             <a:r>
-              <a:rPr lang="fr-FR" sz="900" dirty="0" smtClean="0">
+              <a:rPr lang="fr-FR" sz="1000" dirty="0" smtClean="0">
                 <a:latin typeface="Courier New" panose="02070309020205020404" pitchFamily="49" charset="0"/>
                 <a:cs typeface="Courier New" panose="02070309020205020404" pitchFamily="49" charset="0"/>
               </a:rPr>
               <a:t>, </a:t>
             </a:r>
             <a:r>
-              <a:rPr lang="fr-FR" sz="900" dirty="0" err="1" smtClean="0">
+              <a:rPr lang="fr-FR" sz="1000" dirty="0" err="1" smtClean="0">
                 <a:latin typeface="Courier New" panose="02070309020205020404" pitchFamily="49" charset="0"/>
                 <a:cs typeface="Courier New" panose="02070309020205020404" pitchFamily="49" charset="0"/>
               </a:rPr>
               <a:t>pin_trig</a:t>
             </a:r>
             <a:r>
-              <a:rPr lang="fr-FR" sz="900" dirty="0" smtClean="0">
+              <a:rPr lang="fr-FR" sz="1000" dirty="0" smtClean="0">
                 <a:latin typeface="Courier New" panose="02070309020205020404" pitchFamily="49" charset="0"/>
                 <a:cs typeface="Courier New" panose="02070309020205020404" pitchFamily="49" charset="0"/>
               </a:rPr>
@@ -5185,97 +6503,97 @@
           </a:p>
           <a:p>
             <a:r>
-              <a:rPr lang="fr-FR" sz="900" dirty="0" smtClean="0">
+              <a:rPr lang="fr-FR" sz="1000" dirty="0" smtClean="0">
                 <a:latin typeface="Courier New" panose="02070309020205020404" pitchFamily="49" charset="0"/>
                 <a:cs typeface="Courier New" panose="02070309020205020404" pitchFamily="49" charset="0"/>
               </a:rPr>
               <a:t>        </a:t>
             </a:r>
             <a:r>
-              <a:rPr lang="fr-FR" sz="900" dirty="0" err="1" smtClean="0">
+              <a:rPr lang="fr-FR" sz="1000" dirty="0" err="1" smtClean="0">
                 <a:latin typeface="Courier New" panose="02070309020205020404" pitchFamily="49" charset="0"/>
                 <a:cs typeface="Courier New" panose="02070309020205020404" pitchFamily="49" charset="0"/>
               </a:rPr>
               <a:t>self.pin_echo</a:t>
             </a:r>
             <a:r>
-              <a:rPr lang="fr-FR" sz="900" dirty="0" smtClean="0">
+              <a:rPr lang="fr-FR" sz="1000" dirty="0" smtClean="0">
                 <a:latin typeface="Courier New" panose="02070309020205020404" pitchFamily="49" charset="0"/>
                 <a:cs typeface="Courier New" panose="02070309020205020404" pitchFamily="49" charset="0"/>
               </a:rPr>
               <a:t> = </a:t>
             </a:r>
             <a:r>
-              <a:rPr lang="fr-FR" sz="900" dirty="0" err="1" smtClean="0">
+              <a:rPr lang="fr-FR" sz="1000" dirty="0" err="1" smtClean="0">
                 <a:latin typeface="Courier New" panose="02070309020205020404" pitchFamily="49" charset="0"/>
                 <a:cs typeface="Courier New" panose="02070309020205020404" pitchFamily="49" charset="0"/>
               </a:rPr>
               <a:t>pin_echo</a:t>
             </a:r>
-            <a:endParaRPr lang="fr-FR" sz="900" dirty="0" smtClean="0">
+            <a:endParaRPr lang="fr-FR" sz="1000" dirty="0" smtClean="0">
               <a:latin typeface="Courier New" panose="02070309020205020404" pitchFamily="49" charset="0"/>
               <a:cs typeface="Courier New" panose="02070309020205020404" pitchFamily="49" charset="0"/>
             </a:endParaRPr>
           </a:p>
           <a:p>
             <a:r>
-              <a:rPr lang="fr-FR" sz="900" dirty="0" smtClean="0">
+              <a:rPr lang="fr-FR" sz="1000" dirty="0" smtClean="0">
                 <a:latin typeface="Courier New" panose="02070309020205020404" pitchFamily="49" charset="0"/>
                 <a:cs typeface="Courier New" panose="02070309020205020404" pitchFamily="49" charset="0"/>
               </a:rPr>
               <a:t>        </a:t>
             </a:r>
             <a:r>
-              <a:rPr lang="fr-FR" sz="900" dirty="0" err="1" smtClean="0">
+              <a:rPr lang="fr-FR" sz="1000" dirty="0" err="1" smtClean="0">
                 <a:latin typeface="Courier New" panose="02070309020205020404" pitchFamily="49" charset="0"/>
                 <a:cs typeface="Courier New" panose="02070309020205020404" pitchFamily="49" charset="0"/>
               </a:rPr>
               <a:t>self.pin_trig</a:t>
             </a:r>
             <a:r>
-              <a:rPr lang="fr-FR" sz="900" dirty="0" smtClean="0">
+              <a:rPr lang="fr-FR" sz="1000" dirty="0" smtClean="0">
                 <a:latin typeface="Courier New" panose="02070309020205020404" pitchFamily="49" charset="0"/>
                 <a:cs typeface="Courier New" panose="02070309020205020404" pitchFamily="49" charset="0"/>
               </a:rPr>
               <a:t> = Pin(</a:t>
             </a:r>
             <a:r>
-              <a:rPr lang="fr-FR" sz="900" dirty="0" err="1" smtClean="0">
+              <a:rPr lang="fr-FR" sz="1000" dirty="0" err="1" smtClean="0">
                 <a:latin typeface="Courier New" panose="02070309020205020404" pitchFamily="49" charset="0"/>
                 <a:cs typeface="Courier New" panose="02070309020205020404" pitchFamily="49" charset="0"/>
               </a:rPr>
               <a:t>pin_trig</a:t>
             </a:r>
             <a:r>
-              <a:rPr lang="fr-FR" sz="900" dirty="0" smtClean="0">
+              <a:rPr lang="fr-FR" sz="1000" dirty="0" smtClean="0">
                 <a:latin typeface="Courier New" panose="02070309020205020404" pitchFamily="49" charset="0"/>
                 <a:cs typeface="Courier New" panose="02070309020205020404" pitchFamily="49" charset="0"/>
               </a:rPr>
               <a:t>, </a:t>
             </a:r>
             <a:r>
-              <a:rPr lang="fr-FR" sz="900" dirty="0" err="1" smtClean="0">
+              <a:rPr lang="fr-FR" sz="1000" dirty="0" err="1" smtClean="0">
                 <a:latin typeface="Courier New" panose="02070309020205020404" pitchFamily="49" charset="0"/>
                 <a:cs typeface="Courier New" panose="02070309020205020404" pitchFamily="49" charset="0"/>
               </a:rPr>
               <a:t>Pin.OUT</a:t>
             </a:r>
             <a:r>
-              <a:rPr lang="fr-FR" sz="900" dirty="0" smtClean="0">
+              <a:rPr lang="fr-FR" sz="1000" dirty="0" smtClean="0">
                 <a:latin typeface="Courier New" panose="02070309020205020404" pitchFamily="49" charset="0"/>
                 <a:cs typeface="Courier New" panose="02070309020205020404" pitchFamily="49" charset="0"/>
               </a:rPr>
               <a:t>)  # </a:t>
             </a:r>
             <a:r>
-              <a:rPr lang="fr-FR" sz="900" dirty="0" err="1" smtClean="0">
+              <a:rPr lang="fr-FR" sz="1000" dirty="0" err="1" smtClean="0">
                 <a:latin typeface="Courier New" panose="02070309020205020404" pitchFamily="49" charset="0"/>
                 <a:cs typeface="Courier New" panose="02070309020205020404" pitchFamily="49" charset="0"/>
               </a:rPr>
               <a:t>definit</a:t>
             </a:r>
             <a:r>
-              <a:rPr lang="fr-FR" sz="900" dirty="0" smtClean="0">
+              <a:rPr lang="fr-FR" sz="1000" dirty="0" smtClean="0">
                 <a:latin typeface="Courier New" panose="02070309020205020404" pitchFamily="49" charset="0"/>
                 <a:cs typeface="Courier New" panose="02070309020205020404" pitchFamily="49" charset="0"/>
               </a:rPr>
@@ -5284,83 +6602,83 @@
           </a:p>
           <a:p>
             <a:r>
-              <a:rPr lang="fr-FR" sz="900" dirty="0" smtClean="0">
+              <a:rPr lang="fr-FR" sz="1000" dirty="0" smtClean="0">
                 <a:latin typeface="Courier New" panose="02070309020205020404" pitchFamily="49" charset="0"/>
                 <a:cs typeface="Courier New" panose="02070309020205020404" pitchFamily="49" charset="0"/>
               </a:rPr>
               <a:t>        </a:t>
             </a:r>
             <a:r>
-              <a:rPr lang="fr-FR" sz="900" dirty="0" err="1" smtClean="0">
+              <a:rPr lang="fr-FR" sz="1000" dirty="0" err="1" smtClean="0">
                 <a:latin typeface="Courier New" panose="02070309020205020404" pitchFamily="49" charset="0"/>
                 <a:cs typeface="Courier New" panose="02070309020205020404" pitchFamily="49" charset="0"/>
               </a:rPr>
               <a:t>self.pin_echo</a:t>
             </a:r>
             <a:r>
-              <a:rPr lang="fr-FR" sz="900" dirty="0" smtClean="0">
+              <a:rPr lang="fr-FR" sz="1000" dirty="0" smtClean="0">
                 <a:latin typeface="Courier New" panose="02070309020205020404" pitchFamily="49" charset="0"/>
                 <a:cs typeface="Courier New" panose="02070309020205020404" pitchFamily="49" charset="0"/>
               </a:rPr>
               <a:t> = Pin(</a:t>
             </a:r>
             <a:r>
-              <a:rPr lang="fr-FR" sz="900" dirty="0" err="1" smtClean="0">
+              <a:rPr lang="fr-FR" sz="1000" dirty="0" err="1" smtClean="0">
                 <a:latin typeface="Courier New" panose="02070309020205020404" pitchFamily="49" charset="0"/>
                 <a:cs typeface="Courier New" panose="02070309020205020404" pitchFamily="49" charset="0"/>
               </a:rPr>
               <a:t>pin_echo</a:t>
             </a:r>
             <a:r>
-              <a:rPr lang="fr-FR" sz="900" dirty="0" smtClean="0">
+              <a:rPr lang="fr-FR" sz="1000" dirty="0" smtClean="0">
                 <a:latin typeface="Courier New" panose="02070309020205020404" pitchFamily="49" charset="0"/>
                 <a:cs typeface="Courier New" panose="02070309020205020404" pitchFamily="49" charset="0"/>
               </a:rPr>
               <a:t>, Pin.IN)  # </a:t>
             </a:r>
             <a:r>
-              <a:rPr lang="fr-FR" sz="900" dirty="0" err="1" smtClean="0">
+              <a:rPr lang="fr-FR" sz="1000" dirty="0" err="1" smtClean="0">
                 <a:latin typeface="Courier New" panose="02070309020205020404" pitchFamily="49" charset="0"/>
                 <a:cs typeface="Courier New" panose="02070309020205020404" pitchFamily="49" charset="0"/>
               </a:rPr>
               <a:t>definit</a:t>
             </a:r>
             <a:r>
-              <a:rPr lang="fr-FR" sz="900" dirty="0" smtClean="0">
+              <a:rPr lang="fr-FR" sz="1000" dirty="0" smtClean="0">
                 <a:latin typeface="Courier New" panose="02070309020205020404" pitchFamily="49" charset="0"/>
                 <a:cs typeface="Courier New" panose="02070309020205020404" pitchFamily="49" charset="0"/>
               </a:rPr>
               <a:t> la broche ECHO en </a:t>
             </a:r>
             <a:r>
-              <a:rPr lang="fr-FR" sz="900" dirty="0" err="1" smtClean="0">
+              <a:rPr lang="fr-FR" sz="1000" dirty="0" err="1" smtClean="0">
                 <a:latin typeface="Courier New" panose="02070309020205020404" pitchFamily="49" charset="0"/>
                 <a:cs typeface="Courier New" panose="02070309020205020404" pitchFamily="49" charset="0"/>
               </a:rPr>
               <a:t>entree</a:t>
             </a:r>
-            <a:endParaRPr lang="fr-FR" sz="900" dirty="0" smtClean="0">
+            <a:endParaRPr lang="fr-FR" sz="1000" dirty="0" smtClean="0">
               <a:latin typeface="Courier New" panose="02070309020205020404" pitchFamily="49" charset="0"/>
               <a:cs typeface="Courier New" panose="02070309020205020404" pitchFamily="49" charset="0"/>
             </a:endParaRPr>
           </a:p>
           <a:p>
             <a:r>
-              <a:rPr lang="fr-FR" sz="900" dirty="0" smtClean="0">
+              <a:rPr lang="fr-FR" sz="1000" dirty="0" smtClean="0">
                 <a:latin typeface="Courier New" panose="02070309020205020404" pitchFamily="49" charset="0"/>
                 <a:cs typeface="Courier New" panose="02070309020205020404" pitchFamily="49" charset="0"/>
               </a:rPr>
               <a:t>        </a:t>
             </a:r>
             <a:r>
-              <a:rPr lang="fr-FR" sz="900" dirty="0" err="1" smtClean="0">
+              <a:rPr lang="fr-FR" sz="1000" dirty="0" err="1" smtClean="0">
                 <a:latin typeface="Courier New" panose="02070309020205020404" pitchFamily="49" charset="0"/>
                 <a:cs typeface="Courier New" panose="02070309020205020404" pitchFamily="49" charset="0"/>
               </a:rPr>
               <a:t>self.pin_trig.off</a:t>
             </a:r>
             <a:r>
-              <a:rPr lang="fr-FR" sz="900" dirty="0" smtClean="0">
+              <a:rPr lang="fr-FR" sz="1000" dirty="0" smtClean="0">
                 <a:latin typeface="Courier New" panose="02070309020205020404" pitchFamily="49" charset="0"/>
                 <a:cs typeface="Courier New" panose="02070309020205020404" pitchFamily="49" charset="0"/>
               </a:rPr>
@@ -5369,49 +6687,49 @@
           </a:p>
           <a:p>
             <a:r>
-              <a:rPr lang="fr-FR" sz="900" dirty="0" smtClean="0">
+              <a:rPr lang="fr-FR" sz="1000" dirty="0" smtClean="0">
                 <a:latin typeface="Courier New" panose="02070309020205020404" pitchFamily="49" charset="0"/>
                 <a:cs typeface="Courier New" panose="02070309020205020404" pitchFamily="49" charset="0"/>
               </a:rPr>
               <a:t>        # on </a:t>
             </a:r>
             <a:r>
-              <a:rPr lang="fr-FR" sz="900" dirty="0" err="1" smtClean="0">
+              <a:rPr lang="fr-FR" sz="1000" dirty="0" err="1" smtClean="0">
                 <a:latin typeface="Courier New" panose="02070309020205020404" pitchFamily="49" charset="0"/>
                 <a:cs typeface="Courier New" panose="02070309020205020404" pitchFamily="49" charset="0"/>
               </a:rPr>
               <a:t>definit</a:t>
             </a:r>
             <a:r>
-              <a:rPr lang="fr-FR" sz="900" dirty="0" smtClean="0">
+              <a:rPr lang="fr-FR" sz="1000" dirty="0" smtClean="0">
                 <a:latin typeface="Courier New" panose="02070309020205020404" pitchFamily="49" charset="0"/>
                 <a:cs typeface="Courier New" panose="02070309020205020404" pitchFamily="49" charset="0"/>
               </a:rPr>
               <a:t> un Timeout si le retour </a:t>
             </a:r>
             <a:r>
-              <a:rPr lang="fr-FR" sz="900" dirty="0" err="1" smtClean="0">
+              <a:rPr lang="fr-FR" sz="1000" dirty="0" err="1" smtClean="0">
                 <a:latin typeface="Courier New" panose="02070309020205020404" pitchFamily="49" charset="0"/>
                 <a:cs typeface="Courier New" panose="02070309020205020404" pitchFamily="49" charset="0"/>
               </a:rPr>
               <a:t>echo</a:t>
             </a:r>
             <a:r>
-              <a:rPr lang="fr-FR" sz="900" dirty="0" smtClean="0">
+              <a:rPr lang="fr-FR" sz="1000" dirty="0" smtClean="0">
                 <a:latin typeface="Courier New" panose="02070309020205020404" pitchFamily="49" charset="0"/>
                 <a:cs typeface="Courier New" panose="02070309020205020404" pitchFamily="49" charset="0"/>
               </a:rPr>
               <a:t> </a:t>
             </a:r>
             <a:r>
-              <a:rPr lang="fr-FR" sz="900" dirty="0" err="1" smtClean="0">
+              <a:rPr lang="fr-FR" sz="1000" dirty="0" err="1" smtClean="0">
                 <a:latin typeface="Courier New" panose="02070309020205020404" pitchFamily="49" charset="0"/>
                 <a:cs typeface="Courier New" panose="02070309020205020404" pitchFamily="49" charset="0"/>
               </a:rPr>
               <a:t>depasse</a:t>
             </a:r>
             <a:r>
-              <a:rPr lang="fr-FR" sz="900" dirty="0" smtClean="0">
+              <a:rPr lang="fr-FR" sz="1000" dirty="0" smtClean="0">
                 <a:latin typeface="Courier New" panose="02070309020205020404" pitchFamily="49" charset="0"/>
                 <a:cs typeface="Courier New" panose="02070309020205020404" pitchFamily="49" charset="0"/>
               </a:rPr>
@@ -5420,7 +6738,7 @@
           </a:p>
           <a:p>
             <a:r>
-              <a:rPr lang="fr-FR" sz="900" dirty="0" smtClean="0">
+              <a:rPr lang="fr-FR" sz="1000" dirty="0" smtClean="0">
                 <a:latin typeface="Courier New" panose="02070309020205020404" pitchFamily="49" charset="0"/>
                 <a:cs typeface="Courier New" panose="02070309020205020404" pitchFamily="49" charset="0"/>
               </a:rPr>
@@ -5429,35 +6747,35 @@
           </a:p>
           <a:p>
             <a:r>
-              <a:rPr lang="fr-FR" sz="900" dirty="0" smtClean="0">
+              <a:rPr lang="fr-FR" sz="1000" dirty="0" smtClean="0">
                 <a:latin typeface="Courier New" panose="02070309020205020404" pitchFamily="49" charset="0"/>
                 <a:cs typeface="Courier New" panose="02070309020205020404" pitchFamily="49" charset="0"/>
               </a:rPr>
               <a:t>        </a:t>
             </a:r>
             <a:r>
-              <a:rPr lang="fr-FR" sz="900" dirty="0" err="1" smtClean="0">
+              <a:rPr lang="fr-FR" sz="1000" dirty="0" err="1" smtClean="0">
                 <a:latin typeface="Courier New" panose="02070309020205020404" pitchFamily="49" charset="0"/>
                 <a:cs typeface="Courier New" panose="02070309020205020404" pitchFamily="49" charset="0"/>
               </a:rPr>
               <a:t>tmo</a:t>
             </a:r>
             <a:r>
-              <a:rPr lang="fr-FR" sz="900" dirty="0" smtClean="0">
+              <a:rPr lang="fr-FR" sz="1000" dirty="0" smtClean="0">
                 <a:latin typeface="Courier New" panose="02070309020205020404" pitchFamily="49" charset="0"/>
                 <a:cs typeface="Courier New" panose="02070309020205020404" pitchFamily="49" charset="0"/>
               </a:rPr>
               <a:t> = </a:t>
             </a:r>
             <a:r>
-              <a:rPr lang="fr-FR" sz="900" dirty="0" err="1" smtClean="0">
+              <a:rPr lang="fr-FR" sz="1000" dirty="0" err="1" smtClean="0">
                 <a:latin typeface="Courier New" panose="02070309020205020404" pitchFamily="49" charset="0"/>
                 <a:cs typeface="Courier New" panose="02070309020205020404" pitchFamily="49" charset="0"/>
               </a:rPr>
               <a:t>int</a:t>
             </a:r>
             <a:r>
-              <a:rPr lang="fr-FR" sz="900" dirty="0" smtClean="0">
+              <a:rPr lang="fr-FR" sz="1000" dirty="0" smtClean="0">
                 <a:latin typeface="Courier New" panose="02070309020205020404" pitchFamily="49" charset="0"/>
                 <a:cs typeface="Courier New" panose="02070309020205020404" pitchFamily="49" charset="0"/>
               </a:rPr>
@@ -5466,75 +6784,75 @@
           </a:p>
           <a:p>
             <a:r>
-              <a:rPr lang="fr-FR" sz="900" dirty="0" smtClean="0">
+              <a:rPr lang="fr-FR" sz="1000" dirty="0" smtClean="0">
                 <a:latin typeface="Courier New" panose="02070309020205020404" pitchFamily="49" charset="0"/>
                 <a:cs typeface="Courier New" panose="02070309020205020404" pitchFamily="49" charset="0"/>
               </a:rPr>
               <a:t>        </a:t>
             </a:r>
             <a:r>
-              <a:rPr lang="fr-FR" sz="900" dirty="0" err="1" smtClean="0">
+              <a:rPr lang="fr-FR" sz="1000" dirty="0" err="1" smtClean="0">
                 <a:latin typeface="Courier New" panose="02070309020205020404" pitchFamily="49" charset="0"/>
                 <a:cs typeface="Courier New" panose="02070309020205020404" pitchFamily="49" charset="0"/>
               </a:rPr>
               <a:t>self.tmo</a:t>
             </a:r>
             <a:r>
-              <a:rPr lang="fr-FR" sz="900" dirty="0" smtClean="0">
+              <a:rPr lang="fr-FR" sz="1000" dirty="0" smtClean="0">
                 <a:latin typeface="Courier New" panose="02070309020205020404" pitchFamily="49" charset="0"/>
                 <a:cs typeface="Courier New" panose="02070309020205020404" pitchFamily="49" charset="0"/>
               </a:rPr>
               <a:t> = </a:t>
             </a:r>
             <a:r>
-              <a:rPr lang="fr-FR" sz="900" dirty="0" err="1" smtClean="0">
+              <a:rPr lang="fr-FR" sz="1000" dirty="0" err="1" smtClean="0">
                 <a:latin typeface="Courier New" panose="02070309020205020404" pitchFamily="49" charset="0"/>
                 <a:cs typeface="Courier New" panose="02070309020205020404" pitchFamily="49" charset="0"/>
               </a:rPr>
               <a:t>tmo</a:t>
             </a:r>
-            <a:endParaRPr lang="fr-FR" sz="900" dirty="0" smtClean="0">
+            <a:endParaRPr lang="fr-FR" sz="1000" dirty="0" smtClean="0">
               <a:latin typeface="Courier New" panose="02070309020205020404" pitchFamily="49" charset="0"/>
               <a:cs typeface="Courier New" panose="02070309020205020404" pitchFamily="49" charset="0"/>
             </a:endParaRPr>
           </a:p>
           <a:p>
-            <a:endParaRPr lang="fr-FR" sz="900" dirty="0" smtClean="0">
+            <a:endParaRPr lang="fr-FR" sz="1000" dirty="0" smtClean="0">
               <a:latin typeface="Courier New" panose="02070309020205020404" pitchFamily="49" charset="0"/>
               <a:cs typeface="Courier New" panose="02070309020205020404" pitchFamily="49" charset="0"/>
             </a:endParaRPr>
           </a:p>
           <a:p>
             <a:r>
-              <a:rPr lang="fr-FR" sz="900" dirty="0" smtClean="0">
+              <a:rPr lang="fr-FR" sz="1000" dirty="0" smtClean="0">
                 <a:latin typeface="Courier New" panose="02070309020205020404" pitchFamily="49" charset="0"/>
                 <a:cs typeface="Courier New" panose="02070309020205020404" pitchFamily="49" charset="0"/>
               </a:rPr>
               <a:t>    </a:t>
             </a:r>
             <a:r>
-              <a:rPr lang="fr-FR" sz="900" dirty="0" err="1" smtClean="0">
+              <a:rPr lang="fr-FR" sz="1000" dirty="0" err="1" smtClean="0">
                 <a:latin typeface="Courier New" panose="02070309020205020404" pitchFamily="49" charset="0"/>
                 <a:cs typeface="Courier New" panose="02070309020205020404" pitchFamily="49" charset="0"/>
               </a:rPr>
               <a:t>def</a:t>
             </a:r>
             <a:r>
-              <a:rPr lang="fr-FR" sz="900" dirty="0" smtClean="0">
+              <a:rPr lang="fr-FR" sz="1000" dirty="0" smtClean="0">
                 <a:latin typeface="Courier New" panose="02070309020205020404" pitchFamily="49" charset="0"/>
                 <a:cs typeface="Courier New" panose="02070309020205020404" pitchFamily="49" charset="0"/>
               </a:rPr>
               <a:t> </a:t>
             </a:r>
             <a:r>
-              <a:rPr lang="fr-FR" sz="900" dirty="0" err="1" smtClean="0">
+              <a:rPr lang="fr-FR" sz="1000" dirty="0" err="1" smtClean="0">
                 <a:latin typeface="Courier New" panose="02070309020205020404" pitchFamily="49" charset="0"/>
                 <a:cs typeface="Courier New" panose="02070309020205020404" pitchFamily="49" charset="0"/>
               </a:rPr>
               <a:t>lecture_distance</a:t>
             </a:r>
             <a:r>
-              <a:rPr lang="fr-FR" sz="900" dirty="0" smtClean="0">
+              <a:rPr lang="fr-FR" sz="1000" dirty="0" smtClean="0">
                 <a:latin typeface="Courier New" panose="02070309020205020404" pitchFamily="49" charset="0"/>
                 <a:cs typeface="Courier New" panose="02070309020205020404" pitchFamily="49" charset="0"/>
               </a:rPr>
@@ -5543,21 +6861,21 @@
           </a:p>
           <a:p>
             <a:r>
-              <a:rPr lang="fr-FR" sz="900" dirty="0" smtClean="0">
+              <a:rPr lang="fr-FR" sz="1000" dirty="0" smtClean="0">
                 <a:latin typeface="Courier New" panose="02070309020205020404" pitchFamily="49" charset="0"/>
                 <a:cs typeface="Courier New" panose="02070309020205020404" pitchFamily="49" charset="0"/>
               </a:rPr>
               <a:t>        </a:t>
             </a:r>
             <a:r>
-              <a:rPr lang="fr-FR" sz="900" dirty="0" err="1" smtClean="0">
+              <a:rPr lang="fr-FR" sz="1000" dirty="0" err="1" smtClean="0">
                 <a:latin typeface="Courier New" panose="02070309020205020404" pitchFamily="49" charset="0"/>
                 <a:cs typeface="Courier New" panose="02070309020205020404" pitchFamily="49" charset="0"/>
               </a:rPr>
               <a:t>self.pin_trig.off</a:t>
             </a:r>
             <a:r>
-              <a:rPr lang="fr-FR" sz="900" dirty="0" smtClean="0">
+              <a:rPr lang="fr-FR" sz="1000" dirty="0" smtClean="0">
                 <a:latin typeface="Courier New" panose="02070309020205020404" pitchFamily="49" charset="0"/>
                 <a:cs typeface="Courier New" panose="02070309020205020404" pitchFamily="49" charset="0"/>
               </a:rPr>
@@ -5566,21 +6884,21 @@
           </a:p>
           <a:p>
             <a:r>
-              <a:rPr lang="fr-FR" sz="900" dirty="0" smtClean="0">
+              <a:rPr lang="fr-FR" sz="1000" dirty="0" smtClean="0">
                 <a:latin typeface="Courier New" panose="02070309020205020404" pitchFamily="49" charset="0"/>
                 <a:cs typeface="Courier New" panose="02070309020205020404" pitchFamily="49" charset="0"/>
               </a:rPr>
               <a:t>        </a:t>
             </a:r>
             <a:r>
-              <a:rPr lang="fr-FR" sz="900" dirty="0" err="1" smtClean="0">
+              <a:rPr lang="fr-FR" sz="1000" dirty="0" err="1" smtClean="0">
                 <a:latin typeface="Courier New" panose="02070309020205020404" pitchFamily="49" charset="0"/>
                 <a:cs typeface="Courier New" panose="02070309020205020404" pitchFamily="49" charset="0"/>
               </a:rPr>
               <a:t>time.sleep_us</a:t>
             </a:r>
             <a:r>
-              <a:rPr lang="fr-FR" sz="900" dirty="0" smtClean="0">
+              <a:rPr lang="fr-FR" sz="1000" dirty="0" smtClean="0">
                 <a:latin typeface="Courier New" panose="02070309020205020404" pitchFamily="49" charset="0"/>
                 <a:cs typeface="Courier New" panose="02070309020205020404" pitchFamily="49" charset="0"/>
               </a:rPr>
@@ -5589,21 +6907,21 @@
           </a:p>
           <a:p>
             <a:r>
-              <a:rPr lang="fr-FR" sz="900" dirty="0" smtClean="0">
+              <a:rPr lang="fr-FR" sz="1000" dirty="0" smtClean="0">
                 <a:latin typeface="Courier New" panose="02070309020205020404" pitchFamily="49" charset="0"/>
                 <a:cs typeface="Courier New" panose="02070309020205020404" pitchFamily="49" charset="0"/>
               </a:rPr>
               <a:t>        </a:t>
             </a:r>
             <a:r>
-              <a:rPr lang="fr-FR" sz="900" dirty="0" err="1" smtClean="0">
+              <a:rPr lang="fr-FR" sz="1000" dirty="0" err="1" smtClean="0">
                 <a:latin typeface="Courier New" panose="02070309020205020404" pitchFamily="49" charset="0"/>
                 <a:cs typeface="Courier New" panose="02070309020205020404" pitchFamily="49" charset="0"/>
               </a:rPr>
               <a:t>self.pin_trig.on</a:t>
             </a:r>
             <a:r>
-              <a:rPr lang="fr-FR" sz="900" dirty="0" smtClean="0">
+              <a:rPr lang="fr-FR" sz="1000" dirty="0" smtClean="0">
                 <a:latin typeface="Courier New" panose="02070309020205020404" pitchFamily="49" charset="0"/>
                 <a:cs typeface="Courier New" panose="02070309020205020404" pitchFamily="49" charset="0"/>
               </a:rPr>
@@ -5612,21 +6930,21 @@
           </a:p>
           <a:p>
             <a:r>
-              <a:rPr lang="fr-FR" sz="900" dirty="0" smtClean="0">
+              <a:rPr lang="fr-FR" sz="1000" dirty="0" smtClean="0">
                 <a:latin typeface="Courier New" panose="02070309020205020404" pitchFamily="49" charset="0"/>
                 <a:cs typeface="Courier New" panose="02070309020205020404" pitchFamily="49" charset="0"/>
               </a:rPr>
               <a:t>        </a:t>
             </a:r>
             <a:r>
-              <a:rPr lang="fr-FR" sz="900" dirty="0" err="1" smtClean="0">
+              <a:rPr lang="fr-FR" sz="1000" dirty="0" err="1" smtClean="0">
                 <a:latin typeface="Courier New" panose="02070309020205020404" pitchFamily="49" charset="0"/>
                 <a:cs typeface="Courier New" panose="02070309020205020404" pitchFamily="49" charset="0"/>
               </a:rPr>
               <a:t>time.sleep_us</a:t>
             </a:r>
             <a:r>
-              <a:rPr lang="fr-FR" sz="900" dirty="0" smtClean="0">
+              <a:rPr lang="fr-FR" sz="1000" dirty="0" smtClean="0">
                 <a:latin typeface="Courier New" panose="02070309020205020404" pitchFamily="49" charset="0"/>
                 <a:cs typeface="Courier New" panose="02070309020205020404" pitchFamily="49" charset="0"/>
               </a:rPr>
@@ -5635,21 +6953,21 @@
           </a:p>
           <a:p>
             <a:r>
-              <a:rPr lang="fr-FR" sz="900" dirty="0" smtClean="0">
+              <a:rPr lang="fr-FR" sz="1000" dirty="0" smtClean="0">
                 <a:latin typeface="Courier New" panose="02070309020205020404" pitchFamily="49" charset="0"/>
                 <a:cs typeface="Courier New" panose="02070309020205020404" pitchFamily="49" charset="0"/>
               </a:rPr>
               <a:t>        </a:t>
             </a:r>
             <a:r>
-              <a:rPr lang="fr-FR" sz="900" dirty="0" err="1" smtClean="0">
+              <a:rPr lang="fr-FR" sz="1000" dirty="0" err="1" smtClean="0">
                 <a:latin typeface="Courier New" panose="02070309020205020404" pitchFamily="49" charset="0"/>
                 <a:cs typeface="Courier New" panose="02070309020205020404" pitchFamily="49" charset="0"/>
               </a:rPr>
               <a:t>self.pin_trig.off</a:t>
             </a:r>
             <a:r>
-              <a:rPr lang="fr-FR" sz="900" dirty="0" smtClean="0">
+              <a:rPr lang="fr-FR" sz="1000" dirty="0" smtClean="0">
                 <a:latin typeface="Courier New" panose="02070309020205020404" pitchFamily="49" charset="0"/>
                 <a:cs typeface="Courier New" panose="02070309020205020404" pitchFamily="49" charset="0"/>
               </a:rPr>
@@ -5658,63 +6976,63 @@
           </a:p>
           <a:p>
             <a:r>
-              <a:rPr lang="fr-FR" sz="900" dirty="0" smtClean="0">
+              <a:rPr lang="fr-FR" sz="1000" dirty="0" smtClean="0">
                 <a:latin typeface="Courier New" panose="02070309020205020404" pitchFamily="49" charset="0"/>
                 <a:cs typeface="Courier New" panose="02070309020205020404" pitchFamily="49" charset="0"/>
               </a:rPr>
               <a:t>        </a:t>
             </a:r>
             <a:r>
-              <a:rPr lang="fr-FR" sz="900" dirty="0" err="1" smtClean="0">
+              <a:rPr lang="fr-FR" sz="1000" dirty="0" err="1" smtClean="0">
                 <a:latin typeface="Courier New" panose="02070309020205020404" pitchFamily="49" charset="0"/>
                 <a:cs typeface="Courier New" panose="02070309020205020404" pitchFamily="49" charset="0"/>
               </a:rPr>
               <a:t>self.temps_distance</a:t>
             </a:r>
             <a:r>
-              <a:rPr lang="fr-FR" sz="900" dirty="0" smtClean="0">
+              <a:rPr lang="fr-FR" sz="1000" dirty="0" smtClean="0">
                 <a:latin typeface="Courier New" panose="02070309020205020404" pitchFamily="49" charset="0"/>
                 <a:cs typeface="Courier New" panose="02070309020205020404" pitchFamily="49" charset="0"/>
               </a:rPr>
               <a:t> = </a:t>
             </a:r>
             <a:r>
-              <a:rPr lang="fr-FR" sz="900" dirty="0" err="1" smtClean="0">
+              <a:rPr lang="fr-FR" sz="1000" dirty="0" err="1" smtClean="0">
                 <a:latin typeface="Courier New" panose="02070309020205020404" pitchFamily="49" charset="0"/>
                 <a:cs typeface="Courier New" panose="02070309020205020404" pitchFamily="49" charset="0"/>
               </a:rPr>
               <a:t>machine.time_pulse_us</a:t>
             </a:r>
             <a:r>
-              <a:rPr lang="fr-FR" sz="900" dirty="0" smtClean="0">
+              <a:rPr lang="fr-FR" sz="1000" dirty="0" smtClean="0">
                 <a:latin typeface="Courier New" panose="02070309020205020404" pitchFamily="49" charset="0"/>
                 <a:cs typeface="Courier New" panose="02070309020205020404" pitchFamily="49" charset="0"/>
               </a:rPr>
               <a:t>(</a:t>
             </a:r>
             <a:r>
-              <a:rPr lang="fr-FR" sz="900" dirty="0" err="1" smtClean="0">
+              <a:rPr lang="fr-FR" sz="1000" dirty="0" err="1" smtClean="0">
                 <a:latin typeface="Courier New" panose="02070309020205020404" pitchFamily="49" charset="0"/>
                 <a:cs typeface="Courier New" panose="02070309020205020404" pitchFamily="49" charset="0"/>
               </a:rPr>
               <a:t>self.pin_echo</a:t>
             </a:r>
             <a:r>
-              <a:rPr lang="fr-FR" sz="900" dirty="0" smtClean="0">
+              <a:rPr lang="fr-FR" sz="1000" dirty="0" smtClean="0">
                 <a:latin typeface="Courier New" panose="02070309020205020404" pitchFamily="49" charset="0"/>
                 <a:cs typeface="Courier New" panose="02070309020205020404" pitchFamily="49" charset="0"/>
               </a:rPr>
               <a:t>, 1, </a:t>
             </a:r>
             <a:r>
-              <a:rPr lang="fr-FR" sz="900" dirty="0" err="1" smtClean="0">
+              <a:rPr lang="fr-FR" sz="1000" dirty="0" err="1" smtClean="0">
                 <a:latin typeface="Courier New" panose="02070309020205020404" pitchFamily="49" charset="0"/>
                 <a:cs typeface="Courier New" panose="02070309020205020404" pitchFamily="49" charset="0"/>
               </a:rPr>
               <a:t>self.tmo</a:t>
             </a:r>
             <a:r>
-              <a:rPr lang="fr-FR" sz="900" dirty="0" smtClean="0">
+              <a:rPr lang="fr-FR" sz="1000" dirty="0" smtClean="0">
                 <a:latin typeface="Courier New" panose="02070309020205020404" pitchFamily="49" charset="0"/>
                 <a:cs typeface="Courier New" panose="02070309020205020404" pitchFamily="49" charset="0"/>
               </a:rPr>
@@ -5723,49 +7041,49 @@
           </a:p>
           <a:p>
             <a:r>
-              <a:rPr lang="fr-FR" sz="900" dirty="0" smtClean="0">
+              <a:rPr lang="fr-FR" sz="1000" dirty="0" smtClean="0">
                 <a:latin typeface="Courier New" panose="02070309020205020404" pitchFamily="49" charset="0"/>
                 <a:cs typeface="Courier New" panose="02070309020205020404" pitchFamily="49" charset="0"/>
               </a:rPr>
               <a:t>        # </a:t>
             </a:r>
             <a:r>
-              <a:rPr lang="fr-FR" sz="900" dirty="0" err="1" smtClean="0">
+              <a:rPr lang="fr-FR" sz="1000" dirty="0" err="1" smtClean="0">
                 <a:latin typeface="Courier New" panose="02070309020205020404" pitchFamily="49" charset="0"/>
                 <a:cs typeface="Courier New" panose="02070309020205020404" pitchFamily="49" charset="0"/>
               </a:rPr>
               <a:t>print</a:t>
             </a:r>
             <a:r>
-              <a:rPr lang="fr-FR" sz="900" dirty="0" smtClean="0">
+              <a:rPr lang="fr-FR" sz="1000" dirty="0" smtClean="0">
                 <a:latin typeface="Courier New" panose="02070309020205020404" pitchFamily="49" charset="0"/>
                 <a:cs typeface="Courier New" panose="02070309020205020404" pitchFamily="49" charset="0"/>
               </a:rPr>
               <a:t>("</a:t>
             </a:r>
             <a:r>
-              <a:rPr lang="fr-FR" sz="900" dirty="0" err="1" smtClean="0">
+              <a:rPr lang="fr-FR" sz="1000" dirty="0" err="1" smtClean="0">
                 <a:latin typeface="Courier New" panose="02070309020205020404" pitchFamily="49" charset="0"/>
                 <a:cs typeface="Courier New" panose="02070309020205020404" pitchFamily="49" charset="0"/>
               </a:rPr>
               <a:t>temps_distance</a:t>
             </a:r>
             <a:r>
-              <a:rPr lang="fr-FR" sz="900" dirty="0" smtClean="0">
+              <a:rPr lang="fr-FR" sz="1000" dirty="0" smtClean="0">
                 <a:latin typeface="Courier New" panose="02070309020205020404" pitchFamily="49" charset="0"/>
                 <a:cs typeface="Courier New" panose="02070309020205020404" pitchFamily="49" charset="0"/>
               </a:rPr>
               <a:t>", </a:t>
             </a:r>
             <a:r>
-              <a:rPr lang="fr-FR" sz="900" dirty="0" err="1" smtClean="0">
+              <a:rPr lang="fr-FR" sz="1000" dirty="0" err="1" smtClean="0">
                 <a:latin typeface="Courier New" panose="02070309020205020404" pitchFamily="49" charset="0"/>
                 <a:cs typeface="Courier New" panose="02070309020205020404" pitchFamily="49" charset="0"/>
               </a:rPr>
               <a:t>self.temps_distance</a:t>
             </a:r>
             <a:r>
-              <a:rPr lang="fr-FR" sz="900" dirty="0" smtClean="0">
+              <a:rPr lang="fr-FR" sz="1000" dirty="0" smtClean="0">
                 <a:latin typeface="Courier New" panose="02070309020205020404" pitchFamily="49" charset="0"/>
                 <a:cs typeface="Courier New" panose="02070309020205020404" pitchFamily="49" charset="0"/>
               </a:rPr>
@@ -5774,21 +7092,21 @@
           </a:p>
           <a:p>
             <a:r>
-              <a:rPr lang="fr-FR" sz="900" dirty="0" smtClean="0">
+              <a:rPr lang="fr-FR" sz="1000" dirty="0" smtClean="0">
                 <a:latin typeface="Courier New" panose="02070309020205020404" pitchFamily="49" charset="0"/>
                 <a:cs typeface="Courier New" panose="02070309020205020404" pitchFamily="49" charset="0"/>
               </a:rPr>
               <a:t>        if (</a:t>
             </a:r>
             <a:r>
-              <a:rPr lang="fr-FR" sz="900" dirty="0" err="1" smtClean="0">
+              <a:rPr lang="fr-FR" sz="1000" dirty="0" err="1" smtClean="0">
                 <a:latin typeface="Courier New" panose="02070309020205020404" pitchFamily="49" charset="0"/>
                 <a:cs typeface="Courier New" panose="02070309020205020404" pitchFamily="49" charset="0"/>
               </a:rPr>
               <a:t>self.temps_distance</a:t>
             </a:r>
             <a:r>
-              <a:rPr lang="fr-FR" sz="900" dirty="0" smtClean="0">
+              <a:rPr lang="fr-FR" sz="1000" dirty="0" smtClean="0">
                 <a:latin typeface="Courier New" panose="02070309020205020404" pitchFamily="49" charset="0"/>
                 <a:cs typeface="Courier New" panose="02070309020205020404" pitchFamily="49" charset="0"/>
               </a:rPr>
@@ -5797,7 +7115,7 @@
           </a:p>
           <a:p>
             <a:r>
-              <a:rPr lang="fr-FR" sz="900" dirty="0" smtClean="0">
+              <a:rPr lang="fr-FR" sz="1000" dirty="0" smtClean="0">
                 <a:latin typeface="Courier New" panose="02070309020205020404" pitchFamily="49" charset="0"/>
                 <a:cs typeface="Courier New" panose="02070309020205020404" pitchFamily="49" charset="0"/>
               </a:rPr>
@@ -5806,21 +7124,21 @@
           </a:p>
           <a:p>
             <a:r>
-              <a:rPr lang="fr-FR" sz="900" dirty="0" smtClean="0">
+              <a:rPr lang="fr-FR" sz="1000" dirty="0" smtClean="0">
                 <a:latin typeface="Courier New" panose="02070309020205020404" pitchFamily="49" charset="0"/>
                 <a:cs typeface="Courier New" panose="02070309020205020404" pitchFamily="49" charset="0"/>
               </a:rPr>
               <a:t>            </a:t>
             </a:r>
             <a:r>
-              <a:rPr lang="fr-FR" sz="900" dirty="0" err="1" smtClean="0">
+              <a:rPr lang="fr-FR" sz="1000" dirty="0" err="1" smtClean="0">
                 <a:latin typeface="Courier New" panose="02070309020205020404" pitchFamily="49" charset="0"/>
                 <a:cs typeface="Courier New" panose="02070309020205020404" pitchFamily="49" charset="0"/>
               </a:rPr>
               <a:t>self.calcul_distance_cm</a:t>
             </a:r>
             <a:r>
-              <a:rPr lang="fr-FR" sz="900" dirty="0" smtClean="0">
+              <a:rPr lang="fr-FR" sz="1000" dirty="0" smtClean="0">
                 <a:latin typeface="Courier New" panose="02070309020205020404" pitchFamily="49" charset="0"/>
                 <a:cs typeface="Courier New" panose="02070309020205020404" pitchFamily="49" charset="0"/>
               </a:rPr>
@@ -5829,21 +7147,21 @@
           </a:p>
           <a:p>
             <a:r>
-              <a:rPr lang="fr-FR" sz="900" dirty="0" smtClean="0">
+              <a:rPr lang="fr-FR" sz="1000" dirty="0" smtClean="0">
                 <a:latin typeface="Courier New" panose="02070309020205020404" pitchFamily="49" charset="0"/>
                 <a:cs typeface="Courier New" panose="02070309020205020404" pitchFamily="49" charset="0"/>
               </a:rPr>
               <a:t>        </a:t>
             </a:r>
             <a:r>
-              <a:rPr lang="fr-FR" sz="900" dirty="0" err="1" smtClean="0">
+              <a:rPr lang="fr-FR" sz="1000" dirty="0" err="1" smtClean="0">
                 <a:latin typeface="Courier New" panose="02070309020205020404" pitchFamily="49" charset="0"/>
                 <a:cs typeface="Courier New" panose="02070309020205020404" pitchFamily="49" charset="0"/>
               </a:rPr>
               <a:t>else</a:t>
             </a:r>
             <a:r>
-              <a:rPr lang="fr-FR" sz="900" dirty="0" smtClean="0">
+              <a:rPr lang="fr-FR" sz="1000" dirty="0" smtClean="0">
                 <a:latin typeface="Courier New" panose="02070309020205020404" pitchFamily="49" charset="0"/>
                 <a:cs typeface="Courier New" panose="02070309020205020404" pitchFamily="49" charset="0"/>
               </a:rPr>
@@ -5852,21 +7170,21 @@
           </a:p>
           <a:p>
             <a:r>
-              <a:rPr lang="fr-FR" sz="900" dirty="0" smtClean="0">
+              <a:rPr lang="fr-FR" sz="1000" dirty="0" smtClean="0">
                 <a:latin typeface="Courier New" panose="02070309020205020404" pitchFamily="49" charset="0"/>
                 <a:cs typeface="Courier New" panose="02070309020205020404" pitchFamily="49" charset="0"/>
               </a:rPr>
               <a:t>            # le temps que met l’</a:t>
             </a:r>
             <a:r>
-              <a:rPr lang="fr-FR" sz="900" dirty="0" err="1" smtClean="0">
+              <a:rPr lang="fr-FR" sz="1000" dirty="0" err="1" smtClean="0">
                 <a:latin typeface="Courier New" panose="02070309020205020404" pitchFamily="49" charset="0"/>
                 <a:cs typeface="Courier New" panose="02070309020205020404" pitchFamily="49" charset="0"/>
               </a:rPr>
               <a:t>echo</a:t>
             </a:r>
             <a:r>
-              <a:rPr lang="fr-FR" sz="900" dirty="0" smtClean="0">
+              <a:rPr lang="fr-FR" sz="1000" dirty="0" smtClean="0">
                 <a:latin typeface="Courier New" panose="02070309020205020404" pitchFamily="49" charset="0"/>
                 <a:cs typeface="Courier New" panose="02070309020205020404" pitchFamily="49" charset="0"/>
               </a:rPr>
@@ -5875,7 +7193,7 @@
           </a:p>
           <a:p>
             <a:r>
-              <a:rPr lang="fr-FR" sz="900" dirty="0" smtClean="0">
+              <a:rPr lang="fr-FR" sz="1000" dirty="0" smtClean="0">
                 <a:latin typeface="Courier New" panose="02070309020205020404" pitchFamily="49" charset="0"/>
                 <a:cs typeface="Courier New" panose="02070309020205020404" pitchFamily="49" charset="0"/>
               </a:rPr>
@@ -5884,7 +7202,7 @@
           </a:p>
           <a:p>
             <a:r>
-              <a:rPr lang="fr-FR" sz="900" dirty="0" smtClean="0">
+              <a:rPr lang="fr-FR" sz="1000" dirty="0" smtClean="0">
                 <a:latin typeface="Courier New" panose="02070309020205020404" pitchFamily="49" charset="0"/>
                 <a:cs typeface="Courier New" panose="02070309020205020404" pitchFamily="49" charset="0"/>
               </a:rPr>
@@ -5893,35 +7211,35 @@
           </a:p>
           <a:p>
             <a:r>
-              <a:rPr lang="fr-FR" sz="900" dirty="0" smtClean="0">
+              <a:rPr lang="fr-FR" sz="1000" dirty="0" smtClean="0">
                 <a:latin typeface="Courier New" panose="02070309020205020404" pitchFamily="49" charset="0"/>
                 <a:cs typeface="Courier New" panose="02070309020205020404" pitchFamily="49" charset="0"/>
               </a:rPr>
               <a:t>            </a:t>
             </a:r>
             <a:r>
-              <a:rPr lang="fr-FR" sz="900" dirty="0" err="1" smtClean="0">
+              <a:rPr lang="fr-FR" sz="1000" dirty="0" err="1" smtClean="0">
                 <a:latin typeface="Courier New" panose="02070309020205020404" pitchFamily="49" charset="0"/>
                 <a:cs typeface="Courier New" panose="02070309020205020404" pitchFamily="49" charset="0"/>
               </a:rPr>
               <a:t>self.calcul_distance_cm</a:t>
             </a:r>
             <a:r>
-              <a:rPr lang="fr-FR" sz="900" dirty="0" smtClean="0">
+              <a:rPr lang="fr-FR" sz="1000" dirty="0" smtClean="0">
                 <a:latin typeface="Courier New" panose="02070309020205020404" pitchFamily="49" charset="0"/>
                 <a:cs typeface="Courier New" panose="02070309020205020404" pitchFamily="49" charset="0"/>
               </a:rPr>
               <a:t> = (</a:t>
             </a:r>
             <a:r>
-              <a:rPr lang="fr-FR" sz="900" dirty="0" err="1" smtClean="0">
+              <a:rPr lang="fr-FR" sz="1000" dirty="0" err="1" smtClean="0">
                 <a:latin typeface="Courier New" panose="02070309020205020404" pitchFamily="49" charset="0"/>
                 <a:cs typeface="Courier New" panose="02070309020205020404" pitchFamily="49" charset="0"/>
               </a:rPr>
               <a:t>self.temps_distance</a:t>
             </a:r>
             <a:r>
-              <a:rPr lang="fr-FR" sz="900" dirty="0" smtClean="0">
+              <a:rPr lang="fr-FR" sz="1000" dirty="0" smtClean="0">
                 <a:latin typeface="Courier New" panose="02070309020205020404" pitchFamily="49" charset="0"/>
                 <a:cs typeface="Courier New" panose="02070309020205020404" pitchFamily="49" charset="0"/>
               </a:rPr>
@@ -5930,48 +7248,31 @@
           </a:p>
           <a:p>
             <a:r>
-              <a:rPr lang="fr-FR" sz="900" dirty="0" smtClean="0">
+              <a:rPr lang="fr-FR" sz="1000" dirty="0" smtClean="0">
                 <a:latin typeface="Courier New" panose="02070309020205020404" pitchFamily="49" charset="0"/>
                 <a:cs typeface="Courier New" panose="02070309020205020404" pitchFamily="49" charset="0"/>
               </a:rPr>
               <a:t>        return(</a:t>
             </a:r>
             <a:r>
-              <a:rPr lang="fr-FR" sz="900" dirty="0" err="1" smtClean="0">
+              <a:rPr lang="fr-FR" sz="1000" dirty="0" err="1" smtClean="0">
                 <a:latin typeface="Courier New" panose="02070309020205020404" pitchFamily="49" charset="0"/>
                 <a:cs typeface="Courier New" panose="02070309020205020404" pitchFamily="49" charset="0"/>
               </a:rPr>
               <a:t>self.calcul_distance_cm</a:t>
             </a:r>
             <a:r>
-              <a:rPr lang="fr-FR" sz="900" dirty="0" smtClean="0">
+              <a:rPr lang="fr-FR" sz="1000" dirty="0" smtClean="0">
                 <a:latin typeface="Courier New" panose="02070309020205020404" pitchFamily="49" charset="0"/>
                 <a:cs typeface="Courier New" panose="02070309020205020404" pitchFamily="49" charset="0"/>
               </a:rPr>
               <a:t>)</a:t>
             </a:r>
-          </a:p>
-          <a:p>
-            <a:endParaRPr lang="fr-FR" sz="900" dirty="0">
+            <a:endParaRPr lang="fr-FR" sz="1000" dirty="0" smtClean="0">
               <a:latin typeface="Courier New" panose="02070309020205020404" pitchFamily="49" charset="0"/>
               <a:cs typeface="Courier New" panose="02070309020205020404" pitchFamily="49" charset="0"/>
             </a:endParaRPr>
           </a:p>
-          <a:p>
-            <a:r>
-              <a:rPr lang="fr-FR" sz="900" dirty="0" smtClean="0">
-                <a:latin typeface="Courier New" panose="02070309020205020404" pitchFamily="49" charset="0"/>
-                <a:cs typeface="Courier New" panose="02070309020205020404" pitchFamily="49" charset="0"/>
-              </a:rPr>
-              <a:t>...</a:t>
-            </a:r>
-          </a:p>
-          <a:p>
-            <a:endParaRPr lang="fr-FR" sz="900" dirty="0" smtClean="0">
-              <a:latin typeface="Courier New" panose="02070309020205020404" pitchFamily="49" charset="0"/>
-              <a:cs typeface="Courier New" panose="02070309020205020404" pitchFamily="49" charset="0"/>
-            </a:endParaRPr>
-          </a:p>
         </p:txBody>
       </p:sp>
       <p:sp>
@@ -5982,8 +7283,8 @@
         </p:nvSpPr>
         <p:spPr>
           <a:xfrm>
-            <a:off x="6387101" y="3620515"/>
-            <a:ext cx="5208997" cy="2246769"/>
+            <a:off x="7325773" y="3369663"/>
+            <a:ext cx="4116361" cy="2246769"/>
           </a:xfrm>
           <a:prstGeom prst="rect">
             <a:avLst/>
@@ -6400,7 +7701,7 @@
         <p:spPr>
           <a:xfrm>
             <a:off x="606176" y="1464656"/>
-            <a:ext cx="3986372" cy="5016758"/>
+            <a:ext cx="3986372" cy="5001369"/>
           </a:xfrm>
           <a:prstGeom prst="rect">
             <a:avLst/>
@@ -6423,27 +7724,27 @@
           <a:lstStyle/>
           <a:p>
             <a:r>
-              <a:rPr lang="fr-FR" sz="1000" dirty="0" smtClean="0">
+              <a:rPr lang="fr-FR" sz="1100" dirty="0" smtClean="0">
                 <a:latin typeface="Courier New" panose="02070309020205020404" pitchFamily="49" charset="0"/>
                 <a:cs typeface="Courier New" panose="02070309020205020404" pitchFamily="49" charset="0"/>
               </a:rPr>
               <a:t>import machine, </a:t>
             </a:r>
             <a:r>
-              <a:rPr lang="fr-FR" sz="1000" dirty="0" err="1" smtClean="0">
+              <a:rPr lang="fr-FR" sz="1100" dirty="0" err="1" smtClean="0">
                 <a:latin typeface="Courier New" panose="02070309020205020404" pitchFamily="49" charset="0"/>
                 <a:cs typeface="Courier New" panose="02070309020205020404" pitchFamily="49" charset="0"/>
               </a:rPr>
               <a:t>neopixel</a:t>
             </a:r>
-            <a:endParaRPr lang="fr-FR" sz="1000" dirty="0" smtClean="0">
+            <a:endParaRPr lang="fr-FR" sz="1100" dirty="0" smtClean="0">
               <a:latin typeface="Courier New" panose="02070309020205020404" pitchFamily="49" charset="0"/>
               <a:cs typeface="Courier New" panose="02070309020205020404" pitchFamily="49" charset="0"/>
             </a:endParaRPr>
           </a:p>
           <a:p>
             <a:r>
-              <a:rPr lang="fr-FR" sz="1000" dirty="0" smtClean="0">
+              <a:rPr lang="fr-FR" sz="1100" dirty="0" smtClean="0">
                 <a:latin typeface="Courier New" panose="02070309020205020404" pitchFamily="49" charset="0"/>
                 <a:cs typeface="Courier New" panose="02070309020205020404" pitchFamily="49" charset="0"/>
               </a:rPr>
@@ -6452,134 +7753,221 @@
           </a:p>
           <a:p>
             <a:r>
-              <a:rPr lang="fr-FR" sz="1000" dirty="0" smtClean="0">
+              <a:rPr lang="fr-FR" sz="1100" dirty="0" smtClean="0">
                 <a:latin typeface="Courier New" panose="02070309020205020404" pitchFamily="49" charset="0"/>
                 <a:cs typeface="Courier New" panose="02070309020205020404" pitchFamily="49" charset="0"/>
               </a:rPr>
               <a:t>import </a:t>
             </a:r>
             <a:r>
-              <a:rPr lang="fr-FR" sz="1000" dirty="0" err="1" smtClean="0">
+              <a:rPr lang="fr-FR" sz="1100" dirty="0" err="1" smtClean="0">
                 <a:latin typeface="Courier New" panose="02070309020205020404" pitchFamily="49" charset="0"/>
                 <a:cs typeface="Courier New" panose="02070309020205020404" pitchFamily="49" charset="0"/>
               </a:rPr>
               <a:t>random</a:t>
             </a:r>
-            <a:endParaRPr lang="fr-FR" sz="1000" dirty="0" smtClean="0">
+            <a:endParaRPr lang="fr-FR" sz="1100" dirty="0" smtClean="0">
               <a:latin typeface="Courier New" panose="02070309020205020404" pitchFamily="49" charset="0"/>
               <a:cs typeface="Courier New" panose="02070309020205020404" pitchFamily="49" charset="0"/>
             </a:endParaRPr>
           </a:p>
           <a:p>
-            <a:endParaRPr lang="fr-FR" sz="1000" dirty="0" smtClean="0">
+            <a:endParaRPr lang="fr-FR" sz="1100" dirty="0" smtClean="0">
               <a:latin typeface="Courier New" panose="02070309020205020404" pitchFamily="49" charset="0"/>
               <a:cs typeface="Courier New" panose="02070309020205020404" pitchFamily="49" charset="0"/>
             </a:endParaRPr>
           </a:p>
           <a:p>
-            <a:endParaRPr lang="fr-FR" sz="1000" dirty="0" smtClean="0">
+            <a:r>
+              <a:rPr lang="fr-FR" sz="1100" dirty="0" err="1" smtClean="0">
+                <a:latin typeface="Courier New" panose="02070309020205020404" pitchFamily="49" charset="0"/>
+                <a:cs typeface="Courier New" panose="02070309020205020404" pitchFamily="49" charset="0"/>
+              </a:rPr>
+              <a:t>np</a:t>
+            </a:r>
+            <a:r>
+              <a:rPr lang="fr-FR" sz="1100" dirty="0" smtClean="0">
+                <a:latin typeface="Courier New" panose="02070309020205020404" pitchFamily="49" charset="0"/>
+                <a:cs typeface="Courier New" panose="02070309020205020404" pitchFamily="49" charset="0"/>
+              </a:rPr>
+              <a:t> = </a:t>
+            </a:r>
+            <a:r>
+              <a:rPr lang="fr-FR" sz="1100" dirty="0" err="1" smtClean="0">
+                <a:latin typeface="Courier New" panose="02070309020205020404" pitchFamily="49" charset="0"/>
+                <a:cs typeface="Courier New" panose="02070309020205020404" pitchFamily="49" charset="0"/>
+              </a:rPr>
+              <a:t>neopixel.NeoPixel</a:t>
+            </a:r>
+            <a:r>
+              <a:rPr lang="fr-FR" sz="1100" dirty="0" smtClean="0">
+                <a:latin typeface="Courier New" panose="02070309020205020404" pitchFamily="49" charset="0"/>
+                <a:cs typeface="Courier New" panose="02070309020205020404" pitchFamily="49" charset="0"/>
+              </a:rPr>
+              <a:t>(</a:t>
+            </a:r>
+            <a:r>
+              <a:rPr lang="fr-FR" sz="1100" dirty="0" err="1" smtClean="0">
+                <a:latin typeface="Courier New" panose="02070309020205020404" pitchFamily="49" charset="0"/>
+                <a:cs typeface="Courier New" panose="02070309020205020404" pitchFamily="49" charset="0"/>
+              </a:rPr>
+              <a:t>machine.Pin</a:t>
+            </a:r>
+            <a:r>
+              <a:rPr lang="fr-FR" sz="1100" dirty="0" smtClean="0">
+                <a:latin typeface="Courier New" panose="02070309020205020404" pitchFamily="49" charset="0"/>
+                <a:cs typeface="Courier New" panose="02070309020205020404" pitchFamily="49" charset="0"/>
+              </a:rPr>
+              <a:t>(4), 1)</a:t>
+            </a:r>
+          </a:p>
+          <a:p>
+            <a:endParaRPr lang="fr-FR" sz="1100" dirty="0" smtClean="0">
               <a:latin typeface="Courier New" panose="02070309020205020404" pitchFamily="49" charset="0"/>
               <a:cs typeface="Courier New" panose="02070309020205020404" pitchFamily="49" charset="0"/>
             </a:endParaRPr>
           </a:p>
           <a:p>
             <a:r>
-              <a:rPr lang="fr-FR" sz="1000" dirty="0" err="1" smtClean="0">
-                <a:latin typeface="Courier New" panose="02070309020205020404" pitchFamily="49" charset="0"/>
-                <a:cs typeface="Courier New" panose="02070309020205020404" pitchFamily="49" charset="0"/>
-              </a:rPr>
-              <a:t>np</a:t>
-            </a:r>
-            <a:r>
-              <a:rPr lang="fr-FR" sz="1000" dirty="0" smtClean="0">
-                <a:latin typeface="Courier New" panose="02070309020205020404" pitchFamily="49" charset="0"/>
-                <a:cs typeface="Courier New" panose="02070309020205020404" pitchFamily="49" charset="0"/>
-              </a:rPr>
-              <a:t> = </a:t>
-            </a:r>
-            <a:r>
-              <a:rPr lang="fr-FR" sz="1000" dirty="0" err="1" smtClean="0">
-                <a:latin typeface="Courier New" panose="02070309020205020404" pitchFamily="49" charset="0"/>
-                <a:cs typeface="Courier New" panose="02070309020205020404" pitchFamily="49" charset="0"/>
-              </a:rPr>
-              <a:t>neopixel.NeoPixel</a:t>
-            </a:r>
-            <a:r>
-              <a:rPr lang="fr-FR" sz="1000" dirty="0" smtClean="0">
-                <a:latin typeface="Courier New" panose="02070309020205020404" pitchFamily="49" charset="0"/>
-                <a:cs typeface="Courier New" panose="02070309020205020404" pitchFamily="49" charset="0"/>
-              </a:rPr>
-              <a:t>(</a:t>
-            </a:r>
-            <a:r>
-              <a:rPr lang="fr-FR" sz="1000" dirty="0" err="1" smtClean="0">
-                <a:latin typeface="Courier New" panose="02070309020205020404" pitchFamily="49" charset="0"/>
-                <a:cs typeface="Courier New" panose="02070309020205020404" pitchFamily="49" charset="0"/>
-              </a:rPr>
-              <a:t>machine.Pin</a:t>
-            </a:r>
-            <a:r>
-              <a:rPr lang="fr-FR" sz="1000" dirty="0" smtClean="0">
-                <a:latin typeface="Courier New" panose="02070309020205020404" pitchFamily="49" charset="0"/>
-                <a:cs typeface="Courier New" panose="02070309020205020404" pitchFamily="49" charset="0"/>
-              </a:rPr>
-              <a:t>(4), 1)</a:t>
-            </a:r>
-          </a:p>
-          <a:p>
-            <a:endParaRPr lang="fr-FR" sz="1000" dirty="0" smtClean="0">
+              <a:rPr lang="fr-FR" sz="1100" dirty="0" err="1" smtClean="0">
+                <a:latin typeface="Courier New" panose="02070309020205020404" pitchFamily="49" charset="0"/>
+                <a:cs typeface="Courier New" panose="02070309020205020404" pitchFamily="49" charset="0"/>
+              </a:rPr>
+              <a:t>dt</a:t>
+            </a:r>
+            <a:r>
+              <a:rPr lang="fr-FR" sz="1100" dirty="0" smtClean="0">
+                <a:latin typeface="Courier New" panose="02070309020205020404" pitchFamily="49" charset="0"/>
+                <a:cs typeface="Courier New" panose="02070309020205020404" pitchFamily="49" charset="0"/>
+              </a:rPr>
+              <a:t> = 20</a:t>
+            </a:r>
+          </a:p>
+          <a:p>
+            <a:endParaRPr lang="fr-FR" sz="1100" dirty="0" smtClean="0">
               <a:latin typeface="Courier New" panose="02070309020205020404" pitchFamily="49" charset="0"/>
               <a:cs typeface="Courier New" panose="02070309020205020404" pitchFamily="49" charset="0"/>
             </a:endParaRPr>
           </a:p>
           <a:p>
             <a:r>
-              <a:rPr lang="fr-FR" sz="1000" dirty="0" err="1" smtClean="0">
-                <a:latin typeface="Courier New" panose="02070309020205020404" pitchFamily="49" charset="0"/>
-                <a:cs typeface="Courier New" panose="02070309020205020404" pitchFamily="49" charset="0"/>
-              </a:rPr>
-              <a:t>dt</a:t>
-            </a:r>
-            <a:r>
-              <a:rPr lang="fr-FR" sz="1000" dirty="0" smtClean="0">
-                <a:latin typeface="Courier New" panose="02070309020205020404" pitchFamily="49" charset="0"/>
-                <a:cs typeface="Courier New" panose="02070309020205020404" pitchFamily="49" charset="0"/>
-              </a:rPr>
-              <a:t> = 20</a:t>
-            </a:r>
-          </a:p>
-          <a:p>
-            <a:endParaRPr lang="fr-FR" sz="1000" dirty="0" smtClean="0">
+              <a:rPr lang="fr-FR" sz="1100" dirty="0" err="1" smtClean="0">
+                <a:latin typeface="Courier New" panose="02070309020205020404" pitchFamily="49" charset="0"/>
+                <a:cs typeface="Courier New" panose="02070309020205020404" pitchFamily="49" charset="0"/>
+              </a:rPr>
+              <a:t>np</a:t>
+            </a:r>
+            <a:r>
+              <a:rPr lang="fr-FR" sz="1100" dirty="0" smtClean="0">
+                <a:latin typeface="Courier New" panose="02070309020205020404" pitchFamily="49" charset="0"/>
+                <a:cs typeface="Courier New" panose="02070309020205020404" pitchFamily="49" charset="0"/>
+              </a:rPr>
+              <a:t>[0] = (0, 0, 0)</a:t>
+            </a:r>
+          </a:p>
+          <a:p>
+            <a:r>
+              <a:rPr lang="fr-FR" sz="1100" dirty="0" err="1" smtClean="0">
+                <a:latin typeface="Courier New" panose="02070309020205020404" pitchFamily="49" charset="0"/>
+                <a:cs typeface="Courier New" panose="02070309020205020404" pitchFamily="49" charset="0"/>
+              </a:rPr>
+              <a:t>np.write</a:t>
+            </a:r>
+            <a:r>
+              <a:rPr lang="fr-FR" sz="1100" dirty="0" smtClean="0">
+                <a:latin typeface="Courier New" panose="02070309020205020404" pitchFamily="49" charset="0"/>
+                <a:cs typeface="Courier New" panose="02070309020205020404" pitchFamily="49" charset="0"/>
+              </a:rPr>
+              <a:t>()</a:t>
+            </a:r>
+          </a:p>
+          <a:p>
+            <a:r>
+              <a:rPr lang="fr-FR" sz="1100" dirty="0" err="1" smtClean="0">
+                <a:latin typeface="Courier New" panose="02070309020205020404" pitchFamily="49" charset="0"/>
+                <a:cs typeface="Courier New" panose="02070309020205020404" pitchFamily="49" charset="0"/>
+              </a:rPr>
+              <a:t>time.sleep_ms</a:t>
+            </a:r>
+            <a:r>
+              <a:rPr lang="fr-FR" sz="1100" dirty="0" smtClean="0">
+                <a:latin typeface="Courier New" panose="02070309020205020404" pitchFamily="49" charset="0"/>
+                <a:cs typeface="Courier New" panose="02070309020205020404" pitchFamily="49" charset="0"/>
+              </a:rPr>
+              <a:t>(1000)</a:t>
+            </a:r>
+          </a:p>
+          <a:p>
+            <a:endParaRPr lang="fr-FR" sz="1100" dirty="0" smtClean="0">
               <a:latin typeface="Courier New" panose="02070309020205020404" pitchFamily="49" charset="0"/>
               <a:cs typeface="Courier New" panose="02070309020205020404" pitchFamily="49" charset="0"/>
             </a:endParaRPr>
           </a:p>
           <a:p>
             <a:r>
-              <a:rPr lang="fr-FR" sz="1000" dirty="0" err="1" smtClean="0">
+              <a:rPr lang="fr-FR" sz="1100" dirty="0" err="1" smtClean="0">
+                <a:latin typeface="Courier New" panose="02070309020205020404" pitchFamily="49" charset="0"/>
+                <a:cs typeface="Courier New" panose="02070309020205020404" pitchFamily="49" charset="0"/>
+              </a:rPr>
+              <a:t>print</a:t>
+            </a:r>
+            <a:r>
+              <a:rPr lang="fr-FR" sz="1100" dirty="0" smtClean="0">
+                <a:latin typeface="Courier New" panose="02070309020205020404" pitchFamily="49" charset="0"/>
+                <a:cs typeface="Courier New" panose="02070309020205020404" pitchFamily="49" charset="0"/>
+              </a:rPr>
+              <a:t>("green")</a:t>
+            </a:r>
+          </a:p>
+          <a:p>
+            <a:r>
+              <a:rPr lang="fr-FR" sz="1100" dirty="0" smtClean="0">
+                <a:latin typeface="Courier New" panose="02070309020205020404" pitchFamily="49" charset="0"/>
+                <a:cs typeface="Courier New" panose="02070309020205020404" pitchFamily="49" charset="0"/>
+              </a:rPr>
+              <a:t>for i in range(255):</a:t>
+            </a:r>
+          </a:p>
+          <a:p>
+            <a:r>
+              <a:rPr lang="fr-FR" sz="1100" dirty="0" smtClean="0">
+                <a:latin typeface="Courier New" panose="02070309020205020404" pitchFamily="49" charset="0"/>
+                <a:cs typeface="Courier New" panose="02070309020205020404" pitchFamily="49" charset="0"/>
+              </a:rPr>
+              <a:t>    </a:t>
+            </a:r>
+            <a:r>
+              <a:rPr lang="fr-FR" sz="1100" dirty="0" err="1" smtClean="0">
                 <a:latin typeface="Courier New" panose="02070309020205020404" pitchFamily="49" charset="0"/>
                 <a:cs typeface="Courier New" panose="02070309020205020404" pitchFamily="49" charset="0"/>
               </a:rPr>
               <a:t>np</a:t>
             </a:r>
             <a:r>
-              <a:rPr lang="fr-FR" sz="1000" dirty="0" smtClean="0">
-                <a:latin typeface="Courier New" panose="02070309020205020404" pitchFamily="49" charset="0"/>
-                <a:cs typeface="Courier New" panose="02070309020205020404" pitchFamily="49" charset="0"/>
-              </a:rPr>
-              <a:t>[0] = (0, 0, 0)</a:t>
-            </a:r>
-          </a:p>
-          <a:p>
-            <a:r>
-              <a:rPr lang="fr-FR" sz="1000" dirty="0" err="1" smtClean="0">
+              <a:rPr lang="fr-FR" sz="1100" dirty="0" smtClean="0">
+                <a:latin typeface="Courier New" panose="02070309020205020404" pitchFamily="49" charset="0"/>
+                <a:cs typeface="Courier New" panose="02070309020205020404" pitchFamily="49" charset="0"/>
+              </a:rPr>
+              <a:t>[0] = (i, 0, 0)</a:t>
+            </a:r>
+          </a:p>
+          <a:p>
+            <a:r>
+              <a:rPr lang="fr-FR" sz="1100" dirty="0" smtClean="0">
+                <a:latin typeface="Courier New" panose="02070309020205020404" pitchFamily="49" charset="0"/>
+                <a:cs typeface="Courier New" panose="02070309020205020404" pitchFamily="49" charset="0"/>
+              </a:rPr>
+              <a:t>    </a:t>
+            </a:r>
+            <a:r>
+              <a:rPr lang="fr-FR" sz="1100" dirty="0" err="1" smtClean="0">
                 <a:latin typeface="Courier New" panose="02070309020205020404" pitchFamily="49" charset="0"/>
                 <a:cs typeface="Courier New" panose="02070309020205020404" pitchFamily="49" charset="0"/>
               </a:rPr>
               <a:t>np.write</a:t>
             </a:r>
             <a:r>
-              <a:rPr lang="fr-FR" sz="1000" dirty="0" smtClean="0">
+              <a:rPr lang="fr-FR" sz="1100" dirty="0" smtClean="0">
                 <a:latin typeface="Courier New" panose="02070309020205020404" pitchFamily="49" charset="0"/>
                 <a:cs typeface="Courier New" panose="02070309020205020404" pitchFamily="49" charset="0"/>
               </a:rPr>
@@ -6588,45 +7976,80 @@
           </a:p>
           <a:p>
             <a:r>
-              <a:rPr lang="fr-FR" sz="1000" dirty="0" err="1" smtClean="0">
+              <a:rPr lang="fr-FR" sz="1100" dirty="0" smtClean="0">
+                <a:latin typeface="Courier New" panose="02070309020205020404" pitchFamily="49" charset="0"/>
+                <a:cs typeface="Courier New" panose="02070309020205020404" pitchFamily="49" charset="0"/>
+              </a:rPr>
+              <a:t>    </a:t>
+            </a:r>
+            <a:r>
+              <a:rPr lang="fr-FR" sz="1100" dirty="0" err="1" smtClean="0">
                 <a:latin typeface="Courier New" panose="02070309020205020404" pitchFamily="49" charset="0"/>
                 <a:cs typeface="Courier New" panose="02070309020205020404" pitchFamily="49" charset="0"/>
               </a:rPr>
               <a:t>time.sleep_ms</a:t>
             </a:r>
             <a:r>
-              <a:rPr lang="fr-FR" sz="1000" dirty="0" smtClean="0">
-                <a:latin typeface="Courier New" panose="02070309020205020404" pitchFamily="49" charset="0"/>
-                <a:cs typeface="Courier New" panose="02070309020205020404" pitchFamily="49" charset="0"/>
-              </a:rPr>
-              <a:t>(1000)</a:t>
-            </a:r>
-          </a:p>
-          <a:p>
-            <a:endParaRPr lang="fr-FR" sz="1000" dirty="0" smtClean="0">
+              <a:rPr lang="fr-FR" sz="1100" dirty="0" smtClean="0">
+                <a:latin typeface="Courier New" panose="02070309020205020404" pitchFamily="49" charset="0"/>
+                <a:cs typeface="Courier New" panose="02070309020205020404" pitchFamily="49" charset="0"/>
+              </a:rPr>
+              <a:t>(</a:t>
+            </a:r>
+            <a:r>
+              <a:rPr lang="fr-FR" sz="1100" dirty="0" err="1" smtClean="0">
+                <a:latin typeface="Courier New" panose="02070309020205020404" pitchFamily="49" charset="0"/>
+                <a:cs typeface="Courier New" panose="02070309020205020404" pitchFamily="49" charset="0"/>
+              </a:rPr>
+              <a:t>dt</a:t>
+            </a:r>
+            <a:r>
+              <a:rPr lang="fr-FR" sz="1100" dirty="0" smtClean="0">
+                <a:latin typeface="Courier New" panose="02070309020205020404" pitchFamily="49" charset="0"/>
+                <a:cs typeface="Courier New" panose="02070309020205020404" pitchFamily="49" charset="0"/>
+              </a:rPr>
+              <a:t>)</a:t>
+            </a:r>
+          </a:p>
+          <a:p>
+            <a:endParaRPr lang="fr-FR" sz="1100" dirty="0" smtClean="0">
               <a:latin typeface="Courier New" panose="02070309020205020404" pitchFamily="49" charset="0"/>
               <a:cs typeface="Courier New" panose="02070309020205020404" pitchFamily="49" charset="0"/>
             </a:endParaRPr>
           </a:p>
           <a:p>
             <a:r>
-              <a:rPr lang="fr-FR" sz="1000" dirty="0" err="1" smtClean="0">
+              <a:rPr lang="fr-FR" sz="1100" dirty="0" err="1" smtClean="0">
                 <a:latin typeface="Courier New" panose="02070309020205020404" pitchFamily="49" charset="0"/>
                 <a:cs typeface="Courier New" panose="02070309020205020404" pitchFamily="49" charset="0"/>
               </a:rPr>
               <a:t>print</a:t>
             </a:r>
             <a:r>
-              <a:rPr lang="fr-FR" sz="1000" dirty="0" smtClean="0">
-                <a:latin typeface="Courier New" panose="02070309020205020404" pitchFamily="49" charset="0"/>
-                <a:cs typeface="Courier New" panose="02070309020205020404" pitchFamily="49" charset="0"/>
-              </a:rPr>
-              <a:t>("green")</a:t>
-            </a:r>
-          </a:p>
-          <a:p>
-            <a:r>
-              <a:rPr lang="fr-FR" sz="1000" dirty="0" smtClean="0">
+              <a:rPr lang="fr-FR" sz="1100" dirty="0" smtClean="0">
+                <a:latin typeface="Courier New" panose="02070309020205020404" pitchFamily="49" charset="0"/>
+                <a:cs typeface="Courier New" panose="02070309020205020404" pitchFamily="49" charset="0"/>
+              </a:rPr>
+              <a:t>("</a:t>
+            </a:r>
+            <a:r>
+              <a:rPr lang="fr-FR" sz="1100" dirty="0" err="1" smtClean="0">
+                <a:latin typeface="Courier New" panose="02070309020205020404" pitchFamily="49" charset="0"/>
+                <a:cs typeface="Courier New" panose="02070309020205020404" pitchFamily="49" charset="0"/>
+              </a:rPr>
+              <a:t>red</a:t>
+            </a:r>
+            <a:r>
+              <a:rPr lang="fr-FR" sz="1100" dirty="0" smtClean="0">
+                <a:latin typeface="Courier New" panose="02070309020205020404" pitchFamily="49" charset="0"/>
+                <a:cs typeface="Courier New" panose="02070309020205020404" pitchFamily="49" charset="0"/>
+              </a:rPr>
+              <a:t>")</a:t>
+            </a:r>
+          </a:p>
+          <a:p>
+            <a:r>
+              <a:rPr lang="fr-FR" sz="1100" dirty="0" smtClean="0">
                 <a:latin typeface="Courier New" panose="02070309020205020404" pitchFamily="49" charset="0"/>
                 <a:cs typeface="Courier New" panose="02070309020205020404" pitchFamily="49" charset="0"/>
               </a:rPr>
@@ -6635,44 +8058,44 @@
           </a:p>
           <a:p>
             <a:r>
-              <a:rPr lang="fr-FR" sz="1000" dirty="0" smtClean="0">
+              <a:rPr lang="fr-FR" sz="1100" dirty="0" smtClean="0">
                 <a:latin typeface="Courier New" panose="02070309020205020404" pitchFamily="49" charset="0"/>
                 <a:cs typeface="Courier New" panose="02070309020205020404" pitchFamily="49" charset="0"/>
               </a:rPr>
               <a:t>    </a:t>
             </a:r>
             <a:r>
-              <a:rPr lang="fr-FR" sz="1000" dirty="0" err="1" smtClean="0">
+              <a:rPr lang="fr-FR" sz="1100" dirty="0" err="1" smtClean="0">
                 <a:latin typeface="Courier New" panose="02070309020205020404" pitchFamily="49" charset="0"/>
                 <a:cs typeface="Courier New" panose="02070309020205020404" pitchFamily="49" charset="0"/>
               </a:rPr>
               <a:t>np</a:t>
             </a:r>
             <a:r>
-              <a:rPr lang="fr-FR" sz="1000" dirty="0" smtClean="0">
-                <a:latin typeface="Courier New" panose="02070309020205020404" pitchFamily="49" charset="0"/>
-                <a:cs typeface="Courier New" panose="02070309020205020404" pitchFamily="49" charset="0"/>
-              </a:rPr>
-              <a:t>[0] = (i, 0, 0)</a:t>
-            </a:r>
-          </a:p>
-          <a:p>
-            <a:r>
-              <a:rPr lang="fr-FR" sz="1000" dirty="0" smtClean="0">
+              <a:rPr lang="fr-FR" sz="1100" dirty="0" smtClean="0">
+                <a:latin typeface="Courier New" panose="02070309020205020404" pitchFamily="49" charset="0"/>
+                <a:cs typeface="Courier New" panose="02070309020205020404" pitchFamily="49" charset="0"/>
+              </a:rPr>
+              <a:t>[0] = (0, i, 0)</a:t>
+            </a:r>
+          </a:p>
+          <a:p>
+            <a:r>
+              <a:rPr lang="fr-FR" sz="1100" dirty="0" smtClean="0">
                 <a:latin typeface="Courier New" panose="02070309020205020404" pitchFamily="49" charset="0"/>
                 <a:cs typeface="Courier New" panose="02070309020205020404" pitchFamily="49" charset="0"/>
               </a:rPr>
               <a:t>    </a:t>
             </a:r>
             <a:r>
-              <a:rPr lang="fr-FR" sz="1000" dirty="0" err="1" smtClean="0">
+              <a:rPr lang="fr-FR" sz="1100" dirty="0" err="1" smtClean="0">
                 <a:latin typeface="Courier New" panose="02070309020205020404" pitchFamily="49" charset="0"/>
                 <a:cs typeface="Courier New" panose="02070309020205020404" pitchFamily="49" charset="0"/>
               </a:rPr>
               <a:t>np.write</a:t>
             </a:r>
             <a:r>
-              <a:rPr lang="fr-FR" sz="1000" dirty="0" smtClean="0">
+              <a:rPr lang="fr-FR" sz="1100" dirty="0" smtClean="0">
                 <a:latin typeface="Courier New" panose="02070309020205020404" pitchFamily="49" charset="0"/>
                 <a:cs typeface="Courier New" panose="02070309020205020404" pitchFamily="49" charset="0"/>
               </a:rPr>
@@ -6681,35 +8104,35 @@
           </a:p>
           <a:p>
             <a:r>
-              <a:rPr lang="fr-FR" sz="1000" dirty="0" smtClean="0">
+              <a:rPr lang="fr-FR" sz="1100" dirty="0" smtClean="0">
                 <a:latin typeface="Courier New" panose="02070309020205020404" pitchFamily="49" charset="0"/>
                 <a:cs typeface="Courier New" panose="02070309020205020404" pitchFamily="49" charset="0"/>
               </a:rPr>
               <a:t>    </a:t>
             </a:r>
             <a:r>
-              <a:rPr lang="fr-FR" sz="1000" dirty="0" err="1" smtClean="0">
+              <a:rPr lang="fr-FR" sz="1100" dirty="0" err="1" smtClean="0">
                 <a:latin typeface="Courier New" panose="02070309020205020404" pitchFamily="49" charset="0"/>
                 <a:cs typeface="Courier New" panose="02070309020205020404" pitchFamily="49" charset="0"/>
               </a:rPr>
               <a:t>time.sleep_ms</a:t>
             </a:r>
             <a:r>
-              <a:rPr lang="fr-FR" sz="1000" dirty="0" smtClean="0">
+              <a:rPr lang="fr-FR" sz="1100" dirty="0" smtClean="0">
                 <a:latin typeface="Courier New" panose="02070309020205020404" pitchFamily="49" charset="0"/>
                 <a:cs typeface="Courier New" panose="02070309020205020404" pitchFamily="49" charset="0"/>
               </a:rPr>
               <a:t>(</a:t>
             </a:r>
             <a:r>
-              <a:rPr lang="fr-FR" sz="1000" dirty="0" err="1" smtClean="0">
+              <a:rPr lang="fr-FR" sz="1100" dirty="0" err="1" smtClean="0">
                 <a:latin typeface="Courier New" panose="02070309020205020404" pitchFamily="49" charset="0"/>
                 <a:cs typeface="Courier New" panose="02070309020205020404" pitchFamily="49" charset="0"/>
               </a:rPr>
               <a:t>dt</a:t>
             </a:r>
             <a:r>
-              <a:rPr lang="fr-FR" sz="1000" dirty="0" smtClean="0">
+              <a:rPr lang="fr-FR" sz="1100" dirty="0" smtClean="0">
                 <a:latin typeface="Courier New" panose="02070309020205020404" pitchFamily="49" charset="0"/>
                 <a:cs typeface="Courier New" panose="02070309020205020404" pitchFamily="49" charset="0"/>
               </a:rPr>
@@ -6717,35 +8140,35 @@
             </a:r>
           </a:p>
           <a:p>
-            <a:endParaRPr lang="fr-FR" sz="1000" dirty="0" smtClean="0">
+            <a:endParaRPr lang="fr-FR" sz="1100" dirty="0" smtClean="0">
               <a:latin typeface="Courier New" panose="02070309020205020404" pitchFamily="49" charset="0"/>
               <a:cs typeface="Courier New" panose="02070309020205020404" pitchFamily="49" charset="0"/>
             </a:endParaRPr>
           </a:p>
           <a:p>
             <a:r>
-              <a:rPr lang="fr-FR" sz="1000" dirty="0" err="1" smtClean="0">
+              <a:rPr lang="fr-FR" sz="1100" dirty="0" err="1" smtClean="0">
                 <a:latin typeface="Courier New" panose="02070309020205020404" pitchFamily="49" charset="0"/>
                 <a:cs typeface="Courier New" panose="02070309020205020404" pitchFamily="49" charset="0"/>
               </a:rPr>
               <a:t>print</a:t>
             </a:r>
             <a:r>
-              <a:rPr lang="fr-FR" sz="1000" dirty="0" smtClean="0">
+              <a:rPr lang="fr-FR" sz="1100" dirty="0" smtClean="0">
                 <a:latin typeface="Courier New" panose="02070309020205020404" pitchFamily="49" charset="0"/>
                 <a:cs typeface="Courier New" panose="02070309020205020404" pitchFamily="49" charset="0"/>
               </a:rPr>
               <a:t>("</a:t>
             </a:r>
             <a:r>
-              <a:rPr lang="fr-FR" sz="1000" dirty="0" err="1" smtClean="0">
-                <a:latin typeface="Courier New" panose="02070309020205020404" pitchFamily="49" charset="0"/>
-                <a:cs typeface="Courier New" panose="02070309020205020404" pitchFamily="49" charset="0"/>
-              </a:rPr>
-              <a:t>red</a:t>
-            </a:r>
-            <a:r>
-              <a:rPr lang="fr-FR" sz="1000" dirty="0" smtClean="0">
+              <a:rPr lang="fr-FR" sz="1100" dirty="0" err="1" smtClean="0">
+                <a:latin typeface="Courier New" panose="02070309020205020404" pitchFamily="49" charset="0"/>
+                <a:cs typeface="Courier New" panose="02070309020205020404" pitchFamily="49" charset="0"/>
+              </a:rPr>
+              <a:t>blue</a:t>
+            </a:r>
+            <a:r>
+              <a:rPr lang="fr-FR" sz="1100" dirty="0" smtClean="0">
                 <a:latin typeface="Courier New" panose="02070309020205020404" pitchFamily="49" charset="0"/>
                 <a:cs typeface="Courier New" panose="02070309020205020404" pitchFamily="49" charset="0"/>
               </a:rPr>
@@ -6754,7 +8177,7 @@
           </a:p>
           <a:p>
             <a:r>
-              <a:rPr lang="fr-FR" sz="1000" dirty="0" smtClean="0">
+              <a:rPr lang="fr-FR" sz="1100" dirty="0" smtClean="0">
                 <a:latin typeface="Courier New" panose="02070309020205020404" pitchFamily="49" charset="0"/>
                 <a:cs typeface="Courier New" panose="02070309020205020404" pitchFamily="49" charset="0"/>
               </a:rPr>
@@ -6763,44 +8186,44 @@
           </a:p>
           <a:p>
             <a:r>
-              <a:rPr lang="fr-FR" sz="1000" dirty="0" smtClean="0">
+              <a:rPr lang="fr-FR" sz="1100" dirty="0" smtClean="0">
                 <a:latin typeface="Courier New" panose="02070309020205020404" pitchFamily="49" charset="0"/>
                 <a:cs typeface="Courier New" panose="02070309020205020404" pitchFamily="49" charset="0"/>
               </a:rPr>
               <a:t>    </a:t>
             </a:r>
             <a:r>
-              <a:rPr lang="fr-FR" sz="1000" dirty="0" err="1" smtClean="0">
+              <a:rPr lang="fr-FR" sz="1100" dirty="0" err="1" smtClean="0">
                 <a:latin typeface="Courier New" panose="02070309020205020404" pitchFamily="49" charset="0"/>
                 <a:cs typeface="Courier New" panose="02070309020205020404" pitchFamily="49" charset="0"/>
               </a:rPr>
               <a:t>np</a:t>
             </a:r>
             <a:r>
-              <a:rPr lang="fr-FR" sz="1000" dirty="0" smtClean="0">
-                <a:latin typeface="Courier New" panose="02070309020205020404" pitchFamily="49" charset="0"/>
-                <a:cs typeface="Courier New" panose="02070309020205020404" pitchFamily="49" charset="0"/>
-              </a:rPr>
-              <a:t>[0] = (0, i, 0)</a:t>
-            </a:r>
-          </a:p>
-          <a:p>
-            <a:r>
-              <a:rPr lang="fr-FR" sz="1000" dirty="0" smtClean="0">
+              <a:rPr lang="fr-FR" sz="1100" dirty="0" smtClean="0">
+                <a:latin typeface="Courier New" panose="02070309020205020404" pitchFamily="49" charset="0"/>
+                <a:cs typeface="Courier New" panose="02070309020205020404" pitchFamily="49" charset="0"/>
+              </a:rPr>
+              <a:t>[0] = (0, 0, i)</a:t>
+            </a:r>
+          </a:p>
+          <a:p>
+            <a:r>
+              <a:rPr lang="fr-FR" sz="1100" dirty="0" smtClean="0">
                 <a:latin typeface="Courier New" panose="02070309020205020404" pitchFamily="49" charset="0"/>
                 <a:cs typeface="Courier New" panose="02070309020205020404" pitchFamily="49" charset="0"/>
               </a:rPr>
               <a:t>    </a:t>
             </a:r>
             <a:r>
-              <a:rPr lang="fr-FR" sz="1000" dirty="0" err="1" smtClean="0">
+              <a:rPr lang="fr-FR" sz="1100" dirty="0" err="1" smtClean="0">
                 <a:latin typeface="Courier New" panose="02070309020205020404" pitchFamily="49" charset="0"/>
                 <a:cs typeface="Courier New" panose="02070309020205020404" pitchFamily="49" charset="0"/>
               </a:rPr>
               <a:t>np.write</a:t>
             </a:r>
             <a:r>
-              <a:rPr lang="fr-FR" sz="1000" dirty="0" smtClean="0">
+              <a:rPr lang="fr-FR" sz="1100" dirty="0" smtClean="0">
                 <a:latin typeface="Courier New" panose="02070309020205020404" pitchFamily="49" charset="0"/>
                 <a:cs typeface="Courier New" panose="02070309020205020404" pitchFamily="49" charset="0"/>
               </a:rPr>
@@ -6809,175 +8232,45 @@
           </a:p>
           <a:p>
             <a:r>
-              <a:rPr lang="fr-FR" sz="1000" dirty="0" smtClean="0">
+              <a:rPr lang="fr-FR" sz="1100" dirty="0" smtClean="0">
                 <a:latin typeface="Courier New" panose="02070309020205020404" pitchFamily="49" charset="0"/>
                 <a:cs typeface="Courier New" panose="02070309020205020404" pitchFamily="49" charset="0"/>
               </a:rPr>
               <a:t>    </a:t>
             </a:r>
             <a:r>
-              <a:rPr lang="fr-FR" sz="1000" dirty="0" err="1" smtClean="0">
+              <a:rPr lang="fr-FR" sz="1100" dirty="0" err="1" smtClean="0">
                 <a:latin typeface="Courier New" panose="02070309020205020404" pitchFamily="49" charset="0"/>
                 <a:cs typeface="Courier New" panose="02070309020205020404" pitchFamily="49" charset="0"/>
               </a:rPr>
               <a:t>time.sleep_ms</a:t>
             </a:r>
             <a:r>
-              <a:rPr lang="fr-FR" sz="1000" dirty="0" smtClean="0">
+              <a:rPr lang="fr-FR" sz="1100" dirty="0" smtClean="0">
                 <a:latin typeface="Courier New" panose="02070309020205020404" pitchFamily="49" charset="0"/>
                 <a:cs typeface="Courier New" panose="02070309020205020404" pitchFamily="49" charset="0"/>
               </a:rPr>
               <a:t>(</a:t>
             </a:r>
             <a:r>
-              <a:rPr lang="fr-FR" sz="1000" dirty="0" err="1" smtClean="0">
+              <a:rPr lang="fr-FR" sz="1100" dirty="0" err="1" smtClean="0">
                 <a:latin typeface="Courier New" panose="02070309020205020404" pitchFamily="49" charset="0"/>
                 <a:cs typeface="Courier New" panose="02070309020205020404" pitchFamily="49" charset="0"/>
               </a:rPr>
               <a:t>dt</a:t>
             </a:r>
             <a:r>
-              <a:rPr lang="fr-FR" sz="1000" dirty="0" smtClean="0">
+              <a:rPr lang="fr-FR" sz="1100" dirty="0" smtClean="0">
                 <a:latin typeface="Courier New" panose="02070309020205020404" pitchFamily="49" charset="0"/>
                 <a:cs typeface="Courier New" panose="02070309020205020404" pitchFamily="49" charset="0"/>
               </a:rPr>
               <a:t>)</a:t>
             </a:r>
-          </a:p>
-          <a:p>
-            <a:endParaRPr lang="fr-FR" sz="1000" dirty="0" smtClean="0">
+            <a:endParaRPr lang="fr-FR" sz="1100" dirty="0" smtClean="0">
               <a:latin typeface="Courier New" panose="02070309020205020404" pitchFamily="49" charset="0"/>
               <a:cs typeface="Courier New" panose="02070309020205020404" pitchFamily="49" charset="0"/>
             </a:endParaRPr>
           </a:p>
-          <a:p>
-            <a:r>
-              <a:rPr lang="fr-FR" sz="1000" dirty="0" err="1" smtClean="0">
-                <a:latin typeface="Courier New" panose="02070309020205020404" pitchFamily="49" charset="0"/>
-                <a:cs typeface="Courier New" panose="02070309020205020404" pitchFamily="49" charset="0"/>
-              </a:rPr>
-              <a:t>print</a:t>
-            </a:r>
-            <a:r>
-              <a:rPr lang="fr-FR" sz="1000" dirty="0" smtClean="0">
-                <a:latin typeface="Courier New" panose="02070309020205020404" pitchFamily="49" charset="0"/>
-                <a:cs typeface="Courier New" panose="02070309020205020404" pitchFamily="49" charset="0"/>
-              </a:rPr>
-              <a:t>("</a:t>
-            </a:r>
-            <a:r>
-              <a:rPr lang="fr-FR" sz="1000" dirty="0" err="1" smtClean="0">
-                <a:latin typeface="Courier New" panose="02070309020205020404" pitchFamily="49" charset="0"/>
-                <a:cs typeface="Courier New" panose="02070309020205020404" pitchFamily="49" charset="0"/>
-              </a:rPr>
-              <a:t>blue</a:t>
-            </a:r>
-            <a:r>
-              <a:rPr lang="fr-FR" sz="1000" dirty="0" smtClean="0">
-                <a:latin typeface="Courier New" panose="02070309020205020404" pitchFamily="49" charset="0"/>
-                <a:cs typeface="Courier New" panose="02070309020205020404" pitchFamily="49" charset="0"/>
-              </a:rPr>
-              <a:t>")</a:t>
-            </a:r>
-          </a:p>
-          <a:p>
-            <a:r>
-              <a:rPr lang="fr-FR" sz="1000" dirty="0" smtClean="0">
-                <a:latin typeface="Courier New" panose="02070309020205020404" pitchFamily="49" charset="0"/>
-                <a:cs typeface="Courier New" panose="02070309020205020404" pitchFamily="49" charset="0"/>
-              </a:rPr>
-              <a:t>for i in range(255):</a:t>
-            </a:r>
-          </a:p>
-          <a:p>
-            <a:r>
-              <a:rPr lang="fr-FR" sz="1000" dirty="0" smtClean="0">
-                <a:latin typeface="Courier New" panose="02070309020205020404" pitchFamily="49" charset="0"/>
-                <a:cs typeface="Courier New" panose="02070309020205020404" pitchFamily="49" charset="0"/>
-              </a:rPr>
-              <a:t>    </a:t>
-            </a:r>
-            <a:r>
-              <a:rPr lang="fr-FR" sz="1000" dirty="0" err="1" smtClean="0">
-                <a:latin typeface="Courier New" panose="02070309020205020404" pitchFamily="49" charset="0"/>
-                <a:cs typeface="Courier New" panose="02070309020205020404" pitchFamily="49" charset="0"/>
-              </a:rPr>
-              <a:t>np</a:t>
-            </a:r>
-            <a:r>
-              <a:rPr lang="fr-FR" sz="1000" dirty="0" smtClean="0">
-                <a:latin typeface="Courier New" panose="02070309020205020404" pitchFamily="49" charset="0"/>
-                <a:cs typeface="Courier New" panose="02070309020205020404" pitchFamily="49" charset="0"/>
-              </a:rPr>
-              <a:t>[0] = (0, 0, i)</a:t>
-            </a:r>
-          </a:p>
-          <a:p>
-            <a:r>
-              <a:rPr lang="fr-FR" sz="1000" dirty="0" smtClean="0">
-                <a:latin typeface="Courier New" panose="02070309020205020404" pitchFamily="49" charset="0"/>
-                <a:cs typeface="Courier New" panose="02070309020205020404" pitchFamily="49" charset="0"/>
-              </a:rPr>
-              <a:t>    </a:t>
-            </a:r>
-            <a:r>
-              <a:rPr lang="fr-FR" sz="1000" dirty="0" err="1" smtClean="0">
-                <a:latin typeface="Courier New" panose="02070309020205020404" pitchFamily="49" charset="0"/>
-                <a:cs typeface="Courier New" panose="02070309020205020404" pitchFamily="49" charset="0"/>
-              </a:rPr>
-              <a:t>np.write</a:t>
-            </a:r>
-            <a:r>
-              <a:rPr lang="fr-FR" sz="1000" dirty="0" smtClean="0">
-                <a:latin typeface="Courier New" panose="02070309020205020404" pitchFamily="49" charset="0"/>
-                <a:cs typeface="Courier New" panose="02070309020205020404" pitchFamily="49" charset="0"/>
-              </a:rPr>
-              <a:t>()</a:t>
-            </a:r>
-          </a:p>
-          <a:p>
-            <a:r>
-              <a:rPr lang="fr-FR" sz="1000" dirty="0" smtClean="0">
-                <a:latin typeface="Courier New" panose="02070309020205020404" pitchFamily="49" charset="0"/>
-                <a:cs typeface="Courier New" panose="02070309020205020404" pitchFamily="49" charset="0"/>
-              </a:rPr>
-              <a:t>    </a:t>
-            </a:r>
-            <a:r>
-              <a:rPr lang="fr-FR" sz="1000" dirty="0" err="1" smtClean="0">
-                <a:latin typeface="Courier New" panose="02070309020205020404" pitchFamily="49" charset="0"/>
-                <a:cs typeface="Courier New" panose="02070309020205020404" pitchFamily="49" charset="0"/>
-              </a:rPr>
-              <a:t>time.sleep_ms</a:t>
-            </a:r>
-            <a:r>
-              <a:rPr lang="fr-FR" sz="1000" dirty="0" smtClean="0">
-                <a:latin typeface="Courier New" panose="02070309020205020404" pitchFamily="49" charset="0"/>
-                <a:cs typeface="Courier New" panose="02070309020205020404" pitchFamily="49" charset="0"/>
-              </a:rPr>
-              <a:t>(</a:t>
-            </a:r>
-            <a:r>
-              <a:rPr lang="fr-FR" sz="1000" dirty="0" err="1" smtClean="0">
-                <a:latin typeface="Courier New" panose="02070309020205020404" pitchFamily="49" charset="0"/>
-                <a:cs typeface="Courier New" panose="02070309020205020404" pitchFamily="49" charset="0"/>
-              </a:rPr>
-              <a:t>dt</a:t>
-            </a:r>
-            <a:r>
-              <a:rPr lang="fr-FR" sz="1000" dirty="0" smtClean="0">
-                <a:latin typeface="Courier New" panose="02070309020205020404" pitchFamily="49" charset="0"/>
-                <a:cs typeface="Courier New" panose="02070309020205020404" pitchFamily="49" charset="0"/>
-              </a:rPr>
-              <a:t>)</a:t>
-            </a:r>
-          </a:p>
-          <a:p>
-            <a:endParaRPr lang="fr-FR" sz="1000" dirty="0" smtClean="0">
-              <a:latin typeface="Courier New" panose="02070309020205020404" pitchFamily="49" charset="0"/>
-              <a:cs typeface="Courier New" panose="02070309020205020404" pitchFamily="49" charset="0"/>
-            </a:endParaRPr>
-          </a:p>
         </p:txBody>
       </p:sp>
       <p:sp>
@@ -6988,7 +8281,7 @@
         </p:nvSpPr>
         <p:spPr>
           <a:xfrm>
-            <a:off x="8825502" y="3190714"/>
+            <a:off x="8234783" y="2713020"/>
             <a:ext cx="2774022" cy="3477875"/>
           </a:xfrm>
           <a:prstGeom prst="rect">
@@ -7011,44 +8304,152 @@
           </a:bodyPr>
           <a:lstStyle/>
           <a:p>
-            <a:endParaRPr lang="fr-FR" sz="1000" dirty="0" smtClean="0">
+            <a:r>
+              <a:rPr lang="fr-FR" sz="1100" dirty="0" err="1" smtClean="0">
+                <a:latin typeface="Courier New" panose="02070309020205020404" pitchFamily="49" charset="0"/>
+                <a:cs typeface="Courier New" panose="02070309020205020404" pitchFamily="49" charset="0"/>
+              </a:rPr>
+              <a:t>print</a:t>
+            </a:r>
+            <a:r>
+              <a:rPr lang="fr-FR" sz="1100" dirty="0" smtClean="0">
+                <a:latin typeface="Courier New" panose="02070309020205020404" pitchFamily="49" charset="0"/>
+                <a:cs typeface="Courier New" panose="02070309020205020404" pitchFamily="49" charset="0"/>
+              </a:rPr>
+              <a:t>("</a:t>
+            </a:r>
+            <a:r>
+              <a:rPr lang="fr-FR" sz="1100" dirty="0" err="1" smtClean="0">
+                <a:latin typeface="Courier New" panose="02070309020205020404" pitchFamily="49" charset="0"/>
+                <a:cs typeface="Courier New" panose="02070309020205020404" pitchFamily="49" charset="0"/>
+              </a:rPr>
+              <a:t>yellow</a:t>
+            </a:r>
+            <a:r>
+              <a:rPr lang="fr-FR" sz="1100" dirty="0" smtClean="0">
+                <a:latin typeface="Courier New" panose="02070309020205020404" pitchFamily="49" charset="0"/>
+                <a:cs typeface="Courier New" panose="02070309020205020404" pitchFamily="49" charset="0"/>
+              </a:rPr>
+              <a:t>")</a:t>
+            </a:r>
+          </a:p>
+          <a:p>
+            <a:r>
+              <a:rPr lang="fr-FR" sz="1100" dirty="0" smtClean="0">
+                <a:latin typeface="Courier New" panose="02070309020205020404" pitchFamily="49" charset="0"/>
+                <a:cs typeface="Courier New" panose="02070309020205020404" pitchFamily="49" charset="0"/>
+              </a:rPr>
+              <a:t>for i in range(255):</a:t>
+            </a:r>
+          </a:p>
+          <a:p>
+            <a:r>
+              <a:rPr lang="fr-FR" sz="1100" dirty="0" smtClean="0">
+                <a:latin typeface="Courier New" panose="02070309020205020404" pitchFamily="49" charset="0"/>
+                <a:cs typeface="Courier New" panose="02070309020205020404" pitchFamily="49" charset="0"/>
+              </a:rPr>
+              <a:t>    </a:t>
+            </a:r>
+            <a:r>
+              <a:rPr lang="fr-FR" sz="1100" dirty="0" err="1" smtClean="0">
+                <a:latin typeface="Courier New" panose="02070309020205020404" pitchFamily="49" charset="0"/>
+                <a:cs typeface="Courier New" panose="02070309020205020404" pitchFamily="49" charset="0"/>
+              </a:rPr>
+              <a:t>np</a:t>
+            </a:r>
+            <a:r>
+              <a:rPr lang="fr-FR" sz="1100" dirty="0" smtClean="0">
+                <a:latin typeface="Courier New" panose="02070309020205020404" pitchFamily="49" charset="0"/>
+                <a:cs typeface="Courier New" panose="02070309020205020404" pitchFamily="49" charset="0"/>
+              </a:rPr>
+              <a:t>[0] = (i, i, 0)</a:t>
+            </a:r>
+          </a:p>
+          <a:p>
+            <a:r>
+              <a:rPr lang="fr-FR" sz="1100" dirty="0" smtClean="0">
+                <a:latin typeface="Courier New" panose="02070309020205020404" pitchFamily="49" charset="0"/>
+                <a:cs typeface="Courier New" panose="02070309020205020404" pitchFamily="49" charset="0"/>
+              </a:rPr>
+              <a:t>    </a:t>
+            </a:r>
+            <a:r>
+              <a:rPr lang="fr-FR" sz="1100" dirty="0" err="1" smtClean="0">
+                <a:latin typeface="Courier New" panose="02070309020205020404" pitchFamily="49" charset="0"/>
+                <a:cs typeface="Courier New" panose="02070309020205020404" pitchFamily="49" charset="0"/>
+              </a:rPr>
+              <a:t>np.write</a:t>
+            </a:r>
+            <a:r>
+              <a:rPr lang="fr-FR" sz="1100" dirty="0" smtClean="0">
+                <a:latin typeface="Courier New" panose="02070309020205020404" pitchFamily="49" charset="0"/>
+                <a:cs typeface="Courier New" panose="02070309020205020404" pitchFamily="49" charset="0"/>
+              </a:rPr>
+              <a:t>()</a:t>
+            </a:r>
+          </a:p>
+          <a:p>
+            <a:r>
+              <a:rPr lang="fr-FR" sz="1100" dirty="0" smtClean="0">
+                <a:latin typeface="Courier New" panose="02070309020205020404" pitchFamily="49" charset="0"/>
+                <a:cs typeface="Courier New" panose="02070309020205020404" pitchFamily="49" charset="0"/>
+              </a:rPr>
+              <a:t>    </a:t>
+            </a:r>
+            <a:r>
+              <a:rPr lang="fr-FR" sz="1100" dirty="0" err="1" smtClean="0">
+                <a:latin typeface="Courier New" panose="02070309020205020404" pitchFamily="49" charset="0"/>
+                <a:cs typeface="Courier New" panose="02070309020205020404" pitchFamily="49" charset="0"/>
+              </a:rPr>
+              <a:t>time.sleep_ms</a:t>
+            </a:r>
+            <a:r>
+              <a:rPr lang="fr-FR" sz="1100" dirty="0" smtClean="0">
+                <a:latin typeface="Courier New" panose="02070309020205020404" pitchFamily="49" charset="0"/>
+                <a:cs typeface="Courier New" panose="02070309020205020404" pitchFamily="49" charset="0"/>
+              </a:rPr>
+              <a:t>(</a:t>
+            </a:r>
+            <a:r>
+              <a:rPr lang="fr-FR" sz="1100" dirty="0" err="1" smtClean="0">
+                <a:latin typeface="Courier New" panose="02070309020205020404" pitchFamily="49" charset="0"/>
+                <a:cs typeface="Courier New" panose="02070309020205020404" pitchFamily="49" charset="0"/>
+              </a:rPr>
+              <a:t>dt</a:t>
+            </a:r>
+            <a:r>
+              <a:rPr lang="fr-FR" sz="1100" dirty="0" smtClean="0">
+                <a:latin typeface="Courier New" panose="02070309020205020404" pitchFamily="49" charset="0"/>
+                <a:cs typeface="Courier New" panose="02070309020205020404" pitchFamily="49" charset="0"/>
+              </a:rPr>
+              <a:t>)</a:t>
+            </a:r>
+          </a:p>
+          <a:p>
+            <a:endParaRPr lang="fr-FR" sz="1100" dirty="0" smtClean="0">
               <a:latin typeface="Courier New" panose="02070309020205020404" pitchFamily="49" charset="0"/>
               <a:cs typeface="Courier New" panose="02070309020205020404" pitchFamily="49" charset="0"/>
             </a:endParaRPr>
           </a:p>
           <a:p>
             <a:r>
-              <a:rPr lang="fr-FR" sz="1000" dirty="0" err="1" smtClean="0">
+              <a:rPr lang="fr-FR" sz="1100" dirty="0" err="1" smtClean="0">
                 <a:latin typeface="Courier New" panose="02070309020205020404" pitchFamily="49" charset="0"/>
                 <a:cs typeface="Courier New" panose="02070309020205020404" pitchFamily="49" charset="0"/>
               </a:rPr>
               <a:t>print</a:t>
             </a:r>
             <a:r>
-              <a:rPr lang="fr-FR" sz="1000" dirty="0" smtClean="0">
-                <a:latin typeface="Courier New" panose="02070309020205020404" pitchFamily="49" charset="0"/>
-                <a:cs typeface="Courier New" panose="02070309020205020404" pitchFamily="49" charset="0"/>
-              </a:rPr>
-              <a:t>("</a:t>
-            </a:r>
-            <a:r>
-              <a:rPr lang="fr-FR" sz="1000" dirty="0" err="1" smtClean="0">
-                <a:latin typeface="Courier New" panose="02070309020205020404" pitchFamily="49" charset="0"/>
-                <a:cs typeface="Courier New" panose="02070309020205020404" pitchFamily="49" charset="0"/>
-              </a:rPr>
-              <a:t>yellow</a:t>
-            </a:r>
-            <a:r>
-              <a:rPr lang="fr-FR" sz="1000" dirty="0" smtClean="0">
-                <a:latin typeface="Courier New" panose="02070309020205020404" pitchFamily="49" charset="0"/>
-                <a:cs typeface="Courier New" panose="02070309020205020404" pitchFamily="49" charset="0"/>
-              </a:rPr>
-              <a:t>")</a:t>
-            </a:r>
-          </a:p>
-          <a:p>
-            <a:r>
-              <a:rPr lang="fr-FR" sz="1000" dirty="0" smtClean="0">
+              <a:rPr lang="fr-FR" sz="1100" dirty="0" smtClean="0">
+                <a:latin typeface="Courier New" panose="02070309020205020404" pitchFamily="49" charset="0"/>
+                <a:cs typeface="Courier New" panose="02070309020205020404" pitchFamily="49" charset="0"/>
+              </a:rPr>
+              <a:t>("cyan")</a:t>
+            </a:r>
+          </a:p>
+          <a:p>
+            <a:r>
+              <a:rPr lang="fr-FR" sz="1100" dirty="0" smtClean="0">
                 <a:latin typeface="Courier New" panose="02070309020205020404" pitchFamily="49" charset="0"/>
                 <a:cs typeface="Courier New" panose="02070309020205020404" pitchFamily="49" charset="0"/>
               </a:rPr>
@@ -7057,44 +8458,44 @@
           </a:p>
           <a:p>
             <a:r>
-              <a:rPr lang="fr-FR" sz="1000" dirty="0" smtClean="0">
+              <a:rPr lang="fr-FR" sz="1100" dirty="0" smtClean="0">
                 <a:latin typeface="Courier New" panose="02070309020205020404" pitchFamily="49" charset="0"/>
                 <a:cs typeface="Courier New" panose="02070309020205020404" pitchFamily="49" charset="0"/>
               </a:rPr>
               <a:t>    </a:t>
             </a:r>
             <a:r>
-              <a:rPr lang="fr-FR" sz="1000" dirty="0" err="1" smtClean="0">
+              <a:rPr lang="fr-FR" sz="1100" dirty="0" err="1" smtClean="0">
                 <a:latin typeface="Courier New" panose="02070309020205020404" pitchFamily="49" charset="0"/>
                 <a:cs typeface="Courier New" panose="02070309020205020404" pitchFamily="49" charset="0"/>
               </a:rPr>
               <a:t>np</a:t>
             </a:r>
             <a:r>
-              <a:rPr lang="fr-FR" sz="1000" dirty="0" smtClean="0">
-                <a:latin typeface="Courier New" panose="02070309020205020404" pitchFamily="49" charset="0"/>
-                <a:cs typeface="Courier New" panose="02070309020205020404" pitchFamily="49" charset="0"/>
-              </a:rPr>
-              <a:t>[0] = (i, i, 0)</a:t>
-            </a:r>
-          </a:p>
-          <a:p>
-            <a:r>
-              <a:rPr lang="fr-FR" sz="1000" dirty="0" smtClean="0">
+              <a:rPr lang="fr-FR" sz="1100" dirty="0" smtClean="0">
+                <a:latin typeface="Courier New" panose="02070309020205020404" pitchFamily="49" charset="0"/>
+                <a:cs typeface="Courier New" panose="02070309020205020404" pitchFamily="49" charset="0"/>
+              </a:rPr>
+              <a:t>[0] = (i, 0, i)</a:t>
+            </a:r>
+          </a:p>
+          <a:p>
+            <a:r>
+              <a:rPr lang="fr-FR" sz="1100" dirty="0" smtClean="0">
                 <a:latin typeface="Courier New" panose="02070309020205020404" pitchFamily="49" charset="0"/>
                 <a:cs typeface="Courier New" panose="02070309020205020404" pitchFamily="49" charset="0"/>
               </a:rPr>
               <a:t>    </a:t>
             </a:r>
             <a:r>
-              <a:rPr lang="fr-FR" sz="1000" dirty="0" err="1" smtClean="0">
+              <a:rPr lang="fr-FR" sz="1100" dirty="0" err="1" smtClean="0">
                 <a:latin typeface="Courier New" panose="02070309020205020404" pitchFamily="49" charset="0"/>
                 <a:cs typeface="Courier New" panose="02070309020205020404" pitchFamily="49" charset="0"/>
               </a:rPr>
               <a:t>np.write</a:t>
             </a:r>
             <a:r>
-              <a:rPr lang="fr-FR" sz="1000" dirty="0" smtClean="0">
+              <a:rPr lang="fr-FR" sz="1100" dirty="0" smtClean="0">
                 <a:latin typeface="Courier New" panose="02070309020205020404" pitchFamily="49" charset="0"/>
                 <a:cs typeface="Courier New" panose="02070309020205020404" pitchFamily="49" charset="0"/>
               </a:rPr>
@@ -7103,35 +8504,35 @@
           </a:p>
           <a:p>
             <a:r>
-              <a:rPr lang="fr-FR" sz="1000" dirty="0" smtClean="0">
+              <a:rPr lang="fr-FR" sz="1100" dirty="0" smtClean="0">
                 <a:latin typeface="Courier New" panose="02070309020205020404" pitchFamily="49" charset="0"/>
                 <a:cs typeface="Courier New" panose="02070309020205020404" pitchFamily="49" charset="0"/>
               </a:rPr>
               <a:t>    </a:t>
             </a:r>
             <a:r>
-              <a:rPr lang="fr-FR" sz="1000" dirty="0" err="1" smtClean="0">
+              <a:rPr lang="fr-FR" sz="1100" dirty="0" err="1" smtClean="0">
                 <a:latin typeface="Courier New" panose="02070309020205020404" pitchFamily="49" charset="0"/>
                 <a:cs typeface="Courier New" panose="02070309020205020404" pitchFamily="49" charset="0"/>
               </a:rPr>
               <a:t>time.sleep_ms</a:t>
             </a:r>
             <a:r>
-              <a:rPr lang="fr-FR" sz="1000" dirty="0" smtClean="0">
+              <a:rPr lang="fr-FR" sz="1100" dirty="0" smtClean="0">
                 <a:latin typeface="Courier New" panose="02070309020205020404" pitchFamily="49" charset="0"/>
                 <a:cs typeface="Courier New" panose="02070309020205020404" pitchFamily="49" charset="0"/>
               </a:rPr>
               <a:t>(</a:t>
             </a:r>
             <a:r>
-              <a:rPr lang="fr-FR" sz="1000" dirty="0" err="1" smtClean="0">
+              <a:rPr lang="fr-FR" sz="1100" dirty="0" err="1" smtClean="0">
                 <a:latin typeface="Courier New" panose="02070309020205020404" pitchFamily="49" charset="0"/>
                 <a:cs typeface="Courier New" panose="02070309020205020404" pitchFamily="49" charset="0"/>
               </a:rPr>
               <a:t>dt</a:t>
             </a:r>
             <a:r>
-              <a:rPr lang="fr-FR" sz="1000" dirty="0" smtClean="0">
+              <a:rPr lang="fr-FR" sz="1100" dirty="0" smtClean="0">
                 <a:latin typeface="Courier New" panose="02070309020205020404" pitchFamily="49" charset="0"/>
                 <a:cs typeface="Courier New" panose="02070309020205020404" pitchFamily="49" charset="0"/>
               </a:rPr>
@@ -7139,30 +8540,30 @@
             </a:r>
           </a:p>
           <a:p>
-            <a:endParaRPr lang="fr-FR" sz="1000" dirty="0" smtClean="0">
+            <a:endParaRPr lang="fr-FR" sz="1100" dirty="0" smtClean="0">
               <a:latin typeface="Courier New" panose="02070309020205020404" pitchFamily="49" charset="0"/>
               <a:cs typeface="Courier New" panose="02070309020205020404" pitchFamily="49" charset="0"/>
             </a:endParaRPr>
           </a:p>
           <a:p>
             <a:r>
-              <a:rPr lang="fr-FR" sz="1000" dirty="0" err="1" smtClean="0">
+              <a:rPr lang="fr-FR" sz="1100" dirty="0" err="1" smtClean="0">
                 <a:latin typeface="Courier New" panose="02070309020205020404" pitchFamily="49" charset="0"/>
                 <a:cs typeface="Courier New" panose="02070309020205020404" pitchFamily="49" charset="0"/>
               </a:rPr>
               <a:t>print</a:t>
             </a:r>
             <a:r>
-              <a:rPr lang="fr-FR" sz="1000" dirty="0" smtClean="0">
-                <a:latin typeface="Courier New" panose="02070309020205020404" pitchFamily="49" charset="0"/>
-                <a:cs typeface="Courier New" panose="02070309020205020404" pitchFamily="49" charset="0"/>
-              </a:rPr>
-              <a:t>("cyan")</a:t>
-            </a:r>
-          </a:p>
-          <a:p>
-            <a:r>
-              <a:rPr lang="fr-FR" sz="1000" dirty="0" smtClean="0">
+              <a:rPr lang="fr-FR" sz="1100" dirty="0" smtClean="0">
+                <a:latin typeface="Courier New" panose="02070309020205020404" pitchFamily="49" charset="0"/>
+                <a:cs typeface="Courier New" panose="02070309020205020404" pitchFamily="49" charset="0"/>
+              </a:rPr>
+              <a:t>("violet")</a:t>
+            </a:r>
+          </a:p>
+          <a:p>
+            <a:r>
+              <a:rPr lang="fr-FR" sz="1100" dirty="0" smtClean="0">
                 <a:latin typeface="Courier New" panose="02070309020205020404" pitchFamily="49" charset="0"/>
                 <a:cs typeface="Courier New" panose="02070309020205020404" pitchFamily="49" charset="0"/>
               </a:rPr>
@@ -7171,44 +8572,44 @@
           </a:p>
           <a:p>
             <a:r>
-              <a:rPr lang="fr-FR" sz="1000" dirty="0" smtClean="0">
+              <a:rPr lang="fr-FR" sz="1100" dirty="0" smtClean="0">
                 <a:latin typeface="Courier New" panose="02070309020205020404" pitchFamily="49" charset="0"/>
                 <a:cs typeface="Courier New" panose="02070309020205020404" pitchFamily="49" charset="0"/>
               </a:rPr>
               <a:t>    </a:t>
             </a:r>
             <a:r>
-              <a:rPr lang="fr-FR" sz="1000" dirty="0" err="1" smtClean="0">
+              <a:rPr lang="fr-FR" sz="1100" dirty="0" err="1" smtClean="0">
                 <a:latin typeface="Courier New" panose="02070309020205020404" pitchFamily="49" charset="0"/>
                 <a:cs typeface="Courier New" panose="02070309020205020404" pitchFamily="49" charset="0"/>
               </a:rPr>
               <a:t>np</a:t>
             </a:r>
             <a:r>
-              <a:rPr lang="fr-FR" sz="1000" dirty="0" smtClean="0">
-                <a:latin typeface="Courier New" panose="02070309020205020404" pitchFamily="49" charset="0"/>
-                <a:cs typeface="Courier New" panose="02070309020205020404" pitchFamily="49" charset="0"/>
-              </a:rPr>
-              <a:t>[0] = (i, 0, i)</a:t>
-            </a:r>
-          </a:p>
-          <a:p>
-            <a:r>
-              <a:rPr lang="fr-FR" sz="1000" dirty="0" smtClean="0">
+              <a:rPr lang="fr-FR" sz="1100" dirty="0" smtClean="0">
+                <a:latin typeface="Courier New" panose="02070309020205020404" pitchFamily="49" charset="0"/>
+                <a:cs typeface="Courier New" panose="02070309020205020404" pitchFamily="49" charset="0"/>
+              </a:rPr>
+              <a:t>[0] = (0, i, i)</a:t>
+            </a:r>
+          </a:p>
+          <a:p>
+            <a:r>
+              <a:rPr lang="fr-FR" sz="1100" dirty="0" smtClean="0">
                 <a:latin typeface="Courier New" panose="02070309020205020404" pitchFamily="49" charset="0"/>
                 <a:cs typeface="Courier New" panose="02070309020205020404" pitchFamily="49" charset="0"/>
               </a:rPr>
               <a:t>    </a:t>
             </a:r>
             <a:r>
-              <a:rPr lang="fr-FR" sz="1000" dirty="0" err="1" smtClean="0">
+              <a:rPr lang="fr-FR" sz="1100" dirty="0" err="1" smtClean="0">
                 <a:latin typeface="Courier New" panose="02070309020205020404" pitchFamily="49" charset="0"/>
                 <a:cs typeface="Courier New" panose="02070309020205020404" pitchFamily="49" charset="0"/>
               </a:rPr>
               <a:t>np.write</a:t>
             </a:r>
             <a:r>
-              <a:rPr lang="fr-FR" sz="1000" dirty="0" smtClean="0">
+              <a:rPr lang="fr-FR" sz="1100" dirty="0" smtClean="0">
                 <a:latin typeface="Courier New" panose="02070309020205020404" pitchFamily="49" charset="0"/>
                 <a:cs typeface="Courier New" panose="02070309020205020404" pitchFamily="49" charset="0"/>
               </a:rPr>
@@ -7217,35 +8618,35 @@
           </a:p>
           <a:p>
             <a:r>
-              <a:rPr lang="fr-FR" sz="1000" dirty="0" smtClean="0">
+              <a:rPr lang="fr-FR" sz="1100" dirty="0" smtClean="0">
                 <a:latin typeface="Courier New" panose="02070309020205020404" pitchFamily="49" charset="0"/>
                 <a:cs typeface="Courier New" panose="02070309020205020404" pitchFamily="49" charset="0"/>
               </a:rPr>
               <a:t>    </a:t>
             </a:r>
             <a:r>
-              <a:rPr lang="fr-FR" sz="1000" dirty="0" err="1" smtClean="0">
+              <a:rPr lang="fr-FR" sz="1100" dirty="0" err="1" smtClean="0">
                 <a:latin typeface="Courier New" panose="02070309020205020404" pitchFamily="49" charset="0"/>
                 <a:cs typeface="Courier New" panose="02070309020205020404" pitchFamily="49" charset="0"/>
               </a:rPr>
               <a:t>time.sleep_ms</a:t>
             </a:r>
             <a:r>
-              <a:rPr lang="fr-FR" sz="1000" dirty="0" smtClean="0">
+              <a:rPr lang="fr-FR" sz="1100" dirty="0" smtClean="0">
                 <a:latin typeface="Courier New" panose="02070309020205020404" pitchFamily="49" charset="0"/>
                 <a:cs typeface="Courier New" panose="02070309020205020404" pitchFamily="49" charset="0"/>
               </a:rPr>
               <a:t>(</a:t>
             </a:r>
             <a:r>
-              <a:rPr lang="fr-FR" sz="1000" dirty="0" err="1" smtClean="0">
+              <a:rPr lang="fr-FR" sz="1100" dirty="0" err="1" smtClean="0">
                 <a:latin typeface="Courier New" panose="02070309020205020404" pitchFamily="49" charset="0"/>
                 <a:cs typeface="Courier New" panose="02070309020205020404" pitchFamily="49" charset="0"/>
               </a:rPr>
               <a:t>dt</a:t>
             </a:r>
             <a:r>
-              <a:rPr lang="fr-FR" sz="1000" dirty="0" smtClean="0">
+              <a:rPr lang="fr-FR" sz="1100" dirty="0" smtClean="0">
                 <a:latin typeface="Courier New" panose="02070309020205020404" pitchFamily="49" charset="0"/>
                 <a:cs typeface="Courier New" panose="02070309020205020404" pitchFamily="49" charset="0"/>
               </a:rPr>
@@ -7253,159 +8654,43 @@
             </a:r>
           </a:p>
           <a:p>
-            <a:endParaRPr lang="fr-FR" sz="1000" dirty="0" smtClean="0">
+            <a:endParaRPr lang="fr-FR" sz="1100" dirty="0" smtClean="0">
               <a:latin typeface="Courier New" panose="02070309020205020404" pitchFamily="49" charset="0"/>
               <a:cs typeface="Courier New" panose="02070309020205020404" pitchFamily="49" charset="0"/>
             </a:endParaRPr>
           </a:p>
           <a:p>
             <a:r>
-              <a:rPr lang="fr-FR" sz="1000" dirty="0" err="1" smtClean="0">
-                <a:latin typeface="Courier New" panose="02070309020205020404" pitchFamily="49" charset="0"/>
-                <a:cs typeface="Courier New" panose="02070309020205020404" pitchFamily="49" charset="0"/>
-              </a:rPr>
-              <a:t>print</a:t>
-            </a:r>
-            <a:r>
-              <a:rPr lang="fr-FR" sz="1000" dirty="0" smtClean="0">
-                <a:latin typeface="Courier New" panose="02070309020205020404" pitchFamily="49" charset="0"/>
-                <a:cs typeface="Courier New" panose="02070309020205020404" pitchFamily="49" charset="0"/>
-              </a:rPr>
-              <a:t>("violet")</a:t>
-            </a:r>
-          </a:p>
-          <a:p>
-            <a:r>
-              <a:rPr lang="fr-FR" sz="1000" dirty="0" smtClean="0">
-                <a:latin typeface="Courier New" panose="02070309020205020404" pitchFamily="49" charset="0"/>
-                <a:cs typeface="Courier New" panose="02070309020205020404" pitchFamily="49" charset="0"/>
-              </a:rPr>
-              <a:t>for i in range(255):</a:t>
-            </a:r>
-          </a:p>
-          <a:p>
-            <a:r>
-              <a:rPr lang="fr-FR" sz="1000" dirty="0" smtClean="0">
-                <a:latin typeface="Courier New" panose="02070309020205020404" pitchFamily="49" charset="0"/>
-                <a:cs typeface="Courier New" panose="02070309020205020404" pitchFamily="49" charset="0"/>
-              </a:rPr>
-              <a:t>    </a:t>
-            </a:r>
-            <a:r>
-              <a:rPr lang="fr-FR" sz="1000" dirty="0" err="1" smtClean="0">
+              <a:rPr lang="fr-FR" sz="1100" dirty="0" err="1" smtClean="0">
                 <a:latin typeface="Courier New" panose="02070309020205020404" pitchFamily="49" charset="0"/>
                 <a:cs typeface="Courier New" panose="02070309020205020404" pitchFamily="49" charset="0"/>
               </a:rPr>
               <a:t>np</a:t>
             </a:r>
             <a:r>
-              <a:rPr lang="fr-FR" sz="1000" dirty="0" smtClean="0">
-                <a:latin typeface="Courier New" panose="02070309020205020404" pitchFamily="49" charset="0"/>
-                <a:cs typeface="Courier New" panose="02070309020205020404" pitchFamily="49" charset="0"/>
-              </a:rPr>
-              <a:t>[0] = (0, i, i)</a:t>
-            </a:r>
-          </a:p>
-          <a:p>
-            <a:r>
-              <a:rPr lang="fr-FR" sz="1000" dirty="0" smtClean="0">
-                <a:latin typeface="Courier New" panose="02070309020205020404" pitchFamily="49" charset="0"/>
-                <a:cs typeface="Courier New" panose="02070309020205020404" pitchFamily="49" charset="0"/>
-              </a:rPr>
-              <a:t>    </a:t>
-            </a:r>
-            <a:r>
-              <a:rPr lang="fr-FR" sz="1000" dirty="0" err="1" smtClean="0">
+              <a:rPr lang="fr-FR" sz="1100" dirty="0" smtClean="0">
+                <a:latin typeface="Courier New" panose="02070309020205020404" pitchFamily="49" charset="0"/>
+                <a:cs typeface="Courier New" panose="02070309020205020404" pitchFamily="49" charset="0"/>
+              </a:rPr>
+              <a:t>[0] = (0, 0, 0)</a:t>
+            </a:r>
+          </a:p>
+          <a:p>
+            <a:r>
+              <a:rPr lang="fr-FR" sz="1100" dirty="0" err="1" smtClean="0">
                 <a:latin typeface="Courier New" panose="02070309020205020404" pitchFamily="49" charset="0"/>
                 <a:cs typeface="Courier New" panose="02070309020205020404" pitchFamily="49" charset="0"/>
               </a:rPr>
               <a:t>np.write</a:t>
             </a:r>
             <a:r>
-              <a:rPr lang="fr-FR" sz="1000" dirty="0" smtClean="0">
+              <a:rPr lang="fr-FR" sz="1100" dirty="0" smtClean="0">
                 <a:latin typeface="Courier New" panose="02070309020205020404" pitchFamily="49" charset="0"/>
                 <a:cs typeface="Courier New" panose="02070309020205020404" pitchFamily="49" charset="0"/>
               </a:rPr>
               <a:t>()</a:t>
             </a:r>
-          </a:p>
-          <a:p>
-            <a:r>
-              <a:rPr lang="fr-FR" sz="1000" dirty="0" smtClean="0">
-                <a:latin typeface="Courier New" panose="02070309020205020404" pitchFamily="49" charset="0"/>
-                <a:cs typeface="Courier New" panose="02070309020205020404" pitchFamily="49" charset="0"/>
-              </a:rPr>
-              <a:t>    </a:t>
-            </a:r>
-            <a:r>
-              <a:rPr lang="fr-FR" sz="1000" dirty="0" err="1" smtClean="0">
-                <a:latin typeface="Courier New" panose="02070309020205020404" pitchFamily="49" charset="0"/>
-                <a:cs typeface="Courier New" panose="02070309020205020404" pitchFamily="49" charset="0"/>
-              </a:rPr>
-              <a:t>time.sleep_ms</a:t>
-            </a:r>
-            <a:r>
-              <a:rPr lang="fr-FR" sz="1000" dirty="0" smtClean="0">
-                <a:latin typeface="Courier New" panose="02070309020205020404" pitchFamily="49" charset="0"/>
-                <a:cs typeface="Courier New" panose="02070309020205020404" pitchFamily="49" charset="0"/>
-              </a:rPr>
-              <a:t>(</a:t>
-            </a:r>
-            <a:r>
-              <a:rPr lang="fr-FR" sz="1000" dirty="0" err="1" smtClean="0">
-                <a:latin typeface="Courier New" panose="02070309020205020404" pitchFamily="49" charset="0"/>
-                <a:cs typeface="Courier New" panose="02070309020205020404" pitchFamily="49" charset="0"/>
-              </a:rPr>
-              <a:t>dt</a:t>
-            </a:r>
-            <a:r>
-              <a:rPr lang="fr-FR" sz="1000" dirty="0" smtClean="0">
-                <a:latin typeface="Courier New" panose="02070309020205020404" pitchFamily="49" charset="0"/>
-                <a:cs typeface="Courier New" panose="02070309020205020404" pitchFamily="49" charset="0"/>
-              </a:rPr>
-              <a:t>)</a:t>
-            </a:r>
-          </a:p>
-          <a:p>
-            <a:endParaRPr lang="fr-FR" sz="1000" dirty="0" smtClean="0">
-              <a:latin typeface="Courier New" panose="02070309020205020404" pitchFamily="49" charset="0"/>
-              <a:cs typeface="Courier New" panose="02070309020205020404" pitchFamily="49" charset="0"/>
-            </a:endParaRPr>
-          </a:p>
-          <a:p>
-            <a:r>
-              <a:rPr lang="fr-FR" sz="1000" dirty="0" err="1" smtClean="0">
-                <a:latin typeface="Courier New" panose="02070309020205020404" pitchFamily="49" charset="0"/>
-                <a:cs typeface="Courier New" panose="02070309020205020404" pitchFamily="49" charset="0"/>
-              </a:rPr>
-              <a:t>np</a:t>
-            </a:r>
-            <a:r>
-              <a:rPr lang="fr-FR" sz="1000" dirty="0" smtClean="0">
-                <a:latin typeface="Courier New" panose="02070309020205020404" pitchFamily="49" charset="0"/>
-                <a:cs typeface="Courier New" panose="02070309020205020404" pitchFamily="49" charset="0"/>
-              </a:rPr>
-              <a:t>[0] = (0, 0, 0)</a:t>
-            </a:r>
-          </a:p>
-          <a:p>
-            <a:r>
-              <a:rPr lang="fr-FR" sz="1000" dirty="0" err="1" smtClean="0">
-                <a:latin typeface="Courier New" panose="02070309020205020404" pitchFamily="49" charset="0"/>
-                <a:cs typeface="Courier New" panose="02070309020205020404" pitchFamily="49" charset="0"/>
-              </a:rPr>
-              <a:t>np.write</a:t>
-            </a:r>
-            <a:r>
-              <a:rPr lang="fr-FR" sz="1000" dirty="0" smtClean="0">
-                <a:latin typeface="Courier New" panose="02070309020205020404" pitchFamily="49" charset="0"/>
-                <a:cs typeface="Courier New" panose="02070309020205020404" pitchFamily="49" charset="0"/>
-              </a:rPr>
-              <a:t>()</a:t>
-            </a:r>
-          </a:p>
-          <a:p>
-            <a:endParaRPr lang="fr-FR" sz="1000" dirty="0" smtClean="0">
+            <a:endParaRPr lang="fr-FR" sz="1100" dirty="0" smtClean="0">
               <a:latin typeface="Courier New" panose="02070309020205020404" pitchFamily="49" charset="0"/>
               <a:cs typeface="Courier New" panose="02070309020205020404" pitchFamily="49" charset="0"/>
             </a:endParaRPr>
@@ -7425,8 +8710,8 @@
           </a:xfrm>
           <a:prstGeom prst="wedgeRectCallout">
             <a:avLst>
-              <a:gd name="adj1" fmla="val -143529"/>
-              <a:gd name="adj2" fmla="val -16942"/>
+              <a:gd name="adj1" fmla="val -139170"/>
+              <a:gd name="adj2" fmla="val -23669"/>
             </a:avLst>
           </a:prstGeom>
           <a:ln w="12700"/>
@@ -7478,13 +8763,13 @@
         </p:nvSpPr>
         <p:spPr>
           <a:xfrm>
-            <a:off x="5390516" y="2485080"/>
+            <a:off x="3853030" y="2769696"/>
             <a:ext cx="3155872" cy="842035"/>
           </a:xfrm>
           <a:prstGeom prst="wedgeRectCallout">
             <a:avLst>
-              <a:gd name="adj1" fmla="val -156877"/>
-              <a:gd name="adj2" fmla="val -55987"/>
+              <a:gd name="adj1" fmla="val -121236"/>
+              <a:gd name="adj2" fmla="val -91544"/>
             </a:avLst>
           </a:prstGeom>
           <a:ln w="12700"/>
@@ -7532,6 +8817,805 @@
     <p:extLst>
       <p:ext uri="{BB962C8B-B14F-4D97-AF65-F5344CB8AC3E}">
         <p14:creationId xmlns:p14="http://schemas.microsoft.com/office/powerpoint/2010/main" val="2852874858"/>
+      </p:ext>
+    </p:extLst>
+  </p:cSld>
+  <p:clrMapOvr>
+    <a:masterClrMapping/>
+  </p:clrMapOvr>
+</p:sld>
+</file>
+
+<file path=ppt/slides/slide9.xml><?xml version="1.0" encoding="utf-8"?>
+<p:sld xmlns:a="http://schemas.openxmlformats.org/drawingml/2006/main" xmlns:r="http://schemas.openxmlformats.org/officeDocument/2006/relationships" xmlns:p="http://schemas.openxmlformats.org/presentationml/2006/main">
+  <p:cSld>
+    <p:spTree>
+      <p:nvGrpSpPr>
+        <p:cNvPr id="1" name=""/>
+        <p:cNvGrpSpPr/>
+        <p:nvPr/>
+      </p:nvGrpSpPr>
+      <p:grpSpPr>
+        <a:xfrm>
+          <a:off x="0" y="0"/>
+          <a:ext cx="0" cy="0"/>
+          <a:chOff x="0" y="0"/>
+          <a:chExt cx="0" cy="0"/>
+        </a:xfrm>
+      </p:grpSpPr>
+      <p:sp>
+        <p:nvSpPr>
+          <p:cNvPr id="2" name="Titre 1"/>
+          <p:cNvSpPr>
+            <a:spLocks noGrp="1"/>
+          </p:cNvSpPr>
+          <p:nvPr>
+            <p:ph type="title"/>
+          </p:nvPr>
+        </p:nvSpPr>
+        <p:spPr/>
+        <p:txBody>
+          <a:bodyPr/>
+          <a:lstStyle/>
+          <a:p>
+            <a:r>
+              <a:rPr lang="fr-FR" dirty="0" smtClean="0"/>
+              <a:t>Serveur Web</a:t>
+            </a:r>
+            <a:endParaRPr lang="fr-FR" dirty="0"/>
+          </a:p>
+        </p:txBody>
+      </p:sp>
+      <p:sp>
+        <p:nvSpPr>
+          <p:cNvPr id="4" name="Rectangle 3"/>
+          <p:cNvSpPr/>
+          <p:nvPr/>
+        </p:nvSpPr>
+        <p:spPr>
+          <a:xfrm>
+            <a:off x="445526" y="1467442"/>
+            <a:ext cx="4846665" cy="5262979"/>
+          </a:xfrm>
+          <a:prstGeom prst="rect">
+            <a:avLst/>
+          </a:prstGeom>
+          <a:solidFill>
+            <a:schemeClr val="bg1">
+              <a:lumMod val="95000"/>
+            </a:schemeClr>
+          </a:solidFill>
+          <a:ln w="19050">
+            <a:solidFill>
+              <a:srgbClr val="FF0000"/>
+            </a:solidFill>
+          </a:ln>
+        </p:spPr>
+        <p:txBody>
+          <a:bodyPr wrap="square">
+            <a:spAutoFit/>
+          </a:bodyPr>
+          <a:lstStyle/>
+          <a:p>
+            <a:r>
+              <a:rPr lang="fr-FR" sz="1200" dirty="0" smtClean="0"/>
+              <a:t>import </a:t>
+            </a:r>
+            <a:r>
+              <a:rPr lang="fr-FR" sz="1200" dirty="0"/>
+              <a:t>socket</a:t>
+            </a:r>
+          </a:p>
+          <a:p>
+            <a:r>
+              <a:rPr lang="fr-FR" sz="1200" dirty="0" smtClean="0"/>
+              <a:t>import </a:t>
+            </a:r>
+            <a:r>
+              <a:rPr lang="fr-FR" sz="1200" dirty="0"/>
+              <a:t>select</a:t>
+            </a:r>
+          </a:p>
+          <a:p>
+            <a:r>
+              <a:rPr lang="fr-FR" sz="1200" dirty="0" smtClean="0"/>
+              <a:t>import network</a:t>
+            </a:r>
+            <a:endParaRPr lang="fr-FR" sz="1200" dirty="0"/>
+          </a:p>
+          <a:p>
+            <a:r>
+              <a:rPr lang="fr-FR" sz="1200" dirty="0"/>
+              <a:t>import </a:t>
+            </a:r>
+            <a:r>
+              <a:rPr lang="fr-FR" sz="1200" dirty="0" smtClean="0"/>
+              <a:t>esp</a:t>
+            </a:r>
+            <a:endParaRPr lang="fr-FR" sz="1200" dirty="0"/>
+          </a:p>
+          <a:p>
+            <a:r>
+              <a:rPr lang="fr-FR" sz="1200" dirty="0" err="1"/>
+              <a:t>from</a:t>
+            </a:r>
+            <a:r>
+              <a:rPr lang="fr-FR" sz="1200" dirty="0"/>
+              <a:t> machine import Pin, ADC</a:t>
+            </a:r>
+          </a:p>
+          <a:p>
+            <a:endParaRPr lang="fr-FR" sz="1200" dirty="0"/>
+          </a:p>
+          <a:p>
+            <a:r>
+              <a:rPr lang="fr-FR" sz="1200" dirty="0" err="1"/>
+              <a:t>esp.osdebug</a:t>
+            </a:r>
+            <a:r>
+              <a:rPr lang="fr-FR" sz="1200" dirty="0"/>
+              <a:t>(None)</a:t>
+            </a:r>
+          </a:p>
+          <a:p>
+            <a:endParaRPr lang="fr-FR" sz="1200" dirty="0"/>
+          </a:p>
+          <a:p>
+            <a:r>
+              <a:rPr lang="fr-FR" sz="1200" dirty="0"/>
+              <a:t>import </a:t>
+            </a:r>
+            <a:r>
+              <a:rPr lang="fr-FR" sz="1200" dirty="0" err="1"/>
+              <a:t>gc</a:t>
+            </a:r>
+            <a:endParaRPr lang="fr-FR" sz="1200" dirty="0"/>
+          </a:p>
+          <a:p>
+            <a:r>
+              <a:rPr lang="fr-FR" sz="1200" dirty="0" err="1"/>
+              <a:t>gc.collect</a:t>
+            </a:r>
+            <a:r>
+              <a:rPr lang="fr-FR" sz="1200" dirty="0"/>
+              <a:t>()</a:t>
+            </a:r>
+          </a:p>
+          <a:p>
+            <a:endParaRPr lang="fr-FR" sz="1200" dirty="0"/>
+          </a:p>
+          <a:p>
+            <a:r>
+              <a:rPr lang="fr-FR" sz="1200" dirty="0" err="1" smtClean="0"/>
+              <a:t>def</a:t>
+            </a:r>
+            <a:r>
+              <a:rPr lang="fr-FR" sz="1200" dirty="0" smtClean="0"/>
+              <a:t> </a:t>
+            </a:r>
+            <a:r>
+              <a:rPr lang="fr-FR" sz="1200" dirty="0" err="1"/>
+              <a:t>web_page</a:t>
+            </a:r>
+            <a:r>
+              <a:rPr lang="fr-FR" sz="1200" dirty="0"/>
+              <a:t>(client, commande</a:t>
+            </a:r>
+            <a:r>
+              <a:rPr lang="fr-FR" sz="1200" dirty="0" smtClean="0"/>
+              <a:t>):</a:t>
+            </a:r>
+            <a:endParaRPr lang="fr-FR" sz="1200" dirty="0"/>
+          </a:p>
+          <a:p>
+            <a:r>
+              <a:rPr lang="fr-FR" sz="1200" dirty="0"/>
+              <a:t>    </a:t>
+            </a:r>
+            <a:r>
+              <a:rPr lang="fr-FR" sz="1200" dirty="0" smtClean="0"/>
+              <a:t>html </a:t>
+            </a:r>
+            <a:r>
+              <a:rPr lang="fr-FR" sz="1200" dirty="0"/>
+              <a:t>= """</a:t>
+            </a:r>
+          </a:p>
+          <a:p>
+            <a:r>
+              <a:rPr lang="fr-FR" sz="1200" dirty="0"/>
+              <a:t>&lt;!DOCTYPE html&gt; </a:t>
+            </a:r>
+            <a:r>
+              <a:rPr lang="fr-FR" sz="1200" dirty="0" smtClean="0"/>
+              <a:t>&lt;html</a:t>
+            </a:r>
+            <a:r>
+              <a:rPr lang="fr-FR" sz="1200" dirty="0"/>
+              <a:t>&gt; </a:t>
+            </a:r>
+            <a:r>
+              <a:rPr lang="fr-FR" sz="1200" dirty="0" smtClean="0"/>
+              <a:t>&lt;</a:t>
+            </a:r>
+            <a:r>
+              <a:rPr lang="fr-FR" sz="1200" dirty="0" err="1" smtClean="0"/>
+              <a:t>head</a:t>
+            </a:r>
+            <a:r>
+              <a:rPr lang="fr-FR" sz="1200" dirty="0"/>
+              <a:t>&gt; </a:t>
+            </a:r>
+            <a:r>
+              <a:rPr lang="fr-FR" sz="1200" dirty="0" smtClean="0"/>
+              <a:t>&lt;style</a:t>
+            </a:r>
+            <a:r>
+              <a:rPr lang="fr-FR" sz="1200" dirty="0"/>
+              <a:t>&gt; </a:t>
+            </a:r>
+            <a:r>
+              <a:rPr lang="fr-FR" sz="1200" dirty="0" smtClean="0"/>
+              <a:t>… &lt;/style&gt; \n</a:t>
+            </a:r>
+          </a:p>
+          <a:p>
+            <a:r>
+              <a:rPr lang="fr-FR" sz="1200" dirty="0" smtClean="0"/>
+              <a:t>  </a:t>
+            </a:r>
+            <a:r>
+              <a:rPr lang="fr-FR" sz="1200" dirty="0"/>
+              <a:t>&lt;center&gt; &lt;h1&gt;Robot Service Jeunesse&lt;/h1</a:t>
+            </a:r>
+            <a:r>
+              <a:rPr lang="fr-FR" sz="1200" dirty="0" smtClean="0"/>
+              <a:t>&gt;  … &lt;/</a:t>
+            </a:r>
+            <a:r>
+              <a:rPr lang="fr-FR" sz="1200" dirty="0"/>
+              <a:t>center&gt; \n</a:t>
+            </a:r>
+          </a:p>
+          <a:p>
+            <a:r>
+              <a:rPr lang="fr-FR" sz="1200" dirty="0"/>
+              <a:t>&lt;/</a:t>
+            </a:r>
+            <a:r>
+              <a:rPr lang="fr-FR" sz="1200" dirty="0" err="1"/>
+              <a:t>head</a:t>
+            </a:r>
+            <a:r>
+              <a:rPr lang="fr-FR" sz="1200" dirty="0"/>
+              <a:t>&gt; \n</a:t>
+            </a:r>
+          </a:p>
+          <a:p>
+            <a:r>
+              <a:rPr lang="fr-FR" sz="1200" dirty="0"/>
+              <a:t>&lt;/html&gt;</a:t>
+            </a:r>
+          </a:p>
+          <a:p>
+            <a:r>
+              <a:rPr lang="fr-FR" sz="1200" dirty="0"/>
+              <a:t>"""</a:t>
+            </a:r>
+          </a:p>
+          <a:p>
+            <a:r>
+              <a:rPr lang="fr-FR" sz="1200" dirty="0"/>
+              <a:t>    </a:t>
+            </a:r>
+          </a:p>
+          <a:p>
+            <a:r>
+              <a:rPr lang="fr-FR" sz="1200" dirty="0"/>
+              <a:t>    </a:t>
+            </a:r>
+            <a:r>
+              <a:rPr lang="fr-FR" sz="1200" dirty="0" err="1"/>
+              <a:t>while</a:t>
+            </a:r>
+            <a:r>
+              <a:rPr lang="fr-FR" sz="1200" dirty="0"/>
+              <a:t> </a:t>
+            </a:r>
+            <a:r>
+              <a:rPr lang="fr-FR" sz="1200" dirty="0" err="1"/>
+              <a:t>True</a:t>
+            </a:r>
+            <a:r>
+              <a:rPr lang="fr-FR" sz="1200" dirty="0"/>
+              <a:t>:</a:t>
+            </a:r>
+          </a:p>
+          <a:p>
+            <a:r>
+              <a:rPr lang="fr-FR" sz="1200" dirty="0"/>
+              <a:t>        </a:t>
+            </a:r>
+            <a:r>
+              <a:rPr lang="fr-FR" sz="1200" dirty="0" err="1"/>
+              <a:t>try</a:t>
+            </a:r>
+            <a:r>
+              <a:rPr lang="fr-FR" sz="1200" dirty="0"/>
+              <a:t>:</a:t>
+            </a:r>
+          </a:p>
+          <a:p>
+            <a:r>
+              <a:rPr lang="fr-FR" sz="1200" dirty="0"/>
+              <a:t>            n = </a:t>
+            </a:r>
+            <a:r>
+              <a:rPr lang="fr-FR" sz="1200" dirty="0" err="1" smtClean="0"/>
+              <a:t>len</a:t>
+            </a:r>
+            <a:r>
+              <a:rPr lang="fr-FR" sz="1200" dirty="0" smtClean="0"/>
+              <a:t>(html)</a:t>
+            </a:r>
+            <a:endParaRPr lang="fr-FR" sz="1200" dirty="0"/>
+          </a:p>
+          <a:p>
+            <a:r>
+              <a:rPr lang="fr-FR" sz="1200" dirty="0" smtClean="0"/>
+              <a:t>            ns = </a:t>
+            </a:r>
+            <a:r>
+              <a:rPr lang="fr-FR" sz="1200" dirty="0" err="1" smtClean="0"/>
+              <a:t>client.write</a:t>
+            </a:r>
+            <a:r>
+              <a:rPr lang="fr-FR" sz="1200" dirty="0" smtClean="0"/>
+              <a:t>(html)</a:t>
+            </a:r>
+            <a:endParaRPr lang="fr-FR" sz="1200" dirty="0"/>
+          </a:p>
+          <a:p>
+            <a:r>
+              <a:rPr lang="fr-FR" sz="1200" dirty="0" smtClean="0"/>
+              <a:t>            </a:t>
+            </a:r>
+            <a:r>
+              <a:rPr lang="fr-FR" sz="1200" dirty="0" err="1" smtClean="0"/>
+              <a:t>client.close</a:t>
+            </a:r>
+            <a:r>
+              <a:rPr lang="fr-FR" sz="1200" dirty="0"/>
+              <a:t>()</a:t>
+            </a:r>
+          </a:p>
+          <a:p>
+            <a:r>
+              <a:rPr lang="fr-FR" sz="1200" dirty="0"/>
+              <a:t>            </a:t>
+            </a:r>
+            <a:r>
+              <a:rPr lang="fr-FR" sz="1200" dirty="0" err="1"/>
+              <a:t>print</a:t>
+            </a:r>
+            <a:r>
+              <a:rPr lang="fr-FR" sz="1200" dirty="0"/>
+              <a:t>("</a:t>
+            </a:r>
+            <a:r>
+              <a:rPr lang="fr-FR" sz="1200" dirty="0" err="1"/>
+              <a:t>sending</a:t>
+            </a:r>
+            <a:r>
+              <a:rPr lang="fr-FR" sz="1200" dirty="0"/>
+              <a:t> </a:t>
+            </a:r>
+            <a:r>
+              <a:rPr lang="fr-FR" sz="1200" dirty="0" err="1"/>
+              <a:t>answers</a:t>
+            </a:r>
+            <a:r>
+              <a:rPr lang="fr-FR" sz="1200" dirty="0"/>
+              <a:t>", n, ns)</a:t>
+            </a:r>
+          </a:p>
+          <a:p>
+            <a:r>
+              <a:rPr lang="fr-FR" sz="1200" dirty="0"/>
+              <a:t>            break</a:t>
+            </a:r>
+          </a:p>
+          <a:p>
+            <a:r>
+              <a:rPr lang="fr-FR" sz="1200" dirty="0"/>
+              <a:t>        </a:t>
+            </a:r>
+            <a:r>
+              <a:rPr lang="fr-FR" sz="1200" dirty="0" err="1"/>
+              <a:t>except</a:t>
+            </a:r>
+            <a:r>
+              <a:rPr lang="fr-FR" sz="1200" dirty="0"/>
+              <a:t>:</a:t>
+            </a:r>
+          </a:p>
+          <a:p>
+            <a:r>
+              <a:rPr lang="fr-FR" sz="1200" dirty="0"/>
+              <a:t>            </a:t>
+            </a:r>
+            <a:r>
+              <a:rPr lang="fr-FR" sz="1200" dirty="0" err="1" smtClean="0"/>
+              <a:t>pass</a:t>
+            </a:r>
+            <a:endParaRPr lang="fr-FR" sz="1200" dirty="0"/>
+          </a:p>
+        </p:txBody>
+      </p:sp>
+      <p:sp>
+        <p:nvSpPr>
+          <p:cNvPr id="9" name="Rectangle 8"/>
+          <p:cNvSpPr/>
+          <p:nvPr/>
+        </p:nvSpPr>
+        <p:spPr>
+          <a:xfrm>
+            <a:off x="7105817" y="860201"/>
+            <a:ext cx="2435750" cy="3231654"/>
+          </a:xfrm>
+          <a:prstGeom prst="rect">
+            <a:avLst/>
+          </a:prstGeom>
+          <a:solidFill>
+            <a:schemeClr val="bg1">
+              <a:lumMod val="95000"/>
+            </a:schemeClr>
+          </a:solidFill>
+          <a:ln w="19050">
+            <a:solidFill>
+              <a:srgbClr val="FF0000"/>
+            </a:solidFill>
+          </a:ln>
+        </p:spPr>
+        <p:txBody>
+          <a:bodyPr wrap="square">
+            <a:spAutoFit/>
+          </a:bodyPr>
+          <a:lstStyle/>
+          <a:p>
+            <a:r>
+              <a:rPr lang="fr-FR" sz="1200" dirty="0" smtClean="0"/>
+              <a:t>pot </a:t>
+            </a:r>
+            <a:r>
+              <a:rPr lang="fr-FR" sz="1200" dirty="0"/>
+              <a:t>= ADC(0)</a:t>
+            </a:r>
+          </a:p>
+          <a:p>
+            <a:endParaRPr lang="fr-FR" sz="1200" dirty="0"/>
+          </a:p>
+          <a:p>
+            <a:r>
+              <a:rPr lang="fr-FR" sz="1200" dirty="0" err="1"/>
+              <a:t>def</a:t>
+            </a:r>
+            <a:r>
+              <a:rPr lang="fr-FR" sz="1200" dirty="0"/>
+              <a:t> </a:t>
+            </a:r>
+            <a:r>
+              <a:rPr lang="fr-FR" sz="1200" dirty="0" err="1"/>
+              <a:t>cps</a:t>
+            </a:r>
+            <a:r>
+              <a:rPr lang="fr-FR" sz="1200" dirty="0"/>
+              <a:t>(pot):</a:t>
+            </a:r>
+          </a:p>
+          <a:p>
+            <a:r>
+              <a:rPr lang="fr-FR" sz="1200" dirty="0"/>
+              <a:t>    a = 40</a:t>
+            </a:r>
+          </a:p>
+          <a:p>
+            <a:r>
+              <a:rPr lang="fr-FR" sz="1200" dirty="0"/>
+              <a:t>    b = 430</a:t>
+            </a:r>
+          </a:p>
+          <a:p>
+            <a:r>
+              <a:rPr lang="fr-FR" sz="1200" dirty="0"/>
+              <a:t>    v = </a:t>
+            </a:r>
+            <a:r>
+              <a:rPr lang="fr-FR" sz="1200" dirty="0" err="1"/>
+              <a:t>pot.read</a:t>
+            </a:r>
+            <a:r>
+              <a:rPr lang="fr-FR" sz="1200" dirty="0"/>
+              <a:t>()</a:t>
+            </a:r>
+          </a:p>
+          <a:p>
+            <a:r>
+              <a:rPr lang="fr-FR" sz="1200" dirty="0"/>
+              <a:t>    return (v - a)/(b - a</a:t>
+            </a:r>
+            <a:r>
+              <a:rPr lang="fr-FR" sz="1200" dirty="0" smtClean="0"/>
+              <a:t>)</a:t>
+            </a:r>
+          </a:p>
+          <a:p>
+            <a:endParaRPr lang="fr-FR" sz="1200" dirty="0"/>
+          </a:p>
+          <a:p>
+            <a:r>
+              <a:rPr lang="fr-FR" sz="1200" dirty="0" err="1"/>
+              <a:t>d</a:t>
+            </a:r>
+            <a:r>
+              <a:rPr lang="fr-FR" sz="1200" dirty="0" err="1" smtClean="0"/>
+              <a:t>ef</a:t>
+            </a:r>
+            <a:r>
+              <a:rPr lang="fr-FR" sz="1200" dirty="0" smtClean="0"/>
+              <a:t> </a:t>
+            </a:r>
+            <a:r>
+              <a:rPr lang="fr-FR" sz="1200" dirty="0" err="1" smtClean="0"/>
+              <a:t>module_a</a:t>
+            </a:r>
+            <a:r>
+              <a:rPr lang="fr-FR" sz="1200" dirty="0" smtClean="0"/>
+              <a:t>():</a:t>
+            </a:r>
+          </a:p>
+          <a:p>
+            <a:r>
+              <a:rPr lang="fr-FR" sz="1200" dirty="0"/>
+              <a:t> </a:t>
+            </a:r>
+            <a:r>
+              <a:rPr lang="fr-FR" sz="1200" dirty="0" smtClean="0"/>
+              <a:t>   </a:t>
+            </a:r>
+            <a:r>
+              <a:rPr lang="fr-FR" sz="1200" dirty="0" err="1" smtClean="0"/>
+              <a:t>print</a:t>
+            </a:r>
+            <a:r>
+              <a:rPr lang="fr-FR" sz="1200" dirty="0" smtClean="0"/>
+              <a:t>(" lecture du module…")     </a:t>
+            </a:r>
+            <a:endParaRPr lang="fr-FR" sz="1200" dirty="0"/>
+          </a:p>
+          <a:p>
+            <a:endParaRPr lang="fr-FR" sz="1200" dirty="0"/>
+          </a:p>
+          <a:p>
+            <a:r>
+              <a:rPr lang="fr-FR" sz="1200" dirty="0" err="1" smtClean="0"/>
+              <a:t>def</a:t>
+            </a:r>
+            <a:r>
+              <a:rPr lang="fr-FR" sz="1200" dirty="0" smtClean="0"/>
+              <a:t> </a:t>
+            </a:r>
+            <a:r>
+              <a:rPr lang="fr-FR" sz="1200" dirty="0" err="1"/>
+              <a:t>do_something_else</a:t>
+            </a:r>
+            <a:r>
+              <a:rPr lang="fr-FR" sz="1200" dirty="0"/>
+              <a:t>():</a:t>
+            </a:r>
+          </a:p>
+          <a:p>
+            <a:r>
+              <a:rPr lang="fr-FR" sz="1200" dirty="0"/>
+              <a:t> </a:t>
+            </a:r>
+            <a:r>
+              <a:rPr lang="fr-FR" sz="1200" dirty="0" smtClean="0"/>
+              <a:t>    </a:t>
+            </a:r>
+            <a:r>
+              <a:rPr lang="fr-FR" sz="1200" dirty="0" err="1"/>
+              <a:t>print</a:t>
+            </a:r>
+            <a:r>
+              <a:rPr lang="fr-FR" sz="1200" dirty="0"/>
+              <a:t>("</a:t>
+            </a:r>
+            <a:r>
+              <a:rPr lang="fr-FR" sz="1200" dirty="0" err="1"/>
+              <a:t>doing</a:t>
+            </a:r>
+            <a:r>
+              <a:rPr lang="fr-FR" sz="1200" dirty="0"/>
+              <a:t> </a:t>
+            </a:r>
+            <a:r>
+              <a:rPr lang="fr-FR" sz="1200" dirty="0" err="1"/>
+              <a:t>somethig</a:t>
+            </a:r>
+            <a:r>
+              <a:rPr lang="fr-FR" sz="1200" dirty="0"/>
+              <a:t> </a:t>
+            </a:r>
+            <a:r>
+              <a:rPr lang="fr-FR" sz="1200" dirty="0" err="1"/>
+              <a:t>else</a:t>
+            </a:r>
+            <a:r>
+              <a:rPr lang="fr-FR" sz="1200" dirty="0"/>
+              <a:t>")</a:t>
+            </a:r>
+          </a:p>
+          <a:p>
+            <a:r>
+              <a:rPr lang="fr-FR" sz="1200" dirty="0" smtClean="0"/>
+              <a:t>     </a:t>
+            </a:r>
+            <a:r>
+              <a:rPr lang="fr-FR" sz="1200" dirty="0" err="1"/>
+              <a:t>print</a:t>
+            </a:r>
+            <a:r>
+              <a:rPr lang="fr-FR" sz="1200" dirty="0"/>
+              <a:t>("CPS = ", </a:t>
+            </a:r>
+            <a:r>
+              <a:rPr lang="fr-FR" sz="1200" dirty="0" err="1"/>
+              <a:t>cps</a:t>
+            </a:r>
+            <a:r>
+              <a:rPr lang="fr-FR" sz="1200" dirty="0"/>
+              <a:t>(pot))</a:t>
+            </a:r>
+          </a:p>
+          <a:p>
+            <a:r>
+              <a:rPr lang="fr-FR" sz="1200" dirty="0" smtClean="0"/>
+              <a:t>     </a:t>
+            </a:r>
+            <a:r>
+              <a:rPr lang="fr-FR" sz="1200" dirty="0" err="1"/>
+              <a:t>print</a:t>
+            </a:r>
+            <a:r>
+              <a:rPr lang="fr-FR" sz="1200" dirty="0" smtClean="0"/>
+              <a:t>("A= </a:t>
+            </a:r>
+            <a:r>
+              <a:rPr lang="fr-FR" sz="1200" dirty="0"/>
+              <a:t>", </a:t>
+            </a:r>
+            <a:r>
+              <a:rPr lang="fr-FR" sz="1200" dirty="0" err="1" smtClean="0"/>
+              <a:t>module_a</a:t>
+            </a:r>
+            <a:r>
+              <a:rPr lang="fr-FR" sz="1200" dirty="0" smtClean="0"/>
+              <a:t>())</a:t>
+            </a:r>
+          </a:p>
+          <a:p>
+            <a:r>
+              <a:rPr lang="fr-FR" sz="1200" dirty="0" smtClean="0"/>
+              <a:t>    </a:t>
+            </a:r>
+            <a:endParaRPr lang="fr-FR" sz="1200" dirty="0"/>
+          </a:p>
+          <a:p>
+            <a:r>
+              <a:rPr lang="fr-FR" sz="1200" dirty="0" smtClean="0"/>
+              <a:t>    </a:t>
+            </a:r>
+            <a:endParaRPr lang="fr-FR" sz="1200" dirty="0"/>
+          </a:p>
+        </p:txBody>
+      </p:sp>
+      <p:sp>
+        <p:nvSpPr>
+          <p:cNvPr id="10" name="Rectangle 9"/>
+          <p:cNvSpPr/>
+          <p:nvPr/>
+        </p:nvSpPr>
+        <p:spPr>
+          <a:xfrm>
+            <a:off x="6735373" y="5008954"/>
+            <a:ext cx="1419540" cy="890913"/>
+          </a:xfrm>
+          <a:prstGeom prst="wedgeRectCallout">
+            <a:avLst>
+              <a:gd name="adj1" fmla="val -222535"/>
+              <a:gd name="adj2" fmla="val -46119"/>
+            </a:avLst>
+          </a:prstGeom>
+          <a:ln w="12700"/>
+        </p:spPr>
+        <p:style>
+          <a:lnRef idx="1">
+            <a:schemeClr val="accent4"/>
+          </a:lnRef>
+          <a:fillRef idx="2">
+            <a:schemeClr val="accent4"/>
+          </a:fillRef>
+          <a:effectRef idx="1">
+            <a:schemeClr val="accent4"/>
+          </a:effectRef>
+          <a:fontRef idx="minor">
+            <a:schemeClr val="dk1"/>
+          </a:fontRef>
+        </p:style>
+        <p:txBody>
+          <a:bodyPr rtlCol="0" anchor="ctr"/>
+          <a:lstStyle/>
+          <a:p>
+            <a:pPr algn="ctr"/>
+            <a:r>
+              <a:rPr lang="fr-FR" dirty="0" smtClean="0"/>
+              <a:t>Définition de la page Web pour le client</a:t>
+            </a:r>
+            <a:endParaRPr lang="fr-FR" dirty="0"/>
+          </a:p>
+        </p:txBody>
+      </p:sp>
+      <p:sp>
+        <p:nvSpPr>
+          <p:cNvPr id="11" name="Rectangle 10"/>
+          <p:cNvSpPr/>
+          <p:nvPr/>
+        </p:nvSpPr>
+        <p:spPr>
+          <a:xfrm>
+            <a:off x="8963763" y="4162512"/>
+            <a:ext cx="2908234" cy="890913"/>
+          </a:xfrm>
+          <a:prstGeom prst="wedgeRectCallout">
+            <a:avLst>
+              <a:gd name="adj1" fmla="val -45165"/>
+              <a:gd name="adj2" fmla="val -128813"/>
+            </a:avLst>
+          </a:prstGeom>
+          <a:ln w="12700"/>
+        </p:spPr>
+        <p:style>
+          <a:lnRef idx="1">
+            <a:schemeClr val="accent4"/>
+          </a:lnRef>
+          <a:fillRef idx="2">
+            <a:schemeClr val="accent4"/>
+          </a:fillRef>
+          <a:effectRef idx="1">
+            <a:schemeClr val="accent4"/>
+          </a:effectRef>
+          <a:fontRef idx="minor">
+            <a:schemeClr val="dk1"/>
+          </a:fontRef>
+        </p:style>
+        <p:txBody>
+          <a:bodyPr rtlCol="0" anchor="ctr"/>
+          <a:lstStyle/>
+          <a:p>
+            <a:pPr algn="ctr"/>
+            <a:r>
+              <a:rPr lang="fr-FR" dirty="0" smtClean="0"/>
+              <a:t>Définition des actions spécifiques dans le serveur, pour contrôler des modules</a:t>
+            </a:r>
+            <a:endParaRPr lang="fr-FR" dirty="0"/>
+          </a:p>
+        </p:txBody>
+      </p:sp>
+    </p:spTree>
+    <p:extLst>
+      <p:ext uri="{BB962C8B-B14F-4D97-AF65-F5344CB8AC3E}">
+        <p14:creationId xmlns:p14="http://schemas.microsoft.com/office/powerpoint/2010/main" val="3520294662"/>
       </p:ext>
     </p:extLst>
   </p:cSld>

</xml_diff>